<commit_message>
Added comment and reporting
</commit_message>
<xml_diff>
--- a/Official/Design.pptx
+++ b/Official/Design.pptx
@@ -12,10 +12,9 @@
     <p:sldId id="259" r:id="rId6"/>
     <p:sldId id="260" r:id="rId7"/>
     <p:sldId id="261" r:id="rId8"/>
-    <p:sldId id="264" r:id="rId9"/>
-    <p:sldId id="265" r:id="rId10"/>
-    <p:sldId id="266" r:id="rId11"/>
-    <p:sldId id="268" r:id="rId12"/>
+    <p:sldId id="265" r:id="rId9"/>
+    <p:sldId id="266" r:id="rId10"/>
+    <p:sldId id="268" r:id="rId11"/>
   </p:sldIdLst>
   <p:sldSz cx="12192000" cy="6858000"/>
   <p:notesSz cx="6858000" cy="9144000"/>
@@ -3869,753 +3868,6 @@
 </file>
 
 <file path=ppt/diagrams/colors6.xml><?xml version="1.0" encoding="utf-8"?>
-<dgm:colorsDef xmlns:dgm="http://schemas.openxmlformats.org/drawingml/2006/diagram" xmlns:a="http://schemas.openxmlformats.org/drawingml/2006/main" uniqueId="urn:microsoft.com/office/officeart/2005/8/colors/accent1_2">
-  <dgm:title val=""/>
-  <dgm:desc val=""/>
-  <dgm:catLst>
-    <dgm:cat type="accent1" pri="11200"/>
-  </dgm:catLst>
-  <dgm:styleLbl name="node0">
-    <dgm:fillClrLst meth="repeat">
-      <a:schemeClr val="accent1"/>
-    </dgm:fillClrLst>
-    <dgm:linClrLst meth="repeat">
-      <a:schemeClr val="lt1"/>
-    </dgm:linClrLst>
-    <dgm:effectClrLst/>
-    <dgm:txLinClrLst/>
-    <dgm:txFillClrLst/>
-    <dgm:txEffectClrLst/>
-  </dgm:styleLbl>
-  <dgm:styleLbl name="alignNode1">
-    <dgm:fillClrLst meth="repeat">
-      <a:schemeClr val="accent1"/>
-    </dgm:fillClrLst>
-    <dgm:linClrLst meth="repeat">
-      <a:schemeClr val="accent1"/>
-    </dgm:linClrLst>
-    <dgm:effectClrLst/>
-    <dgm:txLinClrLst/>
-    <dgm:txFillClrLst/>
-    <dgm:txEffectClrLst/>
-  </dgm:styleLbl>
-  <dgm:styleLbl name="node1">
-    <dgm:fillClrLst meth="repeat">
-      <a:schemeClr val="accent1"/>
-    </dgm:fillClrLst>
-    <dgm:linClrLst meth="repeat">
-      <a:schemeClr val="lt1"/>
-    </dgm:linClrLst>
-    <dgm:effectClrLst/>
-    <dgm:txLinClrLst/>
-    <dgm:txFillClrLst/>
-    <dgm:txEffectClrLst/>
-  </dgm:styleLbl>
-  <dgm:styleLbl name="lnNode1">
-    <dgm:fillClrLst meth="repeat">
-      <a:schemeClr val="accent1"/>
-    </dgm:fillClrLst>
-    <dgm:linClrLst meth="repeat">
-      <a:schemeClr val="lt1"/>
-    </dgm:linClrLst>
-    <dgm:effectClrLst/>
-    <dgm:txLinClrLst/>
-    <dgm:txFillClrLst/>
-    <dgm:txEffectClrLst/>
-  </dgm:styleLbl>
-  <dgm:styleLbl name="vennNode1">
-    <dgm:fillClrLst meth="repeat">
-      <a:schemeClr val="accent1">
-        <a:alpha val="50000"/>
-      </a:schemeClr>
-    </dgm:fillClrLst>
-    <dgm:linClrLst meth="repeat">
-      <a:schemeClr val="lt1"/>
-    </dgm:linClrLst>
-    <dgm:effectClrLst/>
-    <dgm:txLinClrLst/>
-    <dgm:txFillClrLst/>
-    <dgm:txEffectClrLst/>
-  </dgm:styleLbl>
-  <dgm:styleLbl name="node2">
-    <dgm:fillClrLst meth="repeat">
-      <a:schemeClr val="accent1"/>
-    </dgm:fillClrLst>
-    <dgm:linClrLst meth="repeat">
-      <a:schemeClr val="lt1"/>
-    </dgm:linClrLst>
-    <dgm:effectClrLst/>
-    <dgm:txLinClrLst/>
-    <dgm:txFillClrLst/>
-    <dgm:txEffectClrLst/>
-  </dgm:styleLbl>
-  <dgm:styleLbl name="node3">
-    <dgm:fillClrLst meth="repeat">
-      <a:schemeClr val="accent1"/>
-    </dgm:fillClrLst>
-    <dgm:linClrLst meth="repeat">
-      <a:schemeClr val="lt1"/>
-    </dgm:linClrLst>
-    <dgm:effectClrLst/>
-    <dgm:txLinClrLst/>
-    <dgm:txFillClrLst/>
-    <dgm:txEffectClrLst/>
-  </dgm:styleLbl>
-  <dgm:styleLbl name="node4">
-    <dgm:fillClrLst meth="repeat">
-      <a:schemeClr val="accent1"/>
-    </dgm:fillClrLst>
-    <dgm:linClrLst meth="repeat">
-      <a:schemeClr val="lt1"/>
-    </dgm:linClrLst>
-    <dgm:effectClrLst/>
-    <dgm:txLinClrLst/>
-    <dgm:txFillClrLst/>
-    <dgm:txEffectClrLst/>
-  </dgm:styleLbl>
-  <dgm:styleLbl name="fgImgPlace1">
-    <dgm:fillClrLst meth="repeat">
-      <a:schemeClr val="accent1">
-        <a:tint val="50000"/>
-      </a:schemeClr>
-    </dgm:fillClrLst>
-    <dgm:linClrLst meth="repeat">
-      <a:schemeClr val="lt1"/>
-    </dgm:linClrLst>
-    <dgm:effectClrLst/>
-    <dgm:txLinClrLst/>
-    <dgm:txFillClrLst meth="repeat">
-      <a:schemeClr val="lt1"/>
-    </dgm:txFillClrLst>
-    <dgm:txEffectClrLst/>
-  </dgm:styleLbl>
-  <dgm:styleLbl name="alignImgPlace1">
-    <dgm:fillClrLst meth="repeat">
-      <a:schemeClr val="accent1">
-        <a:tint val="50000"/>
-      </a:schemeClr>
-    </dgm:fillClrLst>
-    <dgm:linClrLst meth="repeat">
-      <a:schemeClr val="lt1"/>
-    </dgm:linClrLst>
-    <dgm:effectClrLst/>
-    <dgm:txLinClrLst/>
-    <dgm:txFillClrLst meth="repeat">
-      <a:schemeClr val="lt1"/>
-    </dgm:txFillClrLst>
-    <dgm:txEffectClrLst/>
-  </dgm:styleLbl>
-  <dgm:styleLbl name="bgImgPlace1">
-    <dgm:fillClrLst meth="repeat">
-      <a:schemeClr val="accent1">
-        <a:tint val="50000"/>
-      </a:schemeClr>
-    </dgm:fillClrLst>
-    <dgm:linClrLst meth="repeat">
-      <a:schemeClr val="lt1"/>
-    </dgm:linClrLst>
-    <dgm:effectClrLst/>
-    <dgm:txLinClrLst/>
-    <dgm:txFillClrLst meth="repeat">
-      <a:schemeClr val="lt1"/>
-    </dgm:txFillClrLst>
-    <dgm:txEffectClrLst/>
-  </dgm:styleLbl>
-  <dgm:styleLbl name="sibTrans2D1">
-    <dgm:fillClrLst meth="repeat">
-      <a:schemeClr val="accent1">
-        <a:tint val="60000"/>
-      </a:schemeClr>
-    </dgm:fillClrLst>
-    <dgm:linClrLst meth="repeat">
-      <a:schemeClr val="accent1">
-        <a:tint val="60000"/>
-      </a:schemeClr>
-    </dgm:linClrLst>
-    <dgm:effectClrLst/>
-    <dgm:txLinClrLst/>
-    <dgm:txFillClrLst/>
-    <dgm:txEffectClrLst/>
-  </dgm:styleLbl>
-  <dgm:styleLbl name="fgSibTrans2D1">
-    <dgm:fillClrLst meth="repeat">
-      <a:schemeClr val="accent1">
-        <a:tint val="60000"/>
-      </a:schemeClr>
-    </dgm:fillClrLst>
-    <dgm:linClrLst meth="repeat">
-      <a:schemeClr val="accent1">
-        <a:tint val="60000"/>
-      </a:schemeClr>
-    </dgm:linClrLst>
-    <dgm:effectClrLst/>
-    <dgm:txLinClrLst/>
-    <dgm:txFillClrLst/>
-    <dgm:txEffectClrLst/>
-  </dgm:styleLbl>
-  <dgm:styleLbl name="bgSibTrans2D1">
-    <dgm:fillClrLst meth="repeat">
-      <a:schemeClr val="accent1">
-        <a:tint val="60000"/>
-      </a:schemeClr>
-    </dgm:fillClrLst>
-    <dgm:linClrLst meth="repeat">
-      <a:schemeClr val="accent1">
-        <a:tint val="60000"/>
-      </a:schemeClr>
-    </dgm:linClrLst>
-    <dgm:effectClrLst/>
-    <dgm:txLinClrLst/>
-    <dgm:txFillClrLst/>
-    <dgm:txEffectClrLst/>
-  </dgm:styleLbl>
-  <dgm:styleLbl name="sibTrans1D1">
-    <dgm:fillClrLst meth="repeat">
-      <a:schemeClr val="accent1"/>
-    </dgm:fillClrLst>
-    <dgm:linClrLst meth="repeat">
-      <a:schemeClr val="accent1"/>
-    </dgm:linClrLst>
-    <dgm:effectClrLst/>
-    <dgm:txLinClrLst/>
-    <dgm:txFillClrLst meth="repeat">
-      <a:schemeClr val="tx1"/>
-    </dgm:txFillClrLst>
-    <dgm:txEffectClrLst/>
-  </dgm:styleLbl>
-  <dgm:styleLbl name="callout">
-    <dgm:fillClrLst meth="repeat">
-      <a:schemeClr val="accent1"/>
-    </dgm:fillClrLst>
-    <dgm:linClrLst meth="repeat">
-      <a:schemeClr val="accent1">
-        <a:tint val="50000"/>
-      </a:schemeClr>
-    </dgm:linClrLst>
-    <dgm:effectClrLst/>
-    <dgm:txLinClrLst/>
-    <dgm:txFillClrLst meth="repeat">
-      <a:schemeClr val="tx1"/>
-    </dgm:txFillClrLst>
-    <dgm:txEffectClrLst/>
-  </dgm:styleLbl>
-  <dgm:styleLbl name="asst0">
-    <dgm:fillClrLst meth="repeat">
-      <a:schemeClr val="accent1"/>
-    </dgm:fillClrLst>
-    <dgm:linClrLst meth="repeat">
-      <a:schemeClr val="lt1"/>
-    </dgm:linClrLst>
-    <dgm:effectClrLst/>
-    <dgm:txLinClrLst/>
-    <dgm:txFillClrLst/>
-    <dgm:txEffectClrLst/>
-  </dgm:styleLbl>
-  <dgm:styleLbl name="asst1">
-    <dgm:fillClrLst meth="repeat">
-      <a:schemeClr val="accent1"/>
-    </dgm:fillClrLst>
-    <dgm:linClrLst meth="repeat">
-      <a:schemeClr val="lt1"/>
-    </dgm:linClrLst>
-    <dgm:effectClrLst/>
-    <dgm:txLinClrLst/>
-    <dgm:txFillClrLst/>
-    <dgm:txEffectClrLst/>
-  </dgm:styleLbl>
-  <dgm:styleLbl name="asst2">
-    <dgm:fillClrLst meth="repeat">
-      <a:schemeClr val="accent1"/>
-    </dgm:fillClrLst>
-    <dgm:linClrLst meth="repeat">
-      <a:schemeClr val="lt1"/>
-    </dgm:linClrLst>
-    <dgm:effectClrLst/>
-    <dgm:txLinClrLst/>
-    <dgm:txFillClrLst/>
-    <dgm:txEffectClrLst/>
-  </dgm:styleLbl>
-  <dgm:styleLbl name="asst3">
-    <dgm:fillClrLst meth="repeat">
-      <a:schemeClr val="accent1"/>
-    </dgm:fillClrLst>
-    <dgm:linClrLst meth="repeat">
-      <a:schemeClr val="lt1"/>
-    </dgm:linClrLst>
-    <dgm:effectClrLst/>
-    <dgm:txLinClrLst/>
-    <dgm:txFillClrLst/>
-    <dgm:txEffectClrLst/>
-  </dgm:styleLbl>
-  <dgm:styleLbl name="asst4">
-    <dgm:fillClrLst meth="repeat">
-      <a:schemeClr val="accent1"/>
-    </dgm:fillClrLst>
-    <dgm:linClrLst meth="repeat">
-      <a:schemeClr val="lt1"/>
-    </dgm:linClrLst>
-    <dgm:effectClrLst/>
-    <dgm:txLinClrLst/>
-    <dgm:txFillClrLst/>
-    <dgm:txEffectClrLst/>
-  </dgm:styleLbl>
-  <dgm:styleLbl name="parChTrans2D1">
-    <dgm:fillClrLst meth="repeat">
-      <a:schemeClr val="accent1">
-        <a:tint val="60000"/>
-      </a:schemeClr>
-    </dgm:fillClrLst>
-    <dgm:linClrLst meth="repeat">
-      <a:schemeClr val="accent1">
-        <a:tint val="60000"/>
-      </a:schemeClr>
-    </dgm:linClrLst>
-    <dgm:effectClrLst/>
-    <dgm:txLinClrLst/>
-    <dgm:txFillClrLst meth="repeat">
-      <a:schemeClr val="lt1"/>
-    </dgm:txFillClrLst>
-    <dgm:txEffectClrLst/>
-  </dgm:styleLbl>
-  <dgm:styleLbl name="parChTrans2D2">
-    <dgm:fillClrLst meth="repeat">
-      <a:schemeClr val="accent1"/>
-    </dgm:fillClrLst>
-    <dgm:linClrLst meth="repeat">
-      <a:schemeClr val="accent1"/>
-    </dgm:linClrLst>
-    <dgm:effectClrLst/>
-    <dgm:txLinClrLst/>
-    <dgm:txFillClrLst meth="repeat">
-      <a:schemeClr val="lt1"/>
-    </dgm:txFillClrLst>
-    <dgm:txEffectClrLst/>
-  </dgm:styleLbl>
-  <dgm:styleLbl name="parChTrans2D3">
-    <dgm:fillClrLst meth="repeat">
-      <a:schemeClr val="accent1"/>
-    </dgm:fillClrLst>
-    <dgm:linClrLst meth="repeat">
-      <a:schemeClr val="accent1"/>
-    </dgm:linClrLst>
-    <dgm:effectClrLst/>
-    <dgm:txLinClrLst/>
-    <dgm:txFillClrLst meth="repeat">
-      <a:schemeClr val="lt1"/>
-    </dgm:txFillClrLst>
-    <dgm:txEffectClrLst/>
-  </dgm:styleLbl>
-  <dgm:styleLbl name="parChTrans2D4">
-    <dgm:fillClrLst meth="repeat">
-      <a:schemeClr val="accent1"/>
-    </dgm:fillClrLst>
-    <dgm:linClrLst meth="repeat">
-      <a:schemeClr val="accent1"/>
-    </dgm:linClrLst>
-    <dgm:effectClrLst/>
-    <dgm:txLinClrLst/>
-    <dgm:txFillClrLst meth="repeat">
-      <a:schemeClr val="lt1"/>
-    </dgm:txFillClrLst>
-    <dgm:txEffectClrLst/>
-  </dgm:styleLbl>
-  <dgm:styleLbl name="parChTrans1D1">
-    <dgm:fillClrLst meth="repeat">
-      <a:schemeClr val="accent1"/>
-    </dgm:fillClrLst>
-    <dgm:linClrLst meth="repeat">
-      <a:schemeClr val="accent1">
-        <a:shade val="60000"/>
-      </a:schemeClr>
-    </dgm:linClrLst>
-    <dgm:effectClrLst/>
-    <dgm:txLinClrLst/>
-    <dgm:txFillClrLst meth="repeat">
-      <a:schemeClr val="tx1"/>
-    </dgm:txFillClrLst>
-    <dgm:txEffectClrLst/>
-  </dgm:styleLbl>
-  <dgm:styleLbl name="parChTrans1D2">
-    <dgm:fillClrLst meth="repeat">
-      <a:schemeClr val="accent1"/>
-    </dgm:fillClrLst>
-    <dgm:linClrLst meth="repeat">
-      <a:schemeClr val="accent1">
-        <a:shade val="60000"/>
-      </a:schemeClr>
-    </dgm:linClrLst>
-    <dgm:effectClrLst/>
-    <dgm:txLinClrLst/>
-    <dgm:txFillClrLst meth="repeat">
-      <a:schemeClr val="tx1"/>
-    </dgm:txFillClrLst>
-    <dgm:txEffectClrLst/>
-  </dgm:styleLbl>
-  <dgm:styleLbl name="parChTrans1D3">
-    <dgm:fillClrLst meth="repeat">
-      <a:schemeClr val="accent1"/>
-    </dgm:fillClrLst>
-    <dgm:linClrLst meth="repeat">
-      <a:schemeClr val="accent1">
-        <a:shade val="80000"/>
-      </a:schemeClr>
-    </dgm:linClrLst>
-    <dgm:effectClrLst/>
-    <dgm:txLinClrLst/>
-    <dgm:txFillClrLst meth="repeat">
-      <a:schemeClr val="tx1"/>
-    </dgm:txFillClrLst>
-    <dgm:txEffectClrLst/>
-  </dgm:styleLbl>
-  <dgm:styleLbl name="parChTrans1D4">
-    <dgm:fillClrLst meth="repeat">
-      <a:schemeClr val="accent1"/>
-    </dgm:fillClrLst>
-    <dgm:linClrLst meth="repeat">
-      <a:schemeClr val="accent1">
-        <a:shade val="80000"/>
-      </a:schemeClr>
-    </dgm:linClrLst>
-    <dgm:effectClrLst/>
-    <dgm:txLinClrLst/>
-    <dgm:txFillClrLst meth="repeat">
-      <a:schemeClr val="tx1"/>
-    </dgm:txFillClrLst>
-    <dgm:txEffectClrLst/>
-  </dgm:styleLbl>
-  <dgm:styleLbl name="fgAcc1">
-    <dgm:fillClrLst meth="repeat">
-      <a:schemeClr val="lt1">
-        <a:alpha val="90000"/>
-      </a:schemeClr>
-    </dgm:fillClrLst>
-    <dgm:linClrLst meth="repeat">
-      <a:schemeClr val="accent1"/>
-    </dgm:linClrLst>
-    <dgm:effectClrLst/>
-    <dgm:txLinClrLst/>
-    <dgm:txFillClrLst meth="repeat">
-      <a:schemeClr val="dk1"/>
-    </dgm:txFillClrLst>
-    <dgm:txEffectClrLst/>
-  </dgm:styleLbl>
-  <dgm:styleLbl name="conFgAcc1">
-    <dgm:fillClrLst meth="repeat">
-      <a:schemeClr val="lt1">
-        <a:alpha val="90000"/>
-      </a:schemeClr>
-    </dgm:fillClrLst>
-    <dgm:linClrLst meth="repeat">
-      <a:schemeClr val="accent1"/>
-    </dgm:linClrLst>
-    <dgm:effectClrLst/>
-    <dgm:txLinClrLst/>
-    <dgm:txFillClrLst meth="repeat">
-      <a:schemeClr val="dk1"/>
-    </dgm:txFillClrLst>
-    <dgm:txEffectClrLst/>
-  </dgm:styleLbl>
-  <dgm:styleLbl name="alignAcc1">
-    <dgm:fillClrLst meth="repeat">
-      <a:schemeClr val="lt1">
-        <a:alpha val="90000"/>
-      </a:schemeClr>
-    </dgm:fillClrLst>
-    <dgm:linClrLst meth="repeat">
-      <a:schemeClr val="accent1"/>
-    </dgm:linClrLst>
-    <dgm:effectClrLst/>
-    <dgm:txLinClrLst/>
-    <dgm:txFillClrLst meth="repeat">
-      <a:schemeClr val="dk1"/>
-    </dgm:txFillClrLst>
-    <dgm:txEffectClrLst/>
-  </dgm:styleLbl>
-  <dgm:styleLbl name="trAlignAcc1">
-    <dgm:fillClrLst meth="repeat">
-      <a:schemeClr val="lt1">
-        <a:alpha val="40000"/>
-      </a:schemeClr>
-    </dgm:fillClrLst>
-    <dgm:linClrLst meth="repeat">
-      <a:schemeClr val="accent1"/>
-    </dgm:linClrLst>
-    <dgm:effectClrLst/>
-    <dgm:txLinClrLst/>
-    <dgm:txFillClrLst meth="repeat">
-      <a:schemeClr val="dk1"/>
-    </dgm:txFillClrLst>
-    <dgm:txEffectClrLst/>
-  </dgm:styleLbl>
-  <dgm:styleLbl name="bgAcc1">
-    <dgm:fillClrLst meth="repeat">
-      <a:schemeClr val="lt1">
-        <a:alpha val="90000"/>
-      </a:schemeClr>
-    </dgm:fillClrLst>
-    <dgm:linClrLst meth="repeat">
-      <a:schemeClr val="accent1"/>
-    </dgm:linClrLst>
-    <dgm:effectClrLst/>
-    <dgm:txLinClrLst/>
-    <dgm:txFillClrLst meth="repeat">
-      <a:schemeClr val="dk1"/>
-    </dgm:txFillClrLst>
-    <dgm:txEffectClrLst/>
-  </dgm:styleLbl>
-  <dgm:styleLbl name="solidFgAcc1">
-    <dgm:fillClrLst meth="repeat">
-      <a:schemeClr val="lt1"/>
-    </dgm:fillClrLst>
-    <dgm:linClrLst meth="repeat">
-      <a:schemeClr val="accent1"/>
-    </dgm:linClrLst>
-    <dgm:effectClrLst/>
-    <dgm:txLinClrLst/>
-    <dgm:txFillClrLst meth="repeat">
-      <a:schemeClr val="dk1"/>
-    </dgm:txFillClrLst>
-    <dgm:txEffectClrLst/>
-  </dgm:styleLbl>
-  <dgm:styleLbl name="solidAlignAcc1">
-    <dgm:fillClrLst meth="repeat">
-      <a:schemeClr val="lt1"/>
-    </dgm:fillClrLst>
-    <dgm:linClrLst meth="repeat">
-      <a:schemeClr val="accent1"/>
-    </dgm:linClrLst>
-    <dgm:effectClrLst/>
-    <dgm:txLinClrLst/>
-    <dgm:txFillClrLst meth="repeat">
-      <a:schemeClr val="dk1"/>
-    </dgm:txFillClrLst>
-    <dgm:txEffectClrLst/>
-  </dgm:styleLbl>
-  <dgm:styleLbl name="solidBgAcc1">
-    <dgm:fillClrLst meth="repeat">
-      <a:schemeClr val="lt1"/>
-    </dgm:fillClrLst>
-    <dgm:linClrLst meth="repeat">
-      <a:schemeClr val="accent1"/>
-    </dgm:linClrLst>
-    <dgm:effectClrLst/>
-    <dgm:txLinClrLst/>
-    <dgm:txFillClrLst meth="repeat">
-      <a:schemeClr val="dk1"/>
-    </dgm:txFillClrLst>
-    <dgm:txEffectClrLst/>
-  </dgm:styleLbl>
-  <dgm:styleLbl name="fgAccFollowNode1">
-    <dgm:fillClrLst meth="repeat">
-      <a:schemeClr val="accent1">
-        <a:alpha val="90000"/>
-        <a:tint val="40000"/>
-      </a:schemeClr>
-    </dgm:fillClrLst>
-    <dgm:linClrLst meth="repeat">
-      <a:schemeClr val="accent1">
-        <a:alpha val="90000"/>
-        <a:tint val="40000"/>
-      </a:schemeClr>
-    </dgm:linClrLst>
-    <dgm:effectClrLst/>
-    <dgm:txLinClrLst/>
-    <dgm:txFillClrLst meth="repeat">
-      <a:schemeClr val="dk1"/>
-    </dgm:txFillClrLst>
-    <dgm:txEffectClrLst/>
-  </dgm:styleLbl>
-  <dgm:styleLbl name="alignAccFollowNode1">
-    <dgm:fillClrLst meth="repeat">
-      <a:schemeClr val="accent1">
-        <a:alpha val="90000"/>
-        <a:tint val="40000"/>
-      </a:schemeClr>
-    </dgm:fillClrLst>
-    <dgm:linClrLst meth="repeat">
-      <a:schemeClr val="accent1">
-        <a:alpha val="90000"/>
-        <a:tint val="40000"/>
-      </a:schemeClr>
-    </dgm:linClrLst>
-    <dgm:effectClrLst/>
-    <dgm:txLinClrLst/>
-    <dgm:txFillClrLst meth="repeat">
-      <a:schemeClr val="dk1"/>
-    </dgm:txFillClrLst>
-    <dgm:txEffectClrLst/>
-  </dgm:styleLbl>
-  <dgm:styleLbl name="bgAccFollowNode1">
-    <dgm:fillClrLst meth="repeat">
-      <a:schemeClr val="accent1">
-        <a:alpha val="90000"/>
-        <a:tint val="40000"/>
-      </a:schemeClr>
-    </dgm:fillClrLst>
-    <dgm:linClrLst meth="repeat">
-      <a:schemeClr val="accent1">
-        <a:alpha val="90000"/>
-        <a:tint val="40000"/>
-      </a:schemeClr>
-    </dgm:linClrLst>
-    <dgm:effectClrLst/>
-    <dgm:txLinClrLst/>
-    <dgm:txFillClrLst meth="repeat">
-      <a:schemeClr val="dk1"/>
-    </dgm:txFillClrLst>
-    <dgm:txEffectClrLst/>
-  </dgm:styleLbl>
-  <dgm:styleLbl name="fgAcc0">
-    <dgm:fillClrLst meth="repeat">
-      <a:schemeClr val="lt1">
-        <a:alpha val="90000"/>
-      </a:schemeClr>
-    </dgm:fillClrLst>
-    <dgm:linClrLst meth="repeat">
-      <a:schemeClr val="accent1"/>
-    </dgm:linClrLst>
-    <dgm:effectClrLst/>
-    <dgm:txLinClrLst/>
-    <dgm:txFillClrLst meth="repeat">
-      <a:schemeClr val="dk1"/>
-    </dgm:txFillClrLst>
-    <dgm:txEffectClrLst/>
-  </dgm:styleLbl>
-  <dgm:styleLbl name="fgAcc2">
-    <dgm:fillClrLst meth="repeat">
-      <a:schemeClr val="lt1">
-        <a:alpha val="90000"/>
-      </a:schemeClr>
-    </dgm:fillClrLst>
-    <dgm:linClrLst meth="repeat">
-      <a:schemeClr val="accent1"/>
-    </dgm:linClrLst>
-    <dgm:effectClrLst/>
-    <dgm:txLinClrLst/>
-    <dgm:txFillClrLst meth="repeat">
-      <a:schemeClr val="dk1"/>
-    </dgm:txFillClrLst>
-    <dgm:txEffectClrLst/>
-  </dgm:styleLbl>
-  <dgm:styleLbl name="fgAcc3">
-    <dgm:fillClrLst meth="repeat">
-      <a:schemeClr val="lt1">
-        <a:alpha val="90000"/>
-      </a:schemeClr>
-    </dgm:fillClrLst>
-    <dgm:linClrLst meth="repeat">
-      <a:schemeClr val="accent1"/>
-    </dgm:linClrLst>
-    <dgm:effectClrLst/>
-    <dgm:txLinClrLst/>
-    <dgm:txFillClrLst meth="repeat">
-      <a:schemeClr val="dk1"/>
-    </dgm:txFillClrLst>
-    <dgm:txEffectClrLst/>
-  </dgm:styleLbl>
-  <dgm:styleLbl name="fgAcc4">
-    <dgm:fillClrLst meth="repeat">
-      <a:schemeClr val="lt1">
-        <a:alpha val="90000"/>
-      </a:schemeClr>
-    </dgm:fillClrLst>
-    <dgm:linClrLst meth="repeat">
-      <a:schemeClr val="accent1"/>
-    </dgm:linClrLst>
-    <dgm:effectClrLst/>
-    <dgm:txLinClrLst/>
-    <dgm:txFillClrLst meth="repeat">
-      <a:schemeClr val="dk1"/>
-    </dgm:txFillClrLst>
-    <dgm:txEffectClrLst/>
-  </dgm:styleLbl>
-  <dgm:styleLbl name="bgShp">
-    <dgm:fillClrLst meth="repeat">
-      <a:schemeClr val="accent1">
-        <a:tint val="40000"/>
-      </a:schemeClr>
-    </dgm:fillClrLst>
-    <dgm:linClrLst meth="repeat">
-      <a:schemeClr val="accent1"/>
-    </dgm:linClrLst>
-    <dgm:effectClrLst/>
-    <dgm:txLinClrLst/>
-    <dgm:txFillClrLst meth="repeat">
-      <a:schemeClr val="dk1"/>
-    </dgm:txFillClrLst>
-    <dgm:txEffectClrLst/>
-  </dgm:styleLbl>
-  <dgm:styleLbl name="dkBgShp">
-    <dgm:fillClrLst meth="repeat">
-      <a:schemeClr val="accent1">
-        <a:shade val="80000"/>
-      </a:schemeClr>
-    </dgm:fillClrLst>
-    <dgm:linClrLst meth="repeat">
-      <a:schemeClr val="accent1"/>
-    </dgm:linClrLst>
-    <dgm:effectClrLst/>
-    <dgm:txLinClrLst/>
-    <dgm:txFillClrLst meth="repeat">
-      <a:schemeClr val="lt1"/>
-    </dgm:txFillClrLst>
-    <dgm:txEffectClrLst/>
-  </dgm:styleLbl>
-  <dgm:styleLbl name="trBgShp">
-    <dgm:fillClrLst meth="repeat">
-      <a:schemeClr val="accent1">
-        <a:tint val="50000"/>
-        <a:alpha val="40000"/>
-      </a:schemeClr>
-    </dgm:fillClrLst>
-    <dgm:linClrLst meth="repeat">
-      <a:schemeClr val="accent1"/>
-    </dgm:linClrLst>
-    <dgm:effectClrLst/>
-    <dgm:txLinClrLst/>
-    <dgm:txFillClrLst meth="repeat">
-      <a:schemeClr val="lt1"/>
-    </dgm:txFillClrLst>
-    <dgm:txEffectClrLst/>
-  </dgm:styleLbl>
-  <dgm:styleLbl name="fgShp">
-    <dgm:fillClrLst meth="repeat">
-      <a:schemeClr val="accent1">
-        <a:tint val="60000"/>
-      </a:schemeClr>
-    </dgm:fillClrLst>
-    <dgm:linClrLst meth="repeat">
-      <a:schemeClr val="lt1"/>
-    </dgm:linClrLst>
-    <dgm:effectClrLst/>
-    <dgm:txLinClrLst/>
-    <dgm:txFillClrLst meth="repeat">
-      <a:schemeClr val="dk1"/>
-    </dgm:txFillClrLst>
-    <dgm:txEffectClrLst/>
-  </dgm:styleLbl>
-  <dgm:styleLbl name="revTx">
-    <dgm:fillClrLst meth="repeat">
-      <a:schemeClr val="lt1">
-        <a:alpha val="0"/>
-      </a:schemeClr>
-    </dgm:fillClrLst>
-    <dgm:linClrLst meth="repeat">
-      <a:schemeClr val="dk1">
-        <a:alpha val="0"/>
-      </a:schemeClr>
-    </dgm:linClrLst>
-    <dgm:effectClrLst/>
-    <dgm:txLinClrLst/>
-    <dgm:txFillClrLst meth="repeat">
-      <a:schemeClr val="tx1"/>
-    </dgm:txFillClrLst>
-    <dgm:txEffectClrLst/>
-  </dgm:styleLbl>
-</dgm:colorsDef>
-</file>
-
-<file path=ppt/diagrams/colors7.xml><?xml version="1.0" encoding="utf-8"?>
 <dgm:colorsDef xmlns:dgm="http://schemas.openxmlformats.org/drawingml/2006/diagram" xmlns:a="http://schemas.openxmlformats.org/drawingml/2006/main" uniqueId="urn:microsoft.com/office/officeart/2005/8/colors/accent1_2">
   <dgm:title val=""/>
   <dgm:desc val=""/>
@@ -9117,245 +8369,6 @@
         </a:p>
       </dgm:t>
     </dgm:pt>
-    <dgm:pt modelId="{C3352426-939D-4321-8649-D6716BB162C4}" type="pres">
-      <dgm:prSet presAssocID="{34BEB75E-ED6D-4113-9F50-1BF5F1954990}" presName="vert0" presStyleCnt="0">
-        <dgm:presLayoutVars>
-          <dgm:dir/>
-          <dgm:animOne val="branch"/>
-          <dgm:animLvl val="lvl"/>
-        </dgm:presLayoutVars>
-      </dgm:prSet>
-      <dgm:spPr/>
-    </dgm:pt>
-    <dgm:pt modelId="{F0557730-8B9A-4E9D-832D-78384F71DA4A}" type="pres">
-      <dgm:prSet presAssocID="{441C9BFF-8AD7-4827-90F5-60BEDCAF3705}" presName="thickLine" presStyleLbl="alignNode1" presStyleIdx="0" presStyleCnt="1"/>
-      <dgm:spPr/>
-    </dgm:pt>
-    <dgm:pt modelId="{CFD527BF-B157-4E07-8C44-F012E9130A4E}" type="pres">
-      <dgm:prSet presAssocID="{441C9BFF-8AD7-4827-90F5-60BEDCAF3705}" presName="horz1" presStyleCnt="0"/>
-      <dgm:spPr/>
-    </dgm:pt>
-    <dgm:pt modelId="{E3CC5A9C-1C2B-4849-BDA5-16B8B34A5987}" type="pres">
-      <dgm:prSet presAssocID="{441C9BFF-8AD7-4827-90F5-60BEDCAF3705}" presName="tx1" presStyleLbl="revTx" presStyleIdx="0" presStyleCnt="3"/>
-      <dgm:spPr/>
-    </dgm:pt>
-    <dgm:pt modelId="{8D16F346-2AFD-42B3-8D89-71DE88801702}" type="pres">
-      <dgm:prSet presAssocID="{441C9BFF-8AD7-4827-90F5-60BEDCAF3705}" presName="vert1" presStyleCnt="0"/>
-      <dgm:spPr/>
-    </dgm:pt>
-    <dgm:pt modelId="{B0B4D1F8-D1D3-4302-AF97-85F2B054BEC0}" type="pres">
-      <dgm:prSet presAssocID="{D809E429-04AF-422B-B080-571F331ACCDF}" presName="vertSpace2a" presStyleCnt="0"/>
-      <dgm:spPr/>
-    </dgm:pt>
-    <dgm:pt modelId="{D68C06F4-D011-4D10-A7CA-231612848987}" type="pres">
-      <dgm:prSet presAssocID="{D809E429-04AF-422B-B080-571F331ACCDF}" presName="horz2" presStyleCnt="0"/>
-      <dgm:spPr/>
-    </dgm:pt>
-    <dgm:pt modelId="{A67507B9-D4E0-45F0-8B6F-E1194C50A57D}" type="pres">
-      <dgm:prSet presAssocID="{D809E429-04AF-422B-B080-571F331ACCDF}" presName="horzSpace2" presStyleCnt="0"/>
-      <dgm:spPr/>
-    </dgm:pt>
-    <dgm:pt modelId="{7C715882-15D3-4785-8D04-6D401EF6AFB0}" type="pres">
-      <dgm:prSet presAssocID="{D809E429-04AF-422B-B080-571F331ACCDF}" presName="tx2" presStyleLbl="revTx" presStyleIdx="1" presStyleCnt="3"/>
-      <dgm:spPr/>
-    </dgm:pt>
-    <dgm:pt modelId="{7345CB9B-9D84-4289-8283-A21AB0F34105}" type="pres">
-      <dgm:prSet presAssocID="{D809E429-04AF-422B-B080-571F331ACCDF}" presName="vert2" presStyleCnt="0"/>
-      <dgm:spPr/>
-    </dgm:pt>
-    <dgm:pt modelId="{0FF34B0B-2E65-4520-92BB-4118F260C032}" type="pres">
-      <dgm:prSet presAssocID="{D809E429-04AF-422B-B080-571F331ACCDF}" presName="thinLine2b" presStyleLbl="callout" presStyleIdx="0" presStyleCnt="2"/>
-      <dgm:spPr/>
-    </dgm:pt>
-    <dgm:pt modelId="{453D1700-8AF1-45E8-959E-433D1C8D7356}" type="pres">
-      <dgm:prSet presAssocID="{D809E429-04AF-422B-B080-571F331ACCDF}" presName="vertSpace2b" presStyleCnt="0"/>
-      <dgm:spPr/>
-    </dgm:pt>
-    <dgm:pt modelId="{15A6752B-A400-4195-B5DD-03592935198C}" type="pres">
-      <dgm:prSet presAssocID="{B8A96C09-D3D8-4A74-A80B-BEA0C980453B}" presName="horz2" presStyleCnt="0"/>
-      <dgm:spPr/>
-    </dgm:pt>
-    <dgm:pt modelId="{BA431673-A4E9-4785-A54E-FCC40487DB2E}" type="pres">
-      <dgm:prSet presAssocID="{B8A96C09-D3D8-4A74-A80B-BEA0C980453B}" presName="horzSpace2" presStyleCnt="0"/>
-      <dgm:spPr/>
-    </dgm:pt>
-    <dgm:pt modelId="{347C6339-B231-447A-BCBE-4DD771E79BCD}" type="pres">
-      <dgm:prSet presAssocID="{B8A96C09-D3D8-4A74-A80B-BEA0C980453B}" presName="tx2" presStyleLbl="revTx" presStyleIdx="2" presStyleCnt="3"/>
-      <dgm:spPr/>
-    </dgm:pt>
-    <dgm:pt modelId="{B050AE53-096D-41C4-B06F-035F6E844E1A}" type="pres">
-      <dgm:prSet presAssocID="{B8A96C09-D3D8-4A74-A80B-BEA0C980453B}" presName="vert2" presStyleCnt="0"/>
-      <dgm:spPr/>
-    </dgm:pt>
-    <dgm:pt modelId="{38233778-9C02-4BB2-AB72-F25A0E5E82CE}" type="pres">
-      <dgm:prSet presAssocID="{B8A96C09-D3D8-4A74-A80B-BEA0C980453B}" presName="thinLine2b" presStyleLbl="callout" presStyleIdx="1" presStyleCnt="2"/>
-      <dgm:spPr/>
-    </dgm:pt>
-    <dgm:pt modelId="{B61029BE-BA77-4BBC-B76C-5D8976283DBB}" type="pres">
-      <dgm:prSet presAssocID="{B8A96C09-D3D8-4A74-A80B-BEA0C980453B}" presName="vertSpace2b" presStyleCnt="0"/>
-      <dgm:spPr/>
-    </dgm:pt>
-  </dgm:ptLst>
-  <dgm:cxnLst>
-    <dgm:cxn modelId="{DB4F8735-0D01-48BD-85A0-85F0B748A85D}" type="presOf" srcId="{441C9BFF-8AD7-4827-90F5-60BEDCAF3705}" destId="{E3CC5A9C-1C2B-4849-BDA5-16B8B34A5987}" srcOrd="0" destOrd="0" presId="urn:microsoft.com/office/officeart/2008/layout/LinedList"/>
-    <dgm:cxn modelId="{F51E733D-C3D0-4CA3-ADA8-483E175EAC31}" type="presOf" srcId="{D809E429-04AF-422B-B080-571F331ACCDF}" destId="{7C715882-15D3-4785-8D04-6D401EF6AFB0}" srcOrd="0" destOrd="0" presId="urn:microsoft.com/office/officeart/2008/layout/LinedList"/>
-    <dgm:cxn modelId="{605E4440-290F-426D-ACD9-1A5FCB40EB0E}" srcId="{441C9BFF-8AD7-4827-90F5-60BEDCAF3705}" destId="{D809E429-04AF-422B-B080-571F331ACCDF}" srcOrd="0" destOrd="0" parTransId="{13CCF95D-B99C-49A1-977D-D76183D718CF}" sibTransId="{E2317A59-187B-401C-A619-D2B0DDE89B9A}"/>
-    <dgm:cxn modelId="{B17A2A60-71E1-45E5-961E-93E09E16DBDE}" srcId="{441C9BFF-8AD7-4827-90F5-60BEDCAF3705}" destId="{B8A96C09-D3D8-4A74-A80B-BEA0C980453B}" srcOrd="1" destOrd="0" parTransId="{E3FAACCE-0CD7-4FD4-BC21-AA3AC94926E0}" sibTransId="{3CCF7115-C32E-40D2-B920-114BED460AFD}"/>
-    <dgm:cxn modelId="{523F296D-2CC7-4C29-85F8-5468ED82EAEB}" srcId="{34BEB75E-ED6D-4113-9F50-1BF5F1954990}" destId="{441C9BFF-8AD7-4827-90F5-60BEDCAF3705}" srcOrd="0" destOrd="0" parTransId="{AED53F1B-6F52-4865-A6C0-13F7BB680C57}" sibTransId="{EE93340F-3E48-4F2C-8A92-4BB8BFF38136}"/>
-    <dgm:cxn modelId="{740EE279-A384-42E1-9054-1B0EAAF877E3}" type="presOf" srcId="{B8A96C09-D3D8-4A74-A80B-BEA0C980453B}" destId="{347C6339-B231-447A-BCBE-4DD771E79BCD}" srcOrd="0" destOrd="0" presId="urn:microsoft.com/office/officeart/2008/layout/LinedList"/>
-    <dgm:cxn modelId="{F2B1DBC2-3901-4D1E-BB45-0A525BA7B60E}" type="presOf" srcId="{34BEB75E-ED6D-4113-9F50-1BF5F1954990}" destId="{C3352426-939D-4321-8649-D6716BB162C4}" srcOrd="0" destOrd="0" presId="urn:microsoft.com/office/officeart/2008/layout/LinedList"/>
-    <dgm:cxn modelId="{054E2C87-8887-4DA9-A413-AA67AC171074}" type="presParOf" srcId="{C3352426-939D-4321-8649-D6716BB162C4}" destId="{F0557730-8B9A-4E9D-832D-78384F71DA4A}" srcOrd="0" destOrd="0" presId="urn:microsoft.com/office/officeart/2008/layout/LinedList"/>
-    <dgm:cxn modelId="{A3C9C481-7CBF-426B-9165-22202B290AB5}" type="presParOf" srcId="{C3352426-939D-4321-8649-D6716BB162C4}" destId="{CFD527BF-B157-4E07-8C44-F012E9130A4E}" srcOrd="1" destOrd="0" presId="urn:microsoft.com/office/officeart/2008/layout/LinedList"/>
-    <dgm:cxn modelId="{FAA65E88-306D-4325-8A1B-DEB4A2D2D979}" type="presParOf" srcId="{CFD527BF-B157-4E07-8C44-F012E9130A4E}" destId="{E3CC5A9C-1C2B-4849-BDA5-16B8B34A5987}" srcOrd="0" destOrd="0" presId="urn:microsoft.com/office/officeart/2008/layout/LinedList"/>
-    <dgm:cxn modelId="{D5FB4FC5-382D-4306-8A07-BB00E2262791}" type="presParOf" srcId="{CFD527BF-B157-4E07-8C44-F012E9130A4E}" destId="{8D16F346-2AFD-42B3-8D89-71DE88801702}" srcOrd="1" destOrd="0" presId="urn:microsoft.com/office/officeart/2008/layout/LinedList"/>
-    <dgm:cxn modelId="{1690AA78-51FA-4406-A140-22F19ED979BC}" type="presParOf" srcId="{8D16F346-2AFD-42B3-8D89-71DE88801702}" destId="{B0B4D1F8-D1D3-4302-AF97-85F2B054BEC0}" srcOrd="0" destOrd="0" presId="urn:microsoft.com/office/officeart/2008/layout/LinedList"/>
-    <dgm:cxn modelId="{D4767373-135F-4A72-B3CB-3288472DCF15}" type="presParOf" srcId="{8D16F346-2AFD-42B3-8D89-71DE88801702}" destId="{D68C06F4-D011-4D10-A7CA-231612848987}" srcOrd="1" destOrd="0" presId="urn:microsoft.com/office/officeart/2008/layout/LinedList"/>
-    <dgm:cxn modelId="{07B5BAD5-CE46-4586-990B-6D623BBDD441}" type="presParOf" srcId="{D68C06F4-D011-4D10-A7CA-231612848987}" destId="{A67507B9-D4E0-45F0-8B6F-E1194C50A57D}" srcOrd="0" destOrd="0" presId="urn:microsoft.com/office/officeart/2008/layout/LinedList"/>
-    <dgm:cxn modelId="{FB25FB53-193A-4CE8-85B8-4397FFF9A349}" type="presParOf" srcId="{D68C06F4-D011-4D10-A7CA-231612848987}" destId="{7C715882-15D3-4785-8D04-6D401EF6AFB0}" srcOrd="1" destOrd="0" presId="urn:microsoft.com/office/officeart/2008/layout/LinedList"/>
-    <dgm:cxn modelId="{288BD028-A3CC-4C57-B422-2E974FFDD467}" type="presParOf" srcId="{D68C06F4-D011-4D10-A7CA-231612848987}" destId="{7345CB9B-9D84-4289-8283-A21AB0F34105}" srcOrd="2" destOrd="0" presId="urn:microsoft.com/office/officeart/2008/layout/LinedList"/>
-    <dgm:cxn modelId="{528C4013-8ED6-4310-9778-3AEE3087C5A8}" type="presParOf" srcId="{8D16F346-2AFD-42B3-8D89-71DE88801702}" destId="{0FF34B0B-2E65-4520-92BB-4118F260C032}" srcOrd="2" destOrd="0" presId="urn:microsoft.com/office/officeart/2008/layout/LinedList"/>
-    <dgm:cxn modelId="{7D06037A-BE20-40CD-BD8E-076EA7A4BE6A}" type="presParOf" srcId="{8D16F346-2AFD-42B3-8D89-71DE88801702}" destId="{453D1700-8AF1-45E8-959E-433D1C8D7356}" srcOrd="3" destOrd="0" presId="urn:microsoft.com/office/officeart/2008/layout/LinedList"/>
-    <dgm:cxn modelId="{E12C1032-48AD-4236-A9B7-65D9C8AF32DF}" type="presParOf" srcId="{8D16F346-2AFD-42B3-8D89-71DE88801702}" destId="{15A6752B-A400-4195-B5DD-03592935198C}" srcOrd="4" destOrd="0" presId="urn:microsoft.com/office/officeart/2008/layout/LinedList"/>
-    <dgm:cxn modelId="{214A6D22-8BA8-4321-82F2-64210E9D7679}" type="presParOf" srcId="{15A6752B-A400-4195-B5DD-03592935198C}" destId="{BA431673-A4E9-4785-A54E-FCC40487DB2E}" srcOrd="0" destOrd="0" presId="urn:microsoft.com/office/officeart/2008/layout/LinedList"/>
-    <dgm:cxn modelId="{93CA7631-EC17-4A30-8EB9-708FCFC14DA3}" type="presParOf" srcId="{15A6752B-A400-4195-B5DD-03592935198C}" destId="{347C6339-B231-447A-BCBE-4DD771E79BCD}" srcOrd="1" destOrd="0" presId="urn:microsoft.com/office/officeart/2008/layout/LinedList"/>
-    <dgm:cxn modelId="{CDD0300B-B5F3-4765-BE49-9A49B0E1E03F}" type="presParOf" srcId="{15A6752B-A400-4195-B5DD-03592935198C}" destId="{B050AE53-096D-41C4-B06F-035F6E844E1A}" srcOrd="2" destOrd="0" presId="urn:microsoft.com/office/officeart/2008/layout/LinedList"/>
-    <dgm:cxn modelId="{8729D974-2B57-46BF-8B0D-26A74AA7FDC6}" type="presParOf" srcId="{8D16F346-2AFD-42B3-8D89-71DE88801702}" destId="{38233778-9C02-4BB2-AB72-F25A0E5E82CE}" srcOrd="5" destOrd="0" presId="urn:microsoft.com/office/officeart/2008/layout/LinedList"/>
-    <dgm:cxn modelId="{B2C00419-4481-4CF2-B8CA-636022BCC5FC}" type="presParOf" srcId="{8D16F346-2AFD-42B3-8D89-71DE88801702}" destId="{B61029BE-BA77-4BBC-B76C-5D8976283DBB}" srcOrd="6" destOrd="0" presId="urn:microsoft.com/office/officeart/2008/layout/LinedList"/>
-  </dgm:cxnLst>
-  <dgm:bg/>
-  <dgm:whole/>
-  <dgm:extLst>
-    <a:ext uri="http://schemas.microsoft.com/office/drawing/2008/diagram">
-      <dsp:dataModelExt xmlns:dsp="http://schemas.microsoft.com/office/drawing/2008/diagram" relId="rId6" minVer="http://schemas.openxmlformats.org/drawingml/2006/diagram"/>
-    </a:ext>
-  </dgm:extLst>
-</dgm:dataModel>
-</file>
-
-<file path=ppt/diagrams/data6.xml><?xml version="1.0" encoding="utf-8"?>
-<dgm:dataModel xmlns:dgm="http://schemas.openxmlformats.org/drawingml/2006/diagram" xmlns:a="http://schemas.openxmlformats.org/drawingml/2006/main">
-  <dgm:ptLst>
-    <dgm:pt modelId="{34BEB75E-ED6D-4113-9F50-1BF5F1954990}" type="doc">
-      <dgm:prSet loTypeId="urn:microsoft.com/office/officeart/2008/layout/LinedList" loCatId="hierarchy" qsTypeId="urn:microsoft.com/office/officeart/2005/8/quickstyle/simple1" qsCatId="simple" csTypeId="urn:microsoft.com/office/officeart/2005/8/colors/accent1_2" csCatId="accent1" phldr="1"/>
-      <dgm:spPr/>
-      <dgm:t>
-        <a:bodyPr/>
-        <a:lstStyle/>
-        <a:p>
-          <a:endParaRPr lang="en-PH"/>
-        </a:p>
-      </dgm:t>
-    </dgm:pt>
-    <dgm:pt modelId="{441C9BFF-8AD7-4827-90F5-60BEDCAF3705}">
-      <dgm:prSet phldrT="[Text]"/>
-      <dgm:spPr/>
-      <dgm:t>
-        <a:bodyPr/>
-        <a:lstStyle/>
-        <a:p>
-          <a:r>
-            <a:rPr lang="en-PH" dirty="0"/>
-            <a:t>Likes</a:t>
-          </a:r>
-        </a:p>
-      </dgm:t>
-    </dgm:pt>
-    <dgm:pt modelId="{AED53F1B-6F52-4865-A6C0-13F7BB680C57}" type="parTrans" cxnId="{523F296D-2CC7-4C29-85F8-5468ED82EAEB}">
-      <dgm:prSet/>
-      <dgm:spPr/>
-      <dgm:t>
-        <a:bodyPr/>
-        <a:lstStyle/>
-        <a:p>
-          <a:endParaRPr lang="en-PH"/>
-        </a:p>
-      </dgm:t>
-    </dgm:pt>
-    <dgm:pt modelId="{EE93340F-3E48-4F2C-8A92-4BB8BFF38136}" type="sibTrans" cxnId="{523F296D-2CC7-4C29-85F8-5468ED82EAEB}">
-      <dgm:prSet/>
-      <dgm:spPr/>
-      <dgm:t>
-        <a:bodyPr/>
-        <a:lstStyle/>
-        <a:p>
-          <a:endParaRPr lang="en-PH"/>
-        </a:p>
-      </dgm:t>
-    </dgm:pt>
-    <dgm:pt modelId="{D809E429-04AF-422B-B080-571F331ACCDF}">
-      <dgm:prSet phldrT="[Text]"/>
-      <dgm:spPr/>
-      <dgm:t>
-        <a:bodyPr/>
-        <a:lstStyle/>
-        <a:p>
-          <a:r>
-            <a:rPr lang="en-PH" dirty="0" err="1"/>
-            <a:t>userId</a:t>
-          </a:r>
-          <a:endParaRPr lang="en-PH" dirty="0"/>
-        </a:p>
-      </dgm:t>
-    </dgm:pt>
-    <dgm:pt modelId="{13CCF95D-B99C-49A1-977D-D76183D718CF}" type="parTrans" cxnId="{605E4440-290F-426D-ACD9-1A5FCB40EB0E}">
-      <dgm:prSet/>
-      <dgm:spPr/>
-      <dgm:t>
-        <a:bodyPr/>
-        <a:lstStyle/>
-        <a:p>
-          <a:endParaRPr lang="en-PH"/>
-        </a:p>
-      </dgm:t>
-    </dgm:pt>
-    <dgm:pt modelId="{E2317A59-187B-401C-A619-D2B0DDE89B9A}" type="sibTrans" cxnId="{605E4440-290F-426D-ACD9-1A5FCB40EB0E}">
-      <dgm:prSet/>
-      <dgm:spPr/>
-      <dgm:t>
-        <a:bodyPr/>
-        <a:lstStyle/>
-        <a:p>
-          <a:endParaRPr lang="en-PH"/>
-        </a:p>
-      </dgm:t>
-    </dgm:pt>
-    <dgm:pt modelId="{B8A96C09-D3D8-4A74-A80B-BEA0C980453B}">
-      <dgm:prSet phldrT="[Text]"/>
-      <dgm:spPr/>
-      <dgm:t>
-        <a:bodyPr/>
-        <a:lstStyle/>
-        <a:p>
-          <a:r>
-            <a:rPr lang="en-PH" dirty="0" err="1"/>
-            <a:t>postHash</a:t>
-          </a:r>
-          <a:endParaRPr lang="en-PH" dirty="0"/>
-        </a:p>
-      </dgm:t>
-    </dgm:pt>
-    <dgm:pt modelId="{E3FAACCE-0CD7-4FD4-BC21-AA3AC94926E0}" type="parTrans" cxnId="{B17A2A60-71E1-45E5-961E-93E09E16DBDE}">
-      <dgm:prSet/>
-      <dgm:spPr/>
-      <dgm:t>
-        <a:bodyPr/>
-        <a:lstStyle/>
-        <a:p>
-          <a:endParaRPr lang="en-PH"/>
-        </a:p>
-      </dgm:t>
-    </dgm:pt>
-    <dgm:pt modelId="{3CCF7115-C32E-40D2-B920-114BED460AFD}" type="sibTrans" cxnId="{B17A2A60-71E1-45E5-961E-93E09E16DBDE}">
-      <dgm:prSet/>
-      <dgm:spPr/>
-      <dgm:t>
-        <a:bodyPr/>
-        <a:lstStyle/>
-        <a:p>
-          <a:endParaRPr lang="en-PH"/>
-        </a:p>
-      </dgm:t>
-    </dgm:pt>
     <dgm:pt modelId="{A90E5BA9-B030-4072-AA39-F4FDDB6BD880}">
       <dgm:prSet phldrT="[Text]"/>
       <dgm:spPr/>
@@ -9539,7 +8552,7 @@
 </dgm:dataModel>
 </file>
 
-<file path=ppt/diagrams/data7.xml><?xml version="1.0" encoding="utf-8"?>
+<file path=ppt/diagrams/data6.xml><?xml version="1.0" encoding="utf-8"?>
 <dgm:dataModel xmlns:dgm="http://schemas.openxmlformats.org/drawingml/2006/diagram" xmlns:a="http://schemas.openxmlformats.org/drawingml/2006/main">
   <dgm:ptLst>
     <dgm:pt modelId="{34BEB75E-ED6D-4113-9F50-1BF5F1954990}" type="doc">
@@ -15679,348 +14692,6 @@
       </dsp:nvSpPr>
       <dsp:spPr>
         <a:xfrm>
-          <a:off x="2260854" y="135079"/>
-          <a:ext cx="8254746" cy="2701596"/>
-        </a:xfrm>
-        <a:prstGeom prst="rect">
-          <a:avLst/>
-        </a:prstGeom>
-        <a:noFill/>
-        <a:ln>
-          <a:noFill/>
-        </a:ln>
-        <a:effectLst/>
-      </dsp:spPr>
-      <dsp:style>
-        <a:lnRef idx="0">
-          <a:scrgbClr r="0" g="0" b="0"/>
-        </a:lnRef>
-        <a:fillRef idx="0">
-          <a:scrgbClr r="0" g="0" b="0"/>
-        </a:fillRef>
-        <a:effectRef idx="0">
-          <a:scrgbClr r="0" g="0" b="0"/>
-        </a:effectRef>
-        <a:fontRef idx="minor"/>
-      </dsp:style>
-      <dsp:txBody>
-        <a:bodyPr spcFirstLastPara="0" vert="horz" wrap="square" lIns="247650" tIns="247650" rIns="247650" bIns="247650" numCol="1" spcCol="1270" anchor="t" anchorCtr="0">
-          <a:noAutofit/>
-        </a:bodyPr>
-        <a:lstStyle/>
-        <a:p>
-          <a:pPr marL="0" lvl="0" indent="0" algn="l" defTabSz="2889250">
-            <a:lnSpc>
-              <a:spcPct val="90000"/>
-            </a:lnSpc>
-            <a:spcBef>
-              <a:spcPct val="0"/>
-            </a:spcBef>
-            <a:spcAft>
-              <a:spcPct val="35000"/>
-            </a:spcAft>
-            <a:buNone/>
-          </a:pPr>
-          <a:r>
-            <a:rPr lang="en-PH" sz="6500" kern="1200" dirty="0" err="1"/>
-            <a:t>userId</a:t>
-          </a:r>
-          <a:endParaRPr lang="en-PH" sz="6500" kern="1200" dirty="0"/>
-        </a:p>
-      </dsp:txBody>
-      <dsp:txXfrm>
-        <a:off x="2260854" y="135079"/>
-        <a:ext cx="8254746" cy="2701596"/>
-      </dsp:txXfrm>
-    </dsp:sp>
-    <dsp:sp modelId="{0FF34B0B-2E65-4520-92BB-4118F260C032}">
-      <dsp:nvSpPr>
-        <dsp:cNvPr id="0" name=""/>
-        <dsp:cNvSpPr/>
-      </dsp:nvSpPr>
-      <dsp:spPr>
-        <a:xfrm>
-          <a:off x="2103120" y="2836676"/>
-          <a:ext cx="8412480" cy="0"/>
-        </a:xfrm>
-        <a:prstGeom prst="line">
-          <a:avLst/>
-        </a:prstGeom>
-        <a:solidFill>
-          <a:schemeClr val="accent1">
-            <a:hueOff val="0"/>
-            <a:satOff val="0"/>
-            <a:lumOff val="0"/>
-            <a:alphaOff val="0"/>
-          </a:schemeClr>
-        </a:solidFill>
-        <a:ln w="12700" cap="flat" cmpd="sng" algn="ctr">
-          <a:solidFill>
-            <a:schemeClr val="accent1">
-              <a:tint val="50000"/>
-              <a:hueOff val="0"/>
-              <a:satOff val="0"/>
-              <a:lumOff val="0"/>
-              <a:alphaOff val="0"/>
-            </a:schemeClr>
-          </a:solidFill>
-          <a:prstDash val="solid"/>
-          <a:miter lim="800000"/>
-        </a:ln>
-        <a:effectLst/>
-      </dsp:spPr>
-      <dsp:style>
-        <a:lnRef idx="2">
-          <a:scrgbClr r="0" g="0" b="0"/>
-        </a:lnRef>
-        <a:fillRef idx="1">
-          <a:scrgbClr r="0" g="0" b="0"/>
-        </a:fillRef>
-        <a:effectRef idx="0">
-          <a:scrgbClr r="0" g="0" b="0"/>
-        </a:effectRef>
-        <a:fontRef idx="minor"/>
-      </dsp:style>
-    </dsp:sp>
-    <dsp:sp modelId="{347C6339-B231-447A-BCBE-4DD771E79BCD}">
-      <dsp:nvSpPr>
-        <dsp:cNvPr id="0" name=""/>
-        <dsp:cNvSpPr/>
-      </dsp:nvSpPr>
-      <dsp:spPr>
-        <a:xfrm>
-          <a:off x="2260854" y="2971756"/>
-          <a:ext cx="8254746" cy="2701596"/>
-        </a:xfrm>
-        <a:prstGeom prst="rect">
-          <a:avLst/>
-        </a:prstGeom>
-        <a:noFill/>
-        <a:ln>
-          <a:noFill/>
-        </a:ln>
-        <a:effectLst/>
-      </dsp:spPr>
-      <dsp:style>
-        <a:lnRef idx="0">
-          <a:scrgbClr r="0" g="0" b="0"/>
-        </a:lnRef>
-        <a:fillRef idx="0">
-          <a:scrgbClr r="0" g="0" b="0"/>
-        </a:fillRef>
-        <a:effectRef idx="0">
-          <a:scrgbClr r="0" g="0" b="0"/>
-        </a:effectRef>
-        <a:fontRef idx="minor"/>
-      </dsp:style>
-      <dsp:txBody>
-        <a:bodyPr spcFirstLastPara="0" vert="horz" wrap="square" lIns="247650" tIns="247650" rIns="247650" bIns="247650" numCol="1" spcCol="1270" anchor="t" anchorCtr="0">
-          <a:noAutofit/>
-        </a:bodyPr>
-        <a:lstStyle/>
-        <a:p>
-          <a:pPr marL="0" lvl="0" indent="0" algn="l" defTabSz="2889250">
-            <a:lnSpc>
-              <a:spcPct val="90000"/>
-            </a:lnSpc>
-            <a:spcBef>
-              <a:spcPct val="0"/>
-            </a:spcBef>
-            <a:spcAft>
-              <a:spcPct val="35000"/>
-            </a:spcAft>
-            <a:buNone/>
-          </a:pPr>
-          <a:r>
-            <a:rPr lang="en-PH" sz="6500" kern="1200" dirty="0" err="1"/>
-            <a:t>postHash</a:t>
-          </a:r>
-          <a:endParaRPr lang="en-PH" sz="6500" kern="1200" dirty="0"/>
-        </a:p>
-      </dsp:txBody>
-      <dsp:txXfrm>
-        <a:off x="2260854" y="2971756"/>
-        <a:ext cx="8254746" cy="2701596"/>
-      </dsp:txXfrm>
-    </dsp:sp>
-    <dsp:sp modelId="{38233778-9C02-4BB2-AB72-F25A0E5E82CE}">
-      <dsp:nvSpPr>
-        <dsp:cNvPr id="0" name=""/>
-        <dsp:cNvSpPr/>
-      </dsp:nvSpPr>
-      <dsp:spPr>
-        <a:xfrm>
-          <a:off x="2103120" y="5673352"/>
-          <a:ext cx="8412480" cy="0"/>
-        </a:xfrm>
-        <a:prstGeom prst="line">
-          <a:avLst/>
-        </a:prstGeom>
-        <a:solidFill>
-          <a:schemeClr val="accent1">
-            <a:hueOff val="0"/>
-            <a:satOff val="0"/>
-            <a:lumOff val="0"/>
-            <a:alphaOff val="0"/>
-          </a:schemeClr>
-        </a:solidFill>
-        <a:ln w="12700" cap="flat" cmpd="sng" algn="ctr">
-          <a:solidFill>
-            <a:schemeClr val="accent1">
-              <a:tint val="50000"/>
-              <a:hueOff val="0"/>
-              <a:satOff val="0"/>
-              <a:lumOff val="0"/>
-              <a:alphaOff val="0"/>
-            </a:schemeClr>
-          </a:solidFill>
-          <a:prstDash val="solid"/>
-          <a:miter lim="800000"/>
-        </a:ln>
-        <a:effectLst/>
-      </dsp:spPr>
-      <dsp:style>
-        <a:lnRef idx="2">
-          <a:scrgbClr r="0" g="0" b="0"/>
-        </a:lnRef>
-        <a:fillRef idx="1">
-          <a:scrgbClr r="0" g="0" b="0"/>
-        </a:fillRef>
-        <a:effectRef idx="0">
-          <a:scrgbClr r="0" g="0" b="0"/>
-        </a:effectRef>
-        <a:fontRef idx="minor"/>
-      </dsp:style>
-    </dsp:sp>
-  </dsp:spTree>
-</dsp:drawing>
-</file>
-
-<file path=ppt/diagrams/drawing6.xml><?xml version="1.0" encoding="utf-8"?>
-<dsp:drawing xmlns:dgm="http://schemas.openxmlformats.org/drawingml/2006/diagram" xmlns:dsp="http://schemas.microsoft.com/office/drawing/2008/diagram" xmlns:a="http://schemas.openxmlformats.org/drawingml/2006/main">
-  <dsp:spTree>
-    <dsp:nvGrpSpPr>
-      <dsp:cNvPr id="0" name=""/>
-      <dsp:cNvGrpSpPr/>
-    </dsp:nvGrpSpPr>
-    <dsp:grpSpPr/>
-    <dsp:sp modelId="{F0557730-8B9A-4E9D-832D-78384F71DA4A}">
-      <dsp:nvSpPr>
-        <dsp:cNvPr id="0" name=""/>
-        <dsp:cNvSpPr/>
-      </dsp:nvSpPr>
-      <dsp:spPr>
-        <a:xfrm>
-          <a:off x="0" y="0"/>
-          <a:ext cx="10515600" cy="0"/>
-        </a:xfrm>
-        <a:prstGeom prst="line">
-          <a:avLst/>
-        </a:prstGeom>
-        <a:solidFill>
-          <a:schemeClr val="accent1">
-            <a:hueOff val="0"/>
-            <a:satOff val="0"/>
-            <a:lumOff val="0"/>
-            <a:alphaOff val="0"/>
-          </a:schemeClr>
-        </a:solidFill>
-        <a:ln w="12700" cap="flat" cmpd="sng" algn="ctr">
-          <a:solidFill>
-            <a:schemeClr val="accent1">
-              <a:hueOff val="0"/>
-              <a:satOff val="0"/>
-              <a:lumOff val="0"/>
-              <a:alphaOff val="0"/>
-            </a:schemeClr>
-          </a:solidFill>
-          <a:prstDash val="solid"/>
-          <a:miter lim="800000"/>
-        </a:ln>
-        <a:effectLst/>
-      </dsp:spPr>
-      <dsp:style>
-        <a:lnRef idx="2">
-          <a:scrgbClr r="0" g="0" b="0"/>
-        </a:lnRef>
-        <a:fillRef idx="1">
-          <a:scrgbClr r="0" g="0" b="0"/>
-        </a:fillRef>
-        <a:effectRef idx="0">
-          <a:scrgbClr r="0" g="0" b="0"/>
-        </a:effectRef>
-        <a:fontRef idx="minor">
-          <a:schemeClr val="lt1"/>
-        </a:fontRef>
-      </dsp:style>
-    </dsp:sp>
-    <dsp:sp modelId="{E3CC5A9C-1C2B-4849-BDA5-16B8B34A5987}">
-      <dsp:nvSpPr>
-        <dsp:cNvPr id="0" name=""/>
-        <dsp:cNvSpPr/>
-      </dsp:nvSpPr>
-      <dsp:spPr>
-        <a:xfrm>
-          <a:off x="0" y="0"/>
-          <a:ext cx="2103120" cy="5811838"/>
-        </a:xfrm>
-        <a:prstGeom prst="rect">
-          <a:avLst/>
-        </a:prstGeom>
-        <a:noFill/>
-        <a:ln>
-          <a:noFill/>
-        </a:ln>
-        <a:effectLst/>
-      </dsp:spPr>
-      <dsp:style>
-        <a:lnRef idx="0">
-          <a:scrgbClr r="0" g="0" b="0"/>
-        </a:lnRef>
-        <a:fillRef idx="0">
-          <a:scrgbClr r="0" g="0" b="0"/>
-        </a:fillRef>
-        <a:effectRef idx="0">
-          <a:scrgbClr r="0" g="0" b="0"/>
-        </a:effectRef>
-        <a:fontRef idx="minor"/>
-      </dsp:style>
-      <dsp:txBody>
-        <a:bodyPr spcFirstLastPara="0" vert="horz" wrap="square" lIns="243840" tIns="243840" rIns="243840" bIns="243840" numCol="1" spcCol="1270" anchor="t" anchorCtr="0">
-          <a:noAutofit/>
-        </a:bodyPr>
-        <a:lstStyle/>
-        <a:p>
-          <a:pPr marL="0" lvl="0" indent="0" algn="l" defTabSz="2844800">
-            <a:lnSpc>
-              <a:spcPct val="90000"/>
-            </a:lnSpc>
-            <a:spcBef>
-              <a:spcPct val="0"/>
-            </a:spcBef>
-            <a:spcAft>
-              <a:spcPct val="35000"/>
-            </a:spcAft>
-            <a:buNone/>
-          </a:pPr>
-          <a:r>
-            <a:rPr lang="en-PH" sz="6400" kern="1200" dirty="0"/>
-            <a:t>Likes</a:t>
-          </a:r>
-        </a:p>
-      </dsp:txBody>
-      <dsp:txXfrm>
-        <a:off x="0" y="0"/>
-        <a:ext cx="2103120" cy="5811838"/>
-      </dsp:txXfrm>
-    </dsp:sp>
-    <dsp:sp modelId="{7C715882-15D3-4785-8D04-6D401EF6AFB0}">
-      <dsp:nvSpPr>
-        <dsp:cNvPr id="0" name=""/>
-        <dsp:cNvSpPr/>
-      </dsp:nvSpPr>
-      <dsp:spPr>
-        <a:xfrm>
           <a:off x="2260854" y="90809"/>
           <a:ext cx="8254746" cy="1816199"/>
         </a:xfrm>
@@ -16347,7 +15018,7 @@
 </dsp:drawing>
 </file>
 
-<file path=ppt/diagrams/drawing7.xml><?xml version="1.0" encoding="utf-8"?>
+<file path=ppt/diagrams/drawing6.xml><?xml version="1.0" encoding="utf-8"?>
 <dsp:drawing xmlns:dgm="http://schemas.openxmlformats.org/drawingml/2006/diagram" xmlns:dsp="http://schemas.microsoft.com/office/drawing/2008/diagram" xmlns:a="http://schemas.openxmlformats.org/drawingml/2006/main">
   <dsp:spTree>
     <dsp:nvGrpSpPr>
@@ -20274,472 +18945,6 @@
 </dgm:layoutDef>
 </file>
 
-<file path=ppt/diagrams/layout7.xml><?xml version="1.0" encoding="utf-8"?>
-<dgm:layoutDef xmlns:dgm="http://schemas.openxmlformats.org/drawingml/2006/diagram" xmlns:a="http://schemas.openxmlformats.org/drawingml/2006/main" uniqueId="urn:microsoft.com/office/officeart/2008/layout/LinedList">
-  <dgm:title val=""/>
-  <dgm:desc val=""/>
-  <dgm:catLst>
-    <dgm:cat type="hierarchy" pri="8000"/>
-    <dgm:cat type="list" pri="2500"/>
-  </dgm:catLst>
-  <dgm:sampData>
-    <dgm:dataModel>
-      <dgm:ptLst>
-        <dgm:pt modelId="0" type="doc"/>
-        <dgm:pt modelId="1">
-          <dgm:prSet phldr="1"/>
-        </dgm:pt>
-        <dgm:pt modelId="11">
-          <dgm:prSet phldr="1"/>
-        </dgm:pt>
-        <dgm:pt modelId="12">
-          <dgm:prSet phldr="1"/>
-        </dgm:pt>
-        <dgm:pt modelId="13">
-          <dgm:prSet phldr="1"/>
-        </dgm:pt>
-      </dgm:ptLst>
-      <dgm:cxnLst>
-        <dgm:cxn modelId="2" srcId="0" destId="1" srcOrd="0" destOrd="0"/>
-        <dgm:cxn modelId="3" srcId="1" destId="11" srcOrd="0" destOrd="0"/>
-        <dgm:cxn modelId="4" srcId="1" destId="12" srcOrd="1" destOrd="0"/>
-        <dgm:cxn modelId="5" srcId="1" destId="13" srcOrd="2" destOrd="0"/>
-      </dgm:cxnLst>
-      <dgm:bg/>
-      <dgm:whole/>
-    </dgm:dataModel>
-  </dgm:sampData>
-  <dgm:styleData>
-    <dgm:dataModel>
-      <dgm:ptLst>
-        <dgm:pt modelId="0" type="doc"/>
-        <dgm:pt modelId="1">
-          <dgm:prSet phldr="1"/>
-        </dgm:pt>
-        <dgm:pt modelId="11">
-          <dgm:prSet phldr="1"/>
-        </dgm:pt>
-        <dgm:pt modelId="12">
-          <dgm:prSet phldr="1"/>
-        </dgm:pt>
-      </dgm:ptLst>
-      <dgm:cxnLst>
-        <dgm:cxn modelId="2" srcId="0" destId="1" srcOrd="0" destOrd="0"/>
-        <dgm:cxn modelId="3" srcId="1" destId="11" srcOrd="0" destOrd="0"/>
-        <dgm:cxn modelId="4" srcId="1" destId="12" srcOrd="1" destOrd="0"/>
-      </dgm:cxnLst>
-      <dgm:bg/>
-      <dgm:whole/>
-    </dgm:dataModel>
-  </dgm:styleData>
-  <dgm:clrData>
-    <dgm:dataModel>
-      <dgm:ptLst>
-        <dgm:pt modelId="0" type="doc"/>
-        <dgm:pt modelId="1">
-          <dgm:prSet phldr="1"/>
-        </dgm:pt>
-        <dgm:pt modelId="11">
-          <dgm:prSet phldr="1"/>
-        </dgm:pt>
-        <dgm:pt modelId="12">
-          <dgm:prSet phldr="1"/>
-        </dgm:pt>
-      </dgm:ptLst>
-      <dgm:cxnLst>
-        <dgm:cxn modelId="2" srcId="0" destId="1" srcOrd="0" destOrd="0"/>
-        <dgm:cxn modelId="3" srcId="1" destId="11" srcOrd="0" destOrd="0"/>
-        <dgm:cxn modelId="4" srcId="1" destId="12" srcOrd="1" destOrd="0"/>
-      </dgm:cxnLst>
-      <dgm:bg/>
-      <dgm:whole/>
-    </dgm:dataModel>
-  </dgm:clrData>
-  <dgm:layoutNode name="vert0">
-    <dgm:varLst>
-      <dgm:dir/>
-      <dgm:animOne val="branch"/>
-      <dgm:animLvl val="lvl"/>
-    </dgm:varLst>
-    <dgm:choose name="Name0">
-      <dgm:if name="Name1" func="var" arg="dir" op="equ" val="norm">
-        <dgm:alg type="lin">
-          <dgm:param type="linDir" val="fromT"/>
-          <dgm:param type="nodeHorzAlign" val="l"/>
-        </dgm:alg>
-      </dgm:if>
-      <dgm:else name="Name2">
-        <dgm:alg type="lin">
-          <dgm:param type="linDir" val="fromT"/>
-          <dgm:param type="nodeHorzAlign" val="r"/>
-        </dgm:alg>
-      </dgm:else>
-    </dgm:choose>
-    <dgm:shape xmlns:r="http://schemas.openxmlformats.org/officeDocument/2006/relationships" r:blip="">
-      <dgm:adjLst/>
-    </dgm:shape>
-    <dgm:presOf/>
-    <dgm:constrLst>
-      <dgm:constr type="w" for="ch" forName="horz1" refType="w"/>
-      <dgm:constr type="h" for="ch" forName="horz1" refType="h"/>
-      <dgm:constr type="h" for="des" forName="vert1" refType="h"/>
-      <dgm:constr type="h" for="des" forName="tx1" refType="h"/>
-      <dgm:constr type="h" for="des" forName="horz2" refType="h"/>
-      <dgm:constr type="h" for="des" forName="vert2" refType="h"/>
-      <dgm:constr type="h" for="des" forName="horz3" refType="h"/>
-      <dgm:constr type="h" for="des" forName="vert3" refType="h"/>
-      <dgm:constr type="h" for="des" forName="horz4" refType="h"/>
-      <dgm:constr type="h" for="des" ptType="node" refType="h"/>
-      <dgm:constr type="primFontSz" for="des" forName="tx1" op="equ" val="65"/>
-      <dgm:constr type="primFontSz" for="des" forName="tx2" op="equ" val="65"/>
-      <dgm:constr type="primFontSz" for="des" forName="tx3" op="equ" val="65"/>
-      <dgm:constr type="primFontSz" for="des" forName="tx4" op="equ" val="65"/>
-      <dgm:constr type="w" for="des" forName="thickLine" refType="w"/>
-      <dgm:constr type="h" for="des" forName="thickLine"/>
-      <dgm:constr type="h" for="des" forName="thinLine1"/>
-      <dgm:constr type="h" for="des" forName="thinLine2b"/>
-      <dgm:constr type="h" for="des" forName="thinLine3"/>
-      <dgm:constr type="h" for="des" forName="vertSpace2a" refType="h" fact="0.05"/>
-      <dgm:constr type="h" for="des" forName="vertSpace2b" refType="h" refFor="des" refForName="vertSpace2a"/>
-    </dgm:constrLst>
-    <dgm:forEach name="Name3" axis="ch" ptType="node">
-      <dgm:layoutNode name="thickLine" styleLbl="alignNode1">
-        <dgm:alg type="sp"/>
-        <dgm:shape xmlns:r="http://schemas.openxmlformats.org/officeDocument/2006/relationships" type="line" r:blip="">
-          <dgm:adjLst/>
-        </dgm:shape>
-        <dgm:presOf/>
-      </dgm:layoutNode>
-      <dgm:layoutNode name="horz1">
-        <dgm:choose name="Name4">
-          <dgm:if name="Name5" func="var" arg="dir" op="equ" val="norm">
-            <dgm:alg type="lin">
-              <dgm:param type="linDir" val="fromL"/>
-              <dgm:param type="nodeVertAlign" val="t"/>
-            </dgm:alg>
-          </dgm:if>
-          <dgm:else name="Name6">
-            <dgm:alg type="lin">
-              <dgm:param type="linDir" val="fromR"/>
-              <dgm:param type="nodeVertAlign" val="t"/>
-            </dgm:alg>
-          </dgm:else>
-        </dgm:choose>
-        <dgm:shape xmlns:r="http://schemas.openxmlformats.org/officeDocument/2006/relationships" r:blip="">
-          <dgm:adjLst/>
-        </dgm:shape>
-        <dgm:presOf/>
-        <dgm:choose name="Name7">
-          <dgm:if name="Name8" axis="root des" func="maxDepth" op="equ" val="1">
-            <dgm:constrLst>
-              <dgm:constr type="w" for="ch" forName="tx1" refType="w"/>
-            </dgm:constrLst>
-          </dgm:if>
-          <dgm:if name="Name9" axis="root des" func="maxDepth" op="equ" val="2">
-            <dgm:constrLst>
-              <dgm:constr type="w" for="ch" forName="tx1" refType="w" fact="0.2"/>
-              <dgm:constr type="w" for="des" forName="tx2" refType="w" fact="0.785"/>
-              <dgm:constr type="w" for="des" forName="horzSpace2" refType="w" fact="0.015"/>
-              <dgm:constr type="w" for="des" forName="thinLine2b" refType="w" fact="0.8"/>
-            </dgm:constrLst>
-          </dgm:if>
-          <dgm:if name="Name10" axis="root des" func="maxDepth" op="equ" val="3">
-            <dgm:constrLst>
-              <dgm:constr type="w" for="ch" forName="tx1" refType="w" fact="0.2"/>
-              <dgm:constr type="w" for="des" forName="tx2" refType="w" fact="0.385"/>
-              <dgm:constr type="w" for="des" forName="tx3" refType="w" fact="0.385"/>
-              <dgm:constr type="w" for="des" forName="horzSpace2" refType="w" fact="0.015"/>
-              <dgm:constr type="w" for="des" forName="horzSpace3" refType="w" fact="0.015"/>
-              <dgm:constr type="w" for="des" forName="thinLine2b" refType="w" fact="0.8"/>
-              <dgm:constr type="w" for="des" forName="thinLine3" refType="w" fact="0.385"/>
-            </dgm:constrLst>
-          </dgm:if>
-          <dgm:if name="Name11" axis="root des" func="maxDepth" op="gte" val="4">
-            <dgm:constrLst>
-              <dgm:constr type="w" for="ch" forName="tx1" refType="w" fact="0.2"/>
-              <dgm:constr type="w" for="des" forName="tx2" refType="w" fact="0.2516"/>
-              <dgm:constr type="w" for="des" forName="tx3" refType="w" fact="0.2516"/>
-              <dgm:constr type="w" for="des" forName="tx4" refType="w" fact="0.2516"/>
-              <dgm:constr type="w" for="des" forName="horzSpace2" refType="w" fact="0.015"/>
-              <dgm:constr type="w" for="des" forName="horzSpace3" refType="w" fact="0.015"/>
-              <dgm:constr type="w" for="des" forName="horzSpace4" refType="w" fact="0.015"/>
-              <dgm:constr type="w" for="des" forName="thinLine2b" refType="w" fact="0.8"/>
-              <dgm:constr type="w" for="des" forName="thinLine3" refType="w" fact="0.5332"/>
-            </dgm:constrLst>
-          </dgm:if>
-          <dgm:else name="Name12"/>
-        </dgm:choose>
-        <dgm:layoutNode name="tx1" styleLbl="revTx">
-          <dgm:alg type="tx">
-            <dgm:param type="parTxLTRAlign" val="l"/>
-            <dgm:param type="parTxRTLAlign" val="r"/>
-            <dgm:param type="txAnchorVert" val="t"/>
-          </dgm:alg>
-          <dgm:shape xmlns:r="http://schemas.openxmlformats.org/officeDocument/2006/relationships" type="rect" r:blip="">
-            <dgm:adjLst/>
-          </dgm:shape>
-          <dgm:presOf axis="self"/>
-          <dgm:constrLst>
-            <dgm:constr type="tMarg" refType="primFontSz" fact="0.3"/>
-            <dgm:constr type="bMarg" refType="primFontSz" fact="0.3"/>
-            <dgm:constr type="lMarg" refType="primFontSz" fact="0.3"/>
-            <dgm:constr type="rMarg" refType="primFontSz" fact="0.3"/>
-          </dgm:constrLst>
-          <dgm:ruleLst>
-            <dgm:rule type="primFontSz" val="5" fact="NaN" max="NaN"/>
-          </dgm:ruleLst>
-        </dgm:layoutNode>
-        <dgm:layoutNode name="vert1">
-          <dgm:choose name="Name13">
-            <dgm:if name="Name14" func="var" arg="dir" op="equ" val="norm">
-              <dgm:alg type="lin">
-                <dgm:param type="linDir" val="fromT"/>
-                <dgm:param type="nodeHorzAlign" val="l"/>
-              </dgm:alg>
-            </dgm:if>
-            <dgm:else name="Name15">
-              <dgm:alg type="lin">
-                <dgm:param type="linDir" val="fromT"/>
-                <dgm:param type="nodeHorzAlign" val="r"/>
-              </dgm:alg>
-            </dgm:else>
-          </dgm:choose>
-          <dgm:shape xmlns:r="http://schemas.openxmlformats.org/officeDocument/2006/relationships" r:blip="">
-            <dgm:adjLst/>
-          </dgm:shape>
-          <dgm:presOf/>
-          <dgm:forEach name="Name16" axis="ch" ptType="node">
-            <dgm:choose name="Name17">
-              <dgm:if name="Name18" axis="self" ptType="node" func="pos" op="equ" val="1">
-                <dgm:layoutNode name="vertSpace2a">
-                  <dgm:alg type="sp"/>
-                  <dgm:shape xmlns:r="http://schemas.openxmlformats.org/officeDocument/2006/relationships" r:blip="">
-                    <dgm:adjLst/>
-                  </dgm:shape>
-                  <dgm:presOf/>
-                </dgm:layoutNode>
-              </dgm:if>
-              <dgm:else name="Name19"/>
-            </dgm:choose>
-            <dgm:layoutNode name="horz2">
-              <dgm:choose name="Name20">
-                <dgm:if name="Name21" func="var" arg="dir" op="equ" val="norm">
-                  <dgm:alg type="lin">
-                    <dgm:param type="linDir" val="fromL"/>
-                    <dgm:param type="nodeVertAlign" val="t"/>
-                  </dgm:alg>
-                </dgm:if>
-                <dgm:else name="Name22">
-                  <dgm:alg type="lin">
-                    <dgm:param type="linDir" val="fromR"/>
-                    <dgm:param type="nodeVertAlign" val="t"/>
-                  </dgm:alg>
-                </dgm:else>
-              </dgm:choose>
-              <dgm:shape xmlns:r="http://schemas.openxmlformats.org/officeDocument/2006/relationships" r:blip="">
-                <dgm:adjLst/>
-              </dgm:shape>
-              <dgm:presOf/>
-              <dgm:layoutNode name="horzSpace2">
-                <dgm:alg type="sp"/>
-                <dgm:shape xmlns:r="http://schemas.openxmlformats.org/officeDocument/2006/relationships" r:blip="">
-                  <dgm:adjLst/>
-                </dgm:shape>
-                <dgm:presOf/>
-              </dgm:layoutNode>
-              <dgm:layoutNode name="tx2" styleLbl="revTx">
-                <dgm:alg type="tx">
-                  <dgm:param type="parTxLTRAlign" val="l"/>
-                  <dgm:param type="parTxRTLAlign" val="r"/>
-                  <dgm:param type="txAnchorVert" val="t"/>
-                </dgm:alg>
-                <dgm:shape xmlns:r="http://schemas.openxmlformats.org/officeDocument/2006/relationships" type="rect" r:blip="">
-                  <dgm:adjLst/>
-                </dgm:shape>
-                <dgm:presOf axis="self"/>
-                <dgm:constrLst>
-                  <dgm:constr type="tMarg" refType="primFontSz" fact="0.3"/>
-                  <dgm:constr type="bMarg" refType="primFontSz" fact="0.3"/>
-                  <dgm:constr type="lMarg" refType="primFontSz" fact="0.3"/>
-                  <dgm:constr type="rMarg" refType="primFontSz" fact="0.3"/>
-                </dgm:constrLst>
-                <dgm:ruleLst>
-                  <dgm:rule type="primFontSz" val="5" fact="NaN" max="NaN"/>
-                </dgm:ruleLst>
-              </dgm:layoutNode>
-              <dgm:layoutNode name="vert2">
-                <dgm:choose name="Name23">
-                  <dgm:if name="Name24" func="var" arg="dir" op="equ" val="norm">
-                    <dgm:alg type="lin">
-                      <dgm:param type="linDir" val="fromT"/>
-                      <dgm:param type="nodeHorzAlign" val="l"/>
-                    </dgm:alg>
-                  </dgm:if>
-                  <dgm:else name="Name25">
-                    <dgm:alg type="lin">
-                      <dgm:param type="linDir" val="fromT"/>
-                      <dgm:param type="nodeHorzAlign" val="r"/>
-                    </dgm:alg>
-                  </dgm:else>
-                </dgm:choose>
-                <dgm:shape xmlns:r="http://schemas.openxmlformats.org/officeDocument/2006/relationships" r:blip="">
-                  <dgm:adjLst/>
-                </dgm:shape>
-                <dgm:presOf/>
-                <dgm:forEach name="Name26" axis="ch" ptType="node">
-                  <dgm:layoutNode name="horz3">
-                    <dgm:choose name="Name27">
-                      <dgm:if name="Name28" func="var" arg="dir" op="equ" val="norm">
-                        <dgm:alg type="lin">
-                          <dgm:param type="linDir" val="fromL"/>
-                          <dgm:param type="nodeVertAlign" val="t"/>
-                        </dgm:alg>
-                      </dgm:if>
-                      <dgm:else name="Name29">
-                        <dgm:alg type="lin">
-                          <dgm:param type="linDir" val="fromR"/>
-                          <dgm:param type="nodeVertAlign" val="t"/>
-                        </dgm:alg>
-                      </dgm:else>
-                    </dgm:choose>
-                    <dgm:shape xmlns:r="http://schemas.openxmlformats.org/officeDocument/2006/relationships" r:blip="">
-                      <dgm:adjLst/>
-                    </dgm:shape>
-                    <dgm:presOf/>
-                    <dgm:layoutNode name="horzSpace3">
-                      <dgm:alg type="sp"/>
-                      <dgm:shape xmlns:r="http://schemas.openxmlformats.org/officeDocument/2006/relationships" r:blip="">
-                        <dgm:adjLst/>
-                      </dgm:shape>
-                      <dgm:presOf/>
-                    </dgm:layoutNode>
-                    <dgm:layoutNode name="tx3" styleLbl="revTx">
-                      <dgm:alg type="tx">
-                        <dgm:param type="parTxLTRAlign" val="l"/>
-                        <dgm:param type="parTxRTLAlign" val="r"/>
-                        <dgm:param type="txAnchorVert" val="t"/>
-                      </dgm:alg>
-                      <dgm:shape xmlns:r="http://schemas.openxmlformats.org/officeDocument/2006/relationships" type="rect" r:blip="">
-                        <dgm:adjLst/>
-                      </dgm:shape>
-                      <dgm:presOf axis="self"/>
-                      <dgm:constrLst>
-                        <dgm:constr type="tMarg" refType="primFontSz" fact="0.3"/>
-                        <dgm:constr type="bMarg" refType="primFontSz" fact="0.3"/>
-                        <dgm:constr type="lMarg" refType="primFontSz" fact="0.3"/>
-                        <dgm:constr type="rMarg" refType="primFontSz" fact="0.3"/>
-                      </dgm:constrLst>
-                      <dgm:ruleLst>
-                        <dgm:rule type="primFontSz" val="5" fact="NaN" max="NaN"/>
-                      </dgm:ruleLst>
-                    </dgm:layoutNode>
-                    <dgm:layoutNode name="vert3">
-                      <dgm:choose name="Name30">
-                        <dgm:if name="Name31" func="var" arg="dir" op="equ" val="norm">
-                          <dgm:alg type="lin">
-                            <dgm:param type="linDir" val="fromT"/>
-                            <dgm:param type="nodeHorzAlign" val="l"/>
-                          </dgm:alg>
-                        </dgm:if>
-                        <dgm:else name="Name32">
-                          <dgm:alg type="lin">
-                            <dgm:param type="linDir" val="fromT"/>
-                            <dgm:param type="nodeHorzAlign" val="r"/>
-                          </dgm:alg>
-                        </dgm:else>
-                      </dgm:choose>
-                      <dgm:shape xmlns:r="http://schemas.openxmlformats.org/officeDocument/2006/relationships" r:blip="">
-                        <dgm:adjLst/>
-                      </dgm:shape>
-                      <dgm:presOf/>
-                      <dgm:forEach name="Name33" axis="ch" ptType="node">
-                        <dgm:layoutNode name="horz4">
-                          <dgm:choose name="Name34">
-                            <dgm:if name="Name35" func="var" arg="dir" op="equ" val="norm">
-                              <dgm:alg type="lin">
-                                <dgm:param type="linDir" val="fromL"/>
-                                <dgm:param type="nodeVertAlign" val="t"/>
-                              </dgm:alg>
-                            </dgm:if>
-                            <dgm:else name="Name36">
-                              <dgm:alg type="lin">
-                                <dgm:param type="linDir" val="fromR"/>
-                                <dgm:param type="nodeVertAlign" val="t"/>
-                              </dgm:alg>
-                            </dgm:else>
-                          </dgm:choose>
-                          <dgm:shape xmlns:r="http://schemas.openxmlformats.org/officeDocument/2006/relationships" r:blip="">
-                            <dgm:adjLst/>
-                          </dgm:shape>
-                          <dgm:presOf/>
-                          <dgm:layoutNode name="horzSpace4">
-                            <dgm:alg type="sp"/>
-                            <dgm:shape xmlns:r="http://schemas.openxmlformats.org/officeDocument/2006/relationships" r:blip="">
-                              <dgm:adjLst/>
-                            </dgm:shape>
-                            <dgm:presOf/>
-                          </dgm:layoutNode>
-                          <dgm:layoutNode name="tx4" styleLbl="revTx">
-                            <dgm:varLst>
-                              <dgm:bulletEnabled val="1"/>
-                            </dgm:varLst>
-                            <dgm:alg type="tx">
-                              <dgm:param type="parTxLTRAlign" val="l"/>
-                              <dgm:param type="parTxRTLAlign" val="r"/>
-                              <dgm:param type="txAnchorVert" val="t"/>
-                            </dgm:alg>
-                            <dgm:shape xmlns:r="http://schemas.openxmlformats.org/officeDocument/2006/relationships" type="rect" r:blip="">
-                              <dgm:adjLst/>
-                            </dgm:shape>
-                            <dgm:presOf axis="desOrSelf" ptType="node"/>
-                            <dgm:constrLst>
-                              <dgm:constr type="tMarg" refType="primFontSz" fact="0.3"/>
-                              <dgm:constr type="bMarg" refType="primFontSz" fact="0.3"/>
-                              <dgm:constr type="lMarg" refType="primFontSz" fact="0.3"/>
-                              <dgm:constr type="rMarg" refType="primFontSz" fact="0.3"/>
-                            </dgm:constrLst>
-                            <dgm:ruleLst>
-                              <dgm:rule type="primFontSz" val="5" fact="NaN" max="NaN"/>
-                            </dgm:ruleLst>
-                          </dgm:layoutNode>
-                        </dgm:layoutNode>
-                      </dgm:forEach>
-                    </dgm:layoutNode>
-                  </dgm:layoutNode>
-                  <dgm:forEach name="Name37" axis="followSib" ptType="sibTrans" cnt="1">
-                    <dgm:layoutNode name="thinLine3" styleLbl="callout">
-                      <dgm:alg type="sp"/>
-                      <dgm:shape xmlns:r="http://schemas.openxmlformats.org/officeDocument/2006/relationships" type="line" r:blip="">
-                        <dgm:adjLst/>
-                      </dgm:shape>
-                      <dgm:presOf/>
-                    </dgm:layoutNode>
-                  </dgm:forEach>
-                </dgm:forEach>
-              </dgm:layoutNode>
-            </dgm:layoutNode>
-            <dgm:layoutNode name="thinLine2b" styleLbl="callout">
-              <dgm:alg type="sp"/>
-              <dgm:shape xmlns:r="http://schemas.openxmlformats.org/officeDocument/2006/relationships" type="line" r:blip="">
-                <dgm:adjLst/>
-              </dgm:shape>
-              <dgm:presOf/>
-            </dgm:layoutNode>
-            <dgm:layoutNode name="vertSpace2b">
-              <dgm:alg type="sp"/>
-              <dgm:shape xmlns:r="http://schemas.openxmlformats.org/officeDocument/2006/relationships" r:blip="">
-                <dgm:adjLst/>
-              </dgm:shape>
-              <dgm:presOf/>
-            </dgm:layoutNode>
-          </dgm:forEach>
-        </dgm:layoutNode>
-      </dgm:layoutNode>
-    </dgm:forEach>
-  </dgm:layoutNode>
-</dgm:layoutDef>
-</file>
-
 <file path=ppt/diagrams/quickStyle1.xml><?xml version="1.0" encoding="utf-8"?>
 <dgm:styleDef xmlns:dgm="http://schemas.openxmlformats.org/drawingml/2006/diagram" xmlns:a="http://schemas.openxmlformats.org/drawingml/2006/main" uniqueId="urn:microsoft.com/office/officeart/2005/8/quickstyle/simple1">
   <dgm:title val=""/>
@@ -25911,1040 +24116,6 @@
 </file>
 
 <file path=ppt/diagrams/quickStyle6.xml><?xml version="1.0" encoding="utf-8"?>
-<dgm:styleDef xmlns:dgm="http://schemas.openxmlformats.org/drawingml/2006/diagram" xmlns:a="http://schemas.openxmlformats.org/drawingml/2006/main" uniqueId="urn:microsoft.com/office/officeart/2005/8/quickstyle/simple1">
-  <dgm:title val=""/>
-  <dgm:desc val=""/>
-  <dgm:catLst>
-    <dgm:cat type="simple" pri="10100"/>
-  </dgm:catLst>
-  <dgm:scene3d>
-    <a:camera prst="orthographicFront"/>
-    <a:lightRig rig="threePt" dir="t"/>
-  </dgm:scene3d>
-  <dgm:styleLbl name="node0">
-    <dgm:scene3d>
-      <a:camera prst="orthographicFront"/>
-      <a:lightRig rig="threePt" dir="t"/>
-    </dgm:scene3d>
-    <dgm:sp3d/>
-    <dgm:txPr/>
-    <dgm:style>
-      <a:lnRef idx="2">
-        <a:scrgbClr r="0" g="0" b="0"/>
-      </a:lnRef>
-      <a:fillRef idx="1">
-        <a:scrgbClr r="0" g="0" b="0"/>
-      </a:fillRef>
-      <a:effectRef idx="0">
-        <a:scrgbClr r="0" g="0" b="0"/>
-      </a:effectRef>
-      <a:fontRef idx="minor">
-        <a:schemeClr val="lt1"/>
-      </a:fontRef>
-    </dgm:style>
-  </dgm:styleLbl>
-  <dgm:styleLbl name="lnNode1">
-    <dgm:scene3d>
-      <a:camera prst="orthographicFront"/>
-      <a:lightRig rig="threePt" dir="t"/>
-    </dgm:scene3d>
-    <dgm:sp3d/>
-    <dgm:txPr/>
-    <dgm:style>
-      <a:lnRef idx="2">
-        <a:scrgbClr r="0" g="0" b="0"/>
-      </a:lnRef>
-      <a:fillRef idx="1">
-        <a:scrgbClr r="0" g="0" b="0"/>
-      </a:fillRef>
-      <a:effectRef idx="0">
-        <a:scrgbClr r="0" g="0" b="0"/>
-      </a:effectRef>
-      <a:fontRef idx="minor">
-        <a:schemeClr val="lt1"/>
-      </a:fontRef>
-    </dgm:style>
-  </dgm:styleLbl>
-  <dgm:styleLbl name="vennNode1">
-    <dgm:scene3d>
-      <a:camera prst="orthographicFront"/>
-      <a:lightRig rig="threePt" dir="t"/>
-    </dgm:scene3d>
-    <dgm:sp3d/>
-    <dgm:txPr/>
-    <dgm:style>
-      <a:lnRef idx="2">
-        <a:scrgbClr r="0" g="0" b="0"/>
-      </a:lnRef>
-      <a:fillRef idx="1">
-        <a:scrgbClr r="0" g="0" b="0"/>
-      </a:fillRef>
-      <a:effectRef idx="0">
-        <a:scrgbClr r="0" g="0" b="0"/>
-      </a:effectRef>
-      <a:fontRef idx="minor">
-        <a:schemeClr val="tx1"/>
-      </a:fontRef>
-    </dgm:style>
-  </dgm:styleLbl>
-  <dgm:styleLbl name="alignNode1">
-    <dgm:scene3d>
-      <a:camera prst="orthographicFront"/>
-      <a:lightRig rig="threePt" dir="t"/>
-    </dgm:scene3d>
-    <dgm:sp3d/>
-    <dgm:txPr/>
-    <dgm:style>
-      <a:lnRef idx="2">
-        <a:scrgbClr r="0" g="0" b="0"/>
-      </a:lnRef>
-      <a:fillRef idx="1">
-        <a:scrgbClr r="0" g="0" b="0"/>
-      </a:fillRef>
-      <a:effectRef idx="0">
-        <a:scrgbClr r="0" g="0" b="0"/>
-      </a:effectRef>
-      <a:fontRef idx="minor">
-        <a:schemeClr val="lt1"/>
-      </a:fontRef>
-    </dgm:style>
-  </dgm:styleLbl>
-  <dgm:styleLbl name="node1">
-    <dgm:scene3d>
-      <a:camera prst="orthographicFront"/>
-      <a:lightRig rig="threePt" dir="t"/>
-    </dgm:scene3d>
-    <dgm:sp3d/>
-    <dgm:txPr/>
-    <dgm:style>
-      <a:lnRef idx="2">
-        <a:scrgbClr r="0" g="0" b="0"/>
-      </a:lnRef>
-      <a:fillRef idx="1">
-        <a:scrgbClr r="0" g="0" b="0"/>
-      </a:fillRef>
-      <a:effectRef idx="0">
-        <a:scrgbClr r="0" g="0" b="0"/>
-      </a:effectRef>
-      <a:fontRef idx="minor">
-        <a:schemeClr val="lt1"/>
-      </a:fontRef>
-    </dgm:style>
-  </dgm:styleLbl>
-  <dgm:styleLbl name="node2">
-    <dgm:scene3d>
-      <a:camera prst="orthographicFront"/>
-      <a:lightRig rig="threePt" dir="t"/>
-    </dgm:scene3d>
-    <dgm:sp3d/>
-    <dgm:txPr/>
-    <dgm:style>
-      <a:lnRef idx="2">
-        <a:scrgbClr r="0" g="0" b="0"/>
-      </a:lnRef>
-      <a:fillRef idx="1">
-        <a:scrgbClr r="0" g="0" b="0"/>
-      </a:fillRef>
-      <a:effectRef idx="0">
-        <a:scrgbClr r="0" g="0" b="0"/>
-      </a:effectRef>
-      <a:fontRef idx="minor">
-        <a:schemeClr val="lt1"/>
-      </a:fontRef>
-    </dgm:style>
-  </dgm:styleLbl>
-  <dgm:styleLbl name="node3">
-    <dgm:scene3d>
-      <a:camera prst="orthographicFront"/>
-      <a:lightRig rig="threePt" dir="t"/>
-    </dgm:scene3d>
-    <dgm:sp3d/>
-    <dgm:txPr/>
-    <dgm:style>
-      <a:lnRef idx="2">
-        <a:scrgbClr r="0" g="0" b="0"/>
-      </a:lnRef>
-      <a:fillRef idx="1">
-        <a:scrgbClr r="0" g="0" b="0"/>
-      </a:fillRef>
-      <a:effectRef idx="0">
-        <a:scrgbClr r="0" g="0" b="0"/>
-      </a:effectRef>
-      <a:fontRef idx="minor">
-        <a:schemeClr val="lt1"/>
-      </a:fontRef>
-    </dgm:style>
-  </dgm:styleLbl>
-  <dgm:styleLbl name="node4">
-    <dgm:scene3d>
-      <a:camera prst="orthographicFront"/>
-      <a:lightRig rig="threePt" dir="t"/>
-    </dgm:scene3d>
-    <dgm:sp3d/>
-    <dgm:txPr/>
-    <dgm:style>
-      <a:lnRef idx="2">
-        <a:scrgbClr r="0" g="0" b="0"/>
-      </a:lnRef>
-      <a:fillRef idx="1">
-        <a:scrgbClr r="0" g="0" b="0"/>
-      </a:fillRef>
-      <a:effectRef idx="0">
-        <a:scrgbClr r="0" g="0" b="0"/>
-      </a:effectRef>
-      <a:fontRef idx="minor">
-        <a:schemeClr val="lt1"/>
-      </a:fontRef>
-    </dgm:style>
-  </dgm:styleLbl>
-  <dgm:styleLbl name="fgImgPlace1">
-    <dgm:scene3d>
-      <a:camera prst="orthographicFront"/>
-      <a:lightRig rig="threePt" dir="t"/>
-    </dgm:scene3d>
-    <dgm:sp3d/>
-    <dgm:txPr/>
-    <dgm:style>
-      <a:lnRef idx="2">
-        <a:scrgbClr r="0" g="0" b="0"/>
-      </a:lnRef>
-      <a:fillRef idx="1">
-        <a:scrgbClr r="0" g="0" b="0"/>
-      </a:fillRef>
-      <a:effectRef idx="0">
-        <a:scrgbClr r="0" g="0" b="0"/>
-      </a:effectRef>
-      <a:fontRef idx="minor"/>
-    </dgm:style>
-  </dgm:styleLbl>
-  <dgm:styleLbl name="alignImgPlace1">
-    <dgm:scene3d>
-      <a:camera prst="orthographicFront"/>
-      <a:lightRig rig="threePt" dir="t"/>
-    </dgm:scene3d>
-    <dgm:sp3d/>
-    <dgm:txPr/>
-    <dgm:style>
-      <a:lnRef idx="2">
-        <a:scrgbClr r="0" g="0" b="0"/>
-      </a:lnRef>
-      <a:fillRef idx="1">
-        <a:scrgbClr r="0" g="0" b="0"/>
-      </a:fillRef>
-      <a:effectRef idx="0">
-        <a:scrgbClr r="0" g="0" b="0"/>
-      </a:effectRef>
-      <a:fontRef idx="minor"/>
-    </dgm:style>
-  </dgm:styleLbl>
-  <dgm:styleLbl name="bgImgPlace1">
-    <dgm:scene3d>
-      <a:camera prst="orthographicFront"/>
-      <a:lightRig rig="threePt" dir="t"/>
-    </dgm:scene3d>
-    <dgm:sp3d/>
-    <dgm:txPr/>
-    <dgm:style>
-      <a:lnRef idx="2">
-        <a:scrgbClr r="0" g="0" b="0"/>
-      </a:lnRef>
-      <a:fillRef idx="1">
-        <a:scrgbClr r="0" g="0" b="0"/>
-      </a:fillRef>
-      <a:effectRef idx="0">
-        <a:scrgbClr r="0" g="0" b="0"/>
-      </a:effectRef>
-      <a:fontRef idx="minor"/>
-    </dgm:style>
-  </dgm:styleLbl>
-  <dgm:styleLbl name="sibTrans2D1">
-    <dgm:scene3d>
-      <a:camera prst="orthographicFront"/>
-      <a:lightRig rig="threePt" dir="t"/>
-    </dgm:scene3d>
-    <dgm:sp3d/>
-    <dgm:txPr/>
-    <dgm:style>
-      <a:lnRef idx="0">
-        <a:scrgbClr r="0" g="0" b="0"/>
-      </a:lnRef>
-      <a:fillRef idx="1">
-        <a:scrgbClr r="0" g="0" b="0"/>
-      </a:fillRef>
-      <a:effectRef idx="0">
-        <a:scrgbClr r="0" g="0" b="0"/>
-      </a:effectRef>
-      <a:fontRef idx="minor">
-        <a:schemeClr val="lt1"/>
-      </a:fontRef>
-    </dgm:style>
-  </dgm:styleLbl>
-  <dgm:styleLbl name="fgSibTrans2D1">
-    <dgm:scene3d>
-      <a:camera prst="orthographicFront"/>
-      <a:lightRig rig="threePt" dir="t"/>
-    </dgm:scene3d>
-    <dgm:sp3d/>
-    <dgm:txPr/>
-    <dgm:style>
-      <a:lnRef idx="0">
-        <a:scrgbClr r="0" g="0" b="0"/>
-      </a:lnRef>
-      <a:fillRef idx="1">
-        <a:scrgbClr r="0" g="0" b="0"/>
-      </a:fillRef>
-      <a:effectRef idx="0">
-        <a:scrgbClr r="0" g="0" b="0"/>
-      </a:effectRef>
-      <a:fontRef idx="minor">
-        <a:schemeClr val="lt1"/>
-      </a:fontRef>
-    </dgm:style>
-  </dgm:styleLbl>
-  <dgm:styleLbl name="bgSibTrans2D1">
-    <dgm:scene3d>
-      <a:camera prst="orthographicFront"/>
-      <a:lightRig rig="threePt" dir="t"/>
-    </dgm:scene3d>
-    <dgm:sp3d/>
-    <dgm:txPr/>
-    <dgm:style>
-      <a:lnRef idx="0">
-        <a:scrgbClr r="0" g="0" b="0"/>
-      </a:lnRef>
-      <a:fillRef idx="1">
-        <a:scrgbClr r="0" g="0" b="0"/>
-      </a:fillRef>
-      <a:effectRef idx="0">
-        <a:scrgbClr r="0" g="0" b="0"/>
-      </a:effectRef>
-      <a:fontRef idx="minor">
-        <a:schemeClr val="lt1"/>
-      </a:fontRef>
-    </dgm:style>
-  </dgm:styleLbl>
-  <dgm:styleLbl name="sibTrans1D1">
-    <dgm:scene3d>
-      <a:camera prst="orthographicFront"/>
-      <a:lightRig rig="threePt" dir="t"/>
-    </dgm:scene3d>
-    <dgm:sp3d/>
-    <dgm:txPr/>
-    <dgm:style>
-      <a:lnRef idx="1">
-        <a:scrgbClr r="0" g="0" b="0"/>
-      </a:lnRef>
-      <a:fillRef idx="0">
-        <a:scrgbClr r="0" g="0" b="0"/>
-      </a:fillRef>
-      <a:effectRef idx="0">
-        <a:scrgbClr r="0" g="0" b="0"/>
-      </a:effectRef>
-      <a:fontRef idx="minor"/>
-    </dgm:style>
-  </dgm:styleLbl>
-  <dgm:styleLbl name="callout">
-    <dgm:scene3d>
-      <a:camera prst="orthographicFront"/>
-      <a:lightRig rig="threePt" dir="t"/>
-    </dgm:scene3d>
-    <dgm:sp3d/>
-    <dgm:txPr/>
-    <dgm:style>
-      <a:lnRef idx="2">
-        <a:scrgbClr r="0" g="0" b="0"/>
-      </a:lnRef>
-      <a:fillRef idx="1">
-        <a:scrgbClr r="0" g="0" b="0"/>
-      </a:fillRef>
-      <a:effectRef idx="0">
-        <a:scrgbClr r="0" g="0" b="0"/>
-      </a:effectRef>
-      <a:fontRef idx="minor"/>
-    </dgm:style>
-  </dgm:styleLbl>
-  <dgm:styleLbl name="asst0">
-    <dgm:scene3d>
-      <a:camera prst="orthographicFront"/>
-      <a:lightRig rig="threePt" dir="t"/>
-    </dgm:scene3d>
-    <dgm:sp3d/>
-    <dgm:txPr/>
-    <dgm:style>
-      <a:lnRef idx="2">
-        <a:scrgbClr r="0" g="0" b="0"/>
-      </a:lnRef>
-      <a:fillRef idx="1">
-        <a:scrgbClr r="0" g="0" b="0"/>
-      </a:fillRef>
-      <a:effectRef idx="0">
-        <a:scrgbClr r="0" g="0" b="0"/>
-      </a:effectRef>
-      <a:fontRef idx="minor">
-        <a:schemeClr val="lt1"/>
-      </a:fontRef>
-    </dgm:style>
-  </dgm:styleLbl>
-  <dgm:styleLbl name="asst1">
-    <dgm:scene3d>
-      <a:camera prst="orthographicFront"/>
-      <a:lightRig rig="threePt" dir="t"/>
-    </dgm:scene3d>
-    <dgm:sp3d/>
-    <dgm:txPr/>
-    <dgm:style>
-      <a:lnRef idx="2">
-        <a:scrgbClr r="0" g="0" b="0"/>
-      </a:lnRef>
-      <a:fillRef idx="1">
-        <a:scrgbClr r="0" g="0" b="0"/>
-      </a:fillRef>
-      <a:effectRef idx="0">
-        <a:scrgbClr r="0" g="0" b="0"/>
-      </a:effectRef>
-      <a:fontRef idx="minor">
-        <a:schemeClr val="lt1"/>
-      </a:fontRef>
-    </dgm:style>
-  </dgm:styleLbl>
-  <dgm:styleLbl name="asst2">
-    <dgm:scene3d>
-      <a:camera prst="orthographicFront"/>
-      <a:lightRig rig="threePt" dir="t"/>
-    </dgm:scene3d>
-    <dgm:sp3d/>
-    <dgm:txPr/>
-    <dgm:style>
-      <a:lnRef idx="2">
-        <a:scrgbClr r="0" g="0" b="0"/>
-      </a:lnRef>
-      <a:fillRef idx="1">
-        <a:scrgbClr r="0" g="0" b="0"/>
-      </a:fillRef>
-      <a:effectRef idx="0">
-        <a:scrgbClr r="0" g="0" b="0"/>
-      </a:effectRef>
-      <a:fontRef idx="minor">
-        <a:schemeClr val="lt1"/>
-      </a:fontRef>
-    </dgm:style>
-  </dgm:styleLbl>
-  <dgm:styleLbl name="asst3">
-    <dgm:scene3d>
-      <a:camera prst="orthographicFront"/>
-      <a:lightRig rig="threePt" dir="t"/>
-    </dgm:scene3d>
-    <dgm:sp3d/>
-    <dgm:txPr/>
-    <dgm:style>
-      <a:lnRef idx="2">
-        <a:scrgbClr r="0" g="0" b="0"/>
-      </a:lnRef>
-      <a:fillRef idx="1">
-        <a:scrgbClr r="0" g="0" b="0"/>
-      </a:fillRef>
-      <a:effectRef idx="0">
-        <a:scrgbClr r="0" g="0" b="0"/>
-      </a:effectRef>
-      <a:fontRef idx="minor">
-        <a:schemeClr val="lt1"/>
-      </a:fontRef>
-    </dgm:style>
-  </dgm:styleLbl>
-  <dgm:styleLbl name="asst4">
-    <dgm:scene3d>
-      <a:camera prst="orthographicFront"/>
-      <a:lightRig rig="threePt" dir="t"/>
-    </dgm:scene3d>
-    <dgm:sp3d/>
-    <dgm:txPr/>
-    <dgm:style>
-      <a:lnRef idx="2">
-        <a:scrgbClr r="0" g="0" b="0"/>
-      </a:lnRef>
-      <a:fillRef idx="1">
-        <a:scrgbClr r="0" g="0" b="0"/>
-      </a:fillRef>
-      <a:effectRef idx="0">
-        <a:scrgbClr r="0" g="0" b="0"/>
-      </a:effectRef>
-      <a:fontRef idx="minor">
-        <a:schemeClr val="lt1"/>
-      </a:fontRef>
-    </dgm:style>
-  </dgm:styleLbl>
-  <dgm:styleLbl name="parChTrans2D1">
-    <dgm:scene3d>
-      <a:camera prst="orthographicFront"/>
-      <a:lightRig rig="threePt" dir="t"/>
-    </dgm:scene3d>
-    <dgm:sp3d/>
-    <dgm:txPr/>
-    <dgm:style>
-      <a:lnRef idx="2">
-        <a:scrgbClr r="0" g="0" b="0"/>
-      </a:lnRef>
-      <a:fillRef idx="1">
-        <a:scrgbClr r="0" g="0" b="0"/>
-      </a:fillRef>
-      <a:effectRef idx="0">
-        <a:scrgbClr r="0" g="0" b="0"/>
-      </a:effectRef>
-      <a:fontRef idx="minor">
-        <a:schemeClr val="lt1"/>
-      </a:fontRef>
-    </dgm:style>
-  </dgm:styleLbl>
-  <dgm:styleLbl name="parChTrans2D2">
-    <dgm:scene3d>
-      <a:camera prst="orthographicFront"/>
-      <a:lightRig rig="threePt" dir="t"/>
-    </dgm:scene3d>
-    <dgm:sp3d/>
-    <dgm:txPr/>
-    <dgm:style>
-      <a:lnRef idx="2">
-        <a:scrgbClr r="0" g="0" b="0"/>
-      </a:lnRef>
-      <a:fillRef idx="1">
-        <a:scrgbClr r="0" g="0" b="0"/>
-      </a:fillRef>
-      <a:effectRef idx="0">
-        <a:scrgbClr r="0" g="0" b="0"/>
-      </a:effectRef>
-      <a:fontRef idx="minor">
-        <a:schemeClr val="lt1"/>
-      </a:fontRef>
-    </dgm:style>
-  </dgm:styleLbl>
-  <dgm:styleLbl name="parChTrans2D3">
-    <dgm:scene3d>
-      <a:camera prst="orthographicFront"/>
-      <a:lightRig rig="threePt" dir="t"/>
-    </dgm:scene3d>
-    <dgm:sp3d/>
-    <dgm:txPr/>
-    <dgm:style>
-      <a:lnRef idx="2">
-        <a:scrgbClr r="0" g="0" b="0"/>
-      </a:lnRef>
-      <a:fillRef idx="1">
-        <a:scrgbClr r="0" g="0" b="0"/>
-      </a:fillRef>
-      <a:effectRef idx="0">
-        <a:scrgbClr r="0" g="0" b="0"/>
-      </a:effectRef>
-      <a:fontRef idx="minor">
-        <a:schemeClr val="lt1"/>
-      </a:fontRef>
-    </dgm:style>
-  </dgm:styleLbl>
-  <dgm:styleLbl name="parChTrans2D4">
-    <dgm:scene3d>
-      <a:camera prst="orthographicFront"/>
-      <a:lightRig rig="threePt" dir="t"/>
-    </dgm:scene3d>
-    <dgm:sp3d/>
-    <dgm:txPr/>
-    <dgm:style>
-      <a:lnRef idx="2">
-        <a:scrgbClr r="0" g="0" b="0"/>
-      </a:lnRef>
-      <a:fillRef idx="1">
-        <a:scrgbClr r="0" g="0" b="0"/>
-      </a:fillRef>
-      <a:effectRef idx="0">
-        <a:scrgbClr r="0" g="0" b="0"/>
-      </a:effectRef>
-      <a:fontRef idx="minor">
-        <a:schemeClr val="lt1"/>
-      </a:fontRef>
-    </dgm:style>
-  </dgm:styleLbl>
-  <dgm:styleLbl name="parChTrans1D1">
-    <dgm:scene3d>
-      <a:camera prst="orthographicFront"/>
-      <a:lightRig rig="threePt" dir="t"/>
-    </dgm:scene3d>
-    <dgm:sp3d/>
-    <dgm:txPr/>
-    <dgm:style>
-      <a:lnRef idx="2">
-        <a:scrgbClr r="0" g="0" b="0"/>
-      </a:lnRef>
-      <a:fillRef idx="0">
-        <a:scrgbClr r="0" g="0" b="0"/>
-      </a:fillRef>
-      <a:effectRef idx="0">
-        <a:scrgbClr r="0" g="0" b="0"/>
-      </a:effectRef>
-      <a:fontRef idx="minor"/>
-    </dgm:style>
-  </dgm:styleLbl>
-  <dgm:styleLbl name="parChTrans1D2">
-    <dgm:scene3d>
-      <a:camera prst="orthographicFront"/>
-      <a:lightRig rig="threePt" dir="t"/>
-    </dgm:scene3d>
-    <dgm:sp3d/>
-    <dgm:txPr/>
-    <dgm:style>
-      <a:lnRef idx="2">
-        <a:scrgbClr r="0" g="0" b="0"/>
-      </a:lnRef>
-      <a:fillRef idx="0">
-        <a:scrgbClr r="0" g="0" b="0"/>
-      </a:fillRef>
-      <a:effectRef idx="0">
-        <a:scrgbClr r="0" g="0" b="0"/>
-      </a:effectRef>
-      <a:fontRef idx="minor"/>
-    </dgm:style>
-  </dgm:styleLbl>
-  <dgm:styleLbl name="parChTrans1D3">
-    <dgm:scene3d>
-      <a:camera prst="orthographicFront"/>
-      <a:lightRig rig="threePt" dir="t"/>
-    </dgm:scene3d>
-    <dgm:sp3d/>
-    <dgm:txPr/>
-    <dgm:style>
-      <a:lnRef idx="2">
-        <a:scrgbClr r="0" g="0" b="0"/>
-      </a:lnRef>
-      <a:fillRef idx="0">
-        <a:scrgbClr r="0" g="0" b="0"/>
-      </a:fillRef>
-      <a:effectRef idx="0">
-        <a:scrgbClr r="0" g="0" b="0"/>
-      </a:effectRef>
-      <a:fontRef idx="minor"/>
-    </dgm:style>
-  </dgm:styleLbl>
-  <dgm:styleLbl name="parChTrans1D4">
-    <dgm:scene3d>
-      <a:camera prst="orthographicFront"/>
-      <a:lightRig rig="threePt" dir="t"/>
-    </dgm:scene3d>
-    <dgm:sp3d/>
-    <dgm:txPr/>
-    <dgm:style>
-      <a:lnRef idx="2">
-        <a:scrgbClr r="0" g="0" b="0"/>
-      </a:lnRef>
-      <a:fillRef idx="0">
-        <a:scrgbClr r="0" g="0" b="0"/>
-      </a:fillRef>
-      <a:effectRef idx="0">
-        <a:scrgbClr r="0" g="0" b="0"/>
-      </a:effectRef>
-      <a:fontRef idx="minor"/>
-    </dgm:style>
-  </dgm:styleLbl>
-  <dgm:styleLbl name="fgAcc1">
-    <dgm:scene3d>
-      <a:camera prst="orthographicFront"/>
-      <a:lightRig rig="threePt" dir="t"/>
-    </dgm:scene3d>
-    <dgm:sp3d/>
-    <dgm:txPr/>
-    <dgm:style>
-      <a:lnRef idx="2">
-        <a:scrgbClr r="0" g="0" b="0"/>
-      </a:lnRef>
-      <a:fillRef idx="1">
-        <a:scrgbClr r="0" g="0" b="0"/>
-      </a:fillRef>
-      <a:effectRef idx="0">
-        <a:scrgbClr r="0" g="0" b="0"/>
-      </a:effectRef>
-      <a:fontRef idx="minor"/>
-    </dgm:style>
-  </dgm:styleLbl>
-  <dgm:styleLbl name="conFgAcc1">
-    <dgm:scene3d>
-      <a:camera prst="orthographicFront"/>
-      <a:lightRig rig="threePt" dir="t"/>
-    </dgm:scene3d>
-    <dgm:sp3d/>
-    <dgm:txPr/>
-    <dgm:style>
-      <a:lnRef idx="2">
-        <a:scrgbClr r="0" g="0" b="0"/>
-      </a:lnRef>
-      <a:fillRef idx="1">
-        <a:scrgbClr r="0" g="0" b="0"/>
-      </a:fillRef>
-      <a:effectRef idx="0">
-        <a:scrgbClr r="0" g="0" b="0"/>
-      </a:effectRef>
-      <a:fontRef idx="minor"/>
-    </dgm:style>
-  </dgm:styleLbl>
-  <dgm:styleLbl name="alignAcc1">
-    <dgm:scene3d>
-      <a:camera prst="orthographicFront"/>
-      <a:lightRig rig="threePt" dir="t"/>
-    </dgm:scene3d>
-    <dgm:sp3d/>
-    <dgm:txPr/>
-    <dgm:style>
-      <a:lnRef idx="2">
-        <a:scrgbClr r="0" g="0" b="0"/>
-      </a:lnRef>
-      <a:fillRef idx="1">
-        <a:scrgbClr r="0" g="0" b="0"/>
-      </a:fillRef>
-      <a:effectRef idx="0">
-        <a:scrgbClr r="0" g="0" b="0"/>
-      </a:effectRef>
-      <a:fontRef idx="minor"/>
-    </dgm:style>
-  </dgm:styleLbl>
-  <dgm:styleLbl name="trAlignAcc1">
-    <dgm:scene3d>
-      <a:camera prst="orthographicFront"/>
-      <a:lightRig rig="threePt" dir="t"/>
-    </dgm:scene3d>
-    <dgm:sp3d/>
-    <dgm:txPr/>
-    <dgm:style>
-      <a:lnRef idx="1">
-        <a:scrgbClr r="0" g="0" b="0"/>
-      </a:lnRef>
-      <a:fillRef idx="1">
-        <a:scrgbClr r="0" g="0" b="0"/>
-      </a:fillRef>
-      <a:effectRef idx="0">
-        <a:scrgbClr r="0" g="0" b="0"/>
-      </a:effectRef>
-      <a:fontRef idx="minor"/>
-    </dgm:style>
-  </dgm:styleLbl>
-  <dgm:styleLbl name="bgAcc1">
-    <dgm:scene3d>
-      <a:camera prst="orthographicFront"/>
-      <a:lightRig rig="threePt" dir="t"/>
-    </dgm:scene3d>
-    <dgm:sp3d/>
-    <dgm:txPr/>
-    <dgm:style>
-      <a:lnRef idx="2">
-        <a:scrgbClr r="0" g="0" b="0"/>
-      </a:lnRef>
-      <a:fillRef idx="1">
-        <a:scrgbClr r="0" g="0" b="0"/>
-      </a:fillRef>
-      <a:effectRef idx="0">
-        <a:scrgbClr r="0" g="0" b="0"/>
-      </a:effectRef>
-      <a:fontRef idx="minor"/>
-    </dgm:style>
-  </dgm:styleLbl>
-  <dgm:styleLbl name="solidFgAcc1">
-    <dgm:scene3d>
-      <a:camera prst="orthographicFront"/>
-      <a:lightRig rig="threePt" dir="t"/>
-    </dgm:scene3d>
-    <dgm:sp3d/>
-    <dgm:txPr/>
-    <dgm:style>
-      <a:lnRef idx="2">
-        <a:scrgbClr r="0" g="0" b="0"/>
-      </a:lnRef>
-      <a:fillRef idx="1">
-        <a:scrgbClr r="0" g="0" b="0"/>
-      </a:fillRef>
-      <a:effectRef idx="0">
-        <a:scrgbClr r="0" g="0" b="0"/>
-      </a:effectRef>
-      <a:fontRef idx="minor"/>
-    </dgm:style>
-  </dgm:styleLbl>
-  <dgm:styleLbl name="solidAlignAcc1">
-    <dgm:scene3d>
-      <a:camera prst="orthographicFront"/>
-      <a:lightRig rig="threePt" dir="t"/>
-    </dgm:scene3d>
-    <dgm:sp3d/>
-    <dgm:txPr/>
-    <dgm:style>
-      <a:lnRef idx="2">
-        <a:scrgbClr r="0" g="0" b="0"/>
-      </a:lnRef>
-      <a:fillRef idx="1">
-        <a:scrgbClr r="0" g="0" b="0"/>
-      </a:fillRef>
-      <a:effectRef idx="0">
-        <a:scrgbClr r="0" g="0" b="0"/>
-      </a:effectRef>
-      <a:fontRef idx="minor"/>
-    </dgm:style>
-  </dgm:styleLbl>
-  <dgm:styleLbl name="solidBgAcc1">
-    <dgm:scene3d>
-      <a:camera prst="orthographicFront"/>
-      <a:lightRig rig="threePt" dir="t"/>
-    </dgm:scene3d>
-    <dgm:sp3d/>
-    <dgm:txPr/>
-    <dgm:style>
-      <a:lnRef idx="2">
-        <a:scrgbClr r="0" g="0" b="0"/>
-      </a:lnRef>
-      <a:fillRef idx="1">
-        <a:scrgbClr r="0" g="0" b="0"/>
-      </a:fillRef>
-      <a:effectRef idx="0">
-        <a:scrgbClr r="0" g="0" b="0"/>
-      </a:effectRef>
-      <a:fontRef idx="minor"/>
-    </dgm:style>
-  </dgm:styleLbl>
-  <dgm:styleLbl name="fgAccFollowNode1">
-    <dgm:scene3d>
-      <a:camera prst="orthographicFront"/>
-      <a:lightRig rig="threePt" dir="t"/>
-    </dgm:scene3d>
-    <dgm:sp3d/>
-    <dgm:txPr/>
-    <dgm:style>
-      <a:lnRef idx="2">
-        <a:scrgbClr r="0" g="0" b="0"/>
-      </a:lnRef>
-      <a:fillRef idx="1">
-        <a:scrgbClr r="0" g="0" b="0"/>
-      </a:fillRef>
-      <a:effectRef idx="0">
-        <a:scrgbClr r="0" g="0" b="0"/>
-      </a:effectRef>
-      <a:fontRef idx="minor"/>
-    </dgm:style>
-  </dgm:styleLbl>
-  <dgm:styleLbl name="alignAccFollowNode1">
-    <dgm:scene3d>
-      <a:camera prst="orthographicFront"/>
-      <a:lightRig rig="threePt" dir="t"/>
-    </dgm:scene3d>
-    <dgm:sp3d/>
-    <dgm:txPr/>
-    <dgm:style>
-      <a:lnRef idx="2">
-        <a:scrgbClr r="0" g="0" b="0"/>
-      </a:lnRef>
-      <a:fillRef idx="1">
-        <a:scrgbClr r="0" g="0" b="0"/>
-      </a:fillRef>
-      <a:effectRef idx="0">
-        <a:scrgbClr r="0" g="0" b="0"/>
-      </a:effectRef>
-      <a:fontRef idx="minor"/>
-    </dgm:style>
-  </dgm:styleLbl>
-  <dgm:styleLbl name="bgAccFollowNode1">
-    <dgm:scene3d>
-      <a:camera prst="orthographicFront"/>
-      <a:lightRig rig="threePt" dir="t"/>
-    </dgm:scene3d>
-    <dgm:sp3d/>
-    <dgm:txPr/>
-    <dgm:style>
-      <a:lnRef idx="2">
-        <a:scrgbClr r="0" g="0" b="0"/>
-      </a:lnRef>
-      <a:fillRef idx="1">
-        <a:scrgbClr r="0" g="0" b="0"/>
-      </a:fillRef>
-      <a:effectRef idx="0">
-        <a:scrgbClr r="0" g="0" b="0"/>
-      </a:effectRef>
-      <a:fontRef idx="minor"/>
-    </dgm:style>
-  </dgm:styleLbl>
-  <dgm:styleLbl name="fgAcc0">
-    <dgm:scene3d>
-      <a:camera prst="orthographicFront"/>
-      <a:lightRig rig="threePt" dir="t"/>
-    </dgm:scene3d>
-    <dgm:sp3d/>
-    <dgm:txPr/>
-    <dgm:style>
-      <a:lnRef idx="2">
-        <a:scrgbClr r="0" g="0" b="0"/>
-      </a:lnRef>
-      <a:fillRef idx="1">
-        <a:scrgbClr r="0" g="0" b="0"/>
-      </a:fillRef>
-      <a:effectRef idx="0">
-        <a:scrgbClr r="0" g="0" b="0"/>
-      </a:effectRef>
-      <a:fontRef idx="minor"/>
-    </dgm:style>
-  </dgm:styleLbl>
-  <dgm:styleLbl name="fgAcc2">
-    <dgm:scene3d>
-      <a:camera prst="orthographicFront"/>
-      <a:lightRig rig="threePt" dir="t"/>
-    </dgm:scene3d>
-    <dgm:sp3d/>
-    <dgm:txPr/>
-    <dgm:style>
-      <a:lnRef idx="2">
-        <a:scrgbClr r="0" g="0" b="0"/>
-      </a:lnRef>
-      <a:fillRef idx="1">
-        <a:scrgbClr r="0" g="0" b="0"/>
-      </a:fillRef>
-      <a:effectRef idx="0">
-        <a:scrgbClr r="0" g="0" b="0"/>
-      </a:effectRef>
-      <a:fontRef idx="minor"/>
-    </dgm:style>
-  </dgm:styleLbl>
-  <dgm:styleLbl name="fgAcc3">
-    <dgm:scene3d>
-      <a:camera prst="orthographicFront"/>
-      <a:lightRig rig="threePt" dir="t"/>
-    </dgm:scene3d>
-    <dgm:sp3d/>
-    <dgm:txPr/>
-    <dgm:style>
-      <a:lnRef idx="2">
-        <a:scrgbClr r="0" g="0" b="0"/>
-      </a:lnRef>
-      <a:fillRef idx="1">
-        <a:scrgbClr r="0" g="0" b="0"/>
-      </a:fillRef>
-      <a:effectRef idx="0">
-        <a:scrgbClr r="0" g="0" b="0"/>
-      </a:effectRef>
-      <a:fontRef idx="minor"/>
-    </dgm:style>
-  </dgm:styleLbl>
-  <dgm:styleLbl name="fgAcc4">
-    <dgm:scene3d>
-      <a:camera prst="orthographicFront"/>
-      <a:lightRig rig="threePt" dir="t"/>
-    </dgm:scene3d>
-    <dgm:sp3d/>
-    <dgm:txPr/>
-    <dgm:style>
-      <a:lnRef idx="2">
-        <a:scrgbClr r="0" g="0" b="0"/>
-      </a:lnRef>
-      <a:fillRef idx="1">
-        <a:scrgbClr r="0" g="0" b="0"/>
-      </a:fillRef>
-      <a:effectRef idx="0">
-        <a:scrgbClr r="0" g="0" b="0"/>
-      </a:effectRef>
-      <a:fontRef idx="minor"/>
-    </dgm:style>
-  </dgm:styleLbl>
-  <dgm:styleLbl name="bgShp">
-    <dgm:scene3d>
-      <a:camera prst="orthographicFront"/>
-      <a:lightRig rig="threePt" dir="t"/>
-    </dgm:scene3d>
-    <dgm:sp3d/>
-    <dgm:txPr/>
-    <dgm:style>
-      <a:lnRef idx="0">
-        <a:scrgbClr r="0" g="0" b="0"/>
-      </a:lnRef>
-      <a:fillRef idx="1">
-        <a:scrgbClr r="0" g="0" b="0"/>
-      </a:fillRef>
-      <a:effectRef idx="0">
-        <a:scrgbClr r="0" g="0" b="0"/>
-      </a:effectRef>
-      <a:fontRef idx="minor"/>
-    </dgm:style>
-  </dgm:styleLbl>
-  <dgm:styleLbl name="dkBgShp">
-    <dgm:scene3d>
-      <a:camera prst="orthographicFront"/>
-      <a:lightRig rig="threePt" dir="t"/>
-    </dgm:scene3d>
-    <dgm:sp3d/>
-    <dgm:txPr/>
-    <dgm:style>
-      <a:lnRef idx="0">
-        <a:scrgbClr r="0" g="0" b="0"/>
-      </a:lnRef>
-      <a:fillRef idx="1">
-        <a:scrgbClr r="0" g="0" b="0"/>
-      </a:fillRef>
-      <a:effectRef idx="0">
-        <a:scrgbClr r="0" g="0" b="0"/>
-      </a:effectRef>
-      <a:fontRef idx="minor"/>
-    </dgm:style>
-  </dgm:styleLbl>
-  <dgm:styleLbl name="trBgShp">
-    <dgm:scene3d>
-      <a:camera prst="orthographicFront"/>
-      <a:lightRig rig="threePt" dir="t"/>
-    </dgm:scene3d>
-    <dgm:sp3d/>
-    <dgm:txPr/>
-    <dgm:style>
-      <a:lnRef idx="0">
-        <a:scrgbClr r="0" g="0" b="0"/>
-      </a:lnRef>
-      <a:fillRef idx="1">
-        <a:scrgbClr r="0" g="0" b="0"/>
-      </a:fillRef>
-      <a:effectRef idx="0">
-        <a:scrgbClr r="0" g="0" b="0"/>
-      </a:effectRef>
-      <a:fontRef idx="minor"/>
-    </dgm:style>
-  </dgm:styleLbl>
-  <dgm:styleLbl name="fgShp">
-    <dgm:scene3d>
-      <a:camera prst="orthographicFront"/>
-      <a:lightRig rig="threePt" dir="t"/>
-    </dgm:scene3d>
-    <dgm:sp3d/>
-    <dgm:txPr/>
-    <dgm:style>
-      <a:lnRef idx="2">
-        <a:scrgbClr r="0" g="0" b="0"/>
-      </a:lnRef>
-      <a:fillRef idx="1">
-        <a:scrgbClr r="0" g="0" b="0"/>
-      </a:fillRef>
-      <a:effectRef idx="0">
-        <a:scrgbClr r="0" g="0" b="0"/>
-      </a:effectRef>
-      <a:fontRef idx="minor"/>
-    </dgm:style>
-  </dgm:styleLbl>
-  <dgm:styleLbl name="revTx">
-    <dgm:scene3d>
-      <a:camera prst="orthographicFront"/>
-      <a:lightRig rig="threePt" dir="t"/>
-    </dgm:scene3d>
-    <dgm:sp3d/>
-    <dgm:txPr/>
-    <dgm:style>
-      <a:lnRef idx="0">
-        <a:scrgbClr r="0" g="0" b="0"/>
-      </a:lnRef>
-      <a:fillRef idx="0">
-        <a:scrgbClr r="0" g="0" b="0"/>
-      </a:fillRef>
-      <a:effectRef idx="0">
-        <a:scrgbClr r="0" g="0" b="0"/>
-      </a:effectRef>
-      <a:fontRef idx="minor"/>
-    </dgm:style>
-  </dgm:styleLbl>
-</dgm:styleDef>
-</file>
-
-<file path=ppt/diagrams/quickStyle7.xml><?xml version="1.0" encoding="utf-8"?>
 <dgm:styleDef xmlns:dgm="http://schemas.openxmlformats.org/drawingml/2006/diagram" xmlns:a="http://schemas.openxmlformats.org/drawingml/2006/main" uniqueId="urn:microsoft.com/office/officeart/2005/8/quickstyle/simple1">
   <dgm:title val=""/>
   <dgm:desc val=""/>
@@ -31312,67 +28483,6 @@
           <a:chExt cx="0" cy="0"/>
         </a:xfrm>
       </p:grpSpPr>
-      <p:graphicFrame>
-        <p:nvGraphicFramePr>
-          <p:cNvPr id="4" name="Content Placeholder 3">
-            <a:extLst>
-              <a:ext uri="{FF2B5EF4-FFF2-40B4-BE49-F238E27FC236}">
-                <a16:creationId xmlns:a16="http://schemas.microsoft.com/office/drawing/2014/main" id="{E59EE799-D428-B18B-F941-8E4F96844163}"/>
-              </a:ext>
-            </a:extLst>
-          </p:cNvPr>
-          <p:cNvGraphicFramePr>
-            <a:graphicFrameLocks noGrp="1"/>
-          </p:cNvGraphicFramePr>
-          <p:nvPr>
-            <p:ph idx="1"/>
-            <p:extLst>
-              <p:ext uri="{D42A27DB-BD31-4B8C-83A1-F6EECF244321}">
-                <p14:modId xmlns:p14="http://schemas.microsoft.com/office/powerpoint/2010/main" val="274332087"/>
-              </p:ext>
-            </p:extLst>
-          </p:nvPr>
-        </p:nvGraphicFramePr>
-        <p:xfrm>
-          <a:off x="838200" y="365125"/>
-          <a:ext cx="10515600" cy="5811838"/>
-        </p:xfrm>
-        <a:graphic>
-          <a:graphicData uri="http://schemas.openxmlformats.org/drawingml/2006/diagram">
-            <dgm:relIds xmlns:dgm="http://schemas.openxmlformats.org/drawingml/2006/diagram" xmlns:r="http://schemas.openxmlformats.org/officeDocument/2006/relationships" r:dm="rId2" r:lo="rId3" r:qs="rId4" r:cs="rId5"/>
-          </a:graphicData>
-        </a:graphic>
-      </p:graphicFrame>
-    </p:spTree>
-    <p:extLst>
-      <p:ext uri="{BB962C8B-B14F-4D97-AF65-F5344CB8AC3E}">
-        <p14:creationId xmlns:p14="http://schemas.microsoft.com/office/powerpoint/2010/main" val="3404919231"/>
-      </p:ext>
-    </p:extLst>
-  </p:cSld>
-  <p:clrMapOvr>
-    <a:masterClrMapping/>
-  </p:clrMapOvr>
-</p:sld>
-</file>
-
-<file path=ppt/slides/slide11.xml><?xml version="1.0" encoding="utf-8"?>
-<p:sld xmlns:a="http://schemas.openxmlformats.org/drawingml/2006/main" xmlns:r="http://schemas.openxmlformats.org/officeDocument/2006/relationships" xmlns:p="http://schemas.openxmlformats.org/presentationml/2006/main">
-  <p:cSld>
-    <p:spTree>
-      <p:nvGrpSpPr>
-        <p:cNvPr id="1" name=""/>
-        <p:cNvGrpSpPr/>
-        <p:nvPr/>
-      </p:nvGrpSpPr>
-      <p:grpSpPr>
-        <a:xfrm>
-          <a:off x="0" y="0"/>
-          <a:ext cx="0" cy="0"/>
-          <a:chOff x="0" y="0"/>
-          <a:chExt cx="0" cy="0"/>
-        </a:xfrm>
-      </p:grpSpPr>
       <p:sp>
         <p:nvSpPr>
           <p:cNvPr id="2" name="Title 1">
@@ -31887,7 +28997,7 @@
             <p:ph idx="1"/>
             <p:extLst>
               <p:ext uri="{D42A27DB-BD31-4B8C-83A1-F6EECF244321}">
-                <p14:modId xmlns:p14="http://schemas.microsoft.com/office/powerpoint/2010/main" val="3271478108"/>
+                <p14:modId xmlns:p14="http://schemas.microsoft.com/office/powerpoint/2010/main" val="3124720445"/>
               </p:ext>
             </p:extLst>
           </p:nvPr>
@@ -31905,7 +29015,7 @@
     </p:spTree>
     <p:extLst>
       <p:ext uri="{BB962C8B-B14F-4D97-AF65-F5344CB8AC3E}">
-        <p14:creationId xmlns:p14="http://schemas.microsoft.com/office/powerpoint/2010/main" val="222123436"/>
+        <p14:creationId xmlns:p14="http://schemas.microsoft.com/office/powerpoint/2010/main" val="310869083"/>
       </p:ext>
     </p:extLst>
   </p:cSld>
@@ -31948,7 +29058,7 @@
             <p:ph idx="1"/>
             <p:extLst>
               <p:ext uri="{D42A27DB-BD31-4B8C-83A1-F6EECF244321}">
-                <p14:modId xmlns:p14="http://schemas.microsoft.com/office/powerpoint/2010/main" val="3124720445"/>
+                <p14:modId xmlns:p14="http://schemas.microsoft.com/office/powerpoint/2010/main" val="274332087"/>
               </p:ext>
             </p:extLst>
           </p:nvPr>
@@ -31966,7 +29076,7 @@
     </p:spTree>
     <p:extLst>
       <p:ext uri="{BB962C8B-B14F-4D97-AF65-F5344CB8AC3E}">
-        <p14:creationId xmlns:p14="http://schemas.microsoft.com/office/powerpoint/2010/main" val="310869083"/>
+        <p14:creationId xmlns:p14="http://schemas.microsoft.com/office/powerpoint/2010/main" val="3404919231"/>
       </p:ext>
     </p:extLst>
   </p:cSld>

</xml_diff>

<commit_message>
Added fixes for profile settings
</commit_message>
<xml_diff>
--- a/Official/Design.pptx
+++ b/Official/Design.pptx
@@ -5245,10 +5245,24 @@
     <dgm:pt modelId="{57A8CB2D-79BE-4C74-9A37-D6A913DE1B82}" type="parTrans" cxnId="{C81E8C91-5EF5-45E9-ACD4-E449A9809B80}">
       <dgm:prSet/>
       <dgm:spPr/>
+      <dgm:t>
+        <a:bodyPr/>
+        <a:lstStyle/>
+        <a:p>
+          <a:endParaRPr lang="en-PH"/>
+        </a:p>
+      </dgm:t>
     </dgm:pt>
     <dgm:pt modelId="{6A058D6F-D207-4F81-A3FF-D70611BE6534}" type="sibTrans" cxnId="{C81E8C91-5EF5-45E9-ACD4-E449A9809B80}">
       <dgm:prSet/>
       <dgm:spPr/>
+      <dgm:t>
+        <a:bodyPr/>
+        <a:lstStyle/>
+        <a:p>
+          <a:endParaRPr lang="en-PH"/>
+        </a:p>
+      </dgm:t>
     </dgm:pt>
     <dgm:pt modelId="{DE023E0B-5C31-4E35-A101-3DA3908C072F}">
       <dgm:prSet phldrT="[Text]"/>
@@ -5267,10 +5281,24 @@
     <dgm:pt modelId="{967C17FD-B87B-4CD0-BD44-345E2E5D2EA3}" type="parTrans" cxnId="{F812C254-ECB2-457A-B2DD-0DA61683069B}">
       <dgm:prSet/>
       <dgm:spPr/>
+      <dgm:t>
+        <a:bodyPr/>
+        <a:lstStyle/>
+        <a:p>
+          <a:endParaRPr lang="en-PH"/>
+        </a:p>
+      </dgm:t>
     </dgm:pt>
     <dgm:pt modelId="{8A9ACAAE-236A-4C50-8D2E-022C95250F55}" type="sibTrans" cxnId="{F812C254-ECB2-457A-B2DD-0DA61683069B}">
       <dgm:prSet/>
       <dgm:spPr/>
+      <dgm:t>
+        <a:bodyPr/>
+        <a:lstStyle/>
+        <a:p>
+          <a:endParaRPr lang="en-PH"/>
+        </a:p>
+      </dgm:t>
     </dgm:pt>
     <dgm:pt modelId="{10F04DDC-9425-470F-8153-E7CB032EC473}">
       <dgm:prSet phldrT="[Text]"/>
@@ -5362,10 +5390,136 @@
     <dgm:pt modelId="{3930E226-FA6F-40B0-905E-754A21C6644C}" type="parTrans" cxnId="{A379DEAC-9ED6-46D7-BA90-0F0F0114656E}">
       <dgm:prSet/>
       <dgm:spPr/>
+      <dgm:t>
+        <a:bodyPr/>
+        <a:lstStyle/>
+        <a:p>
+          <a:endParaRPr lang="en-PH"/>
+        </a:p>
+      </dgm:t>
     </dgm:pt>
     <dgm:pt modelId="{CBA63FA3-5470-4234-A511-234C76F1D9FA}" type="sibTrans" cxnId="{A379DEAC-9ED6-46D7-BA90-0F0F0114656E}">
       <dgm:prSet/>
       <dgm:spPr/>
+      <dgm:t>
+        <a:bodyPr/>
+        <a:lstStyle/>
+        <a:p>
+          <a:endParaRPr lang="en-PH"/>
+        </a:p>
+      </dgm:t>
+    </dgm:pt>
+    <dgm:pt modelId="{28ACC96C-DAEE-4690-912C-9633C398023B}">
+      <dgm:prSet phldrT="[Text]"/>
+      <dgm:spPr/>
+      <dgm:t>
+        <a:bodyPr/>
+        <a:lstStyle/>
+        <a:p>
+          <a:r>
+            <a:rPr lang="en-PH" i="0" u="none" dirty="0"/>
+            <a:t>NONE: /validate</a:t>
+          </a:r>
+        </a:p>
+      </dgm:t>
+    </dgm:pt>
+    <dgm:pt modelId="{B0804064-996B-41FA-9EBA-EC56EBF3506F}" type="parTrans" cxnId="{7E7EDEA4-6763-40BA-82A3-4F093EFBF7FD}">
+      <dgm:prSet/>
+      <dgm:spPr/>
+      <dgm:t>
+        <a:bodyPr/>
+        <a:lstStyle/>
+        <a:p>
+          <a:endParaRPr lang="en-PH"/>
+        </a:p>
+      </dgm:t>
+    </dgm:pt>
+    <dgm:pt modelId="{8AF9705A-3B07-4438-A2D1-1293791B0AE2}" type="sibTrans" cxnId="{7E7EDEA4-6763-40BA-82A3-4F093EFBF7FD}">
+      <dgm:prSet/>
+      <dgm:spPr/>
+      <dgm:t>
+        <a:bodyPr/>
+        <a:lstStyle/>
+        <a:p>
+          <a:endParaRPr lang="en-PH"/>
+        </a:p>
+      </dgm:t>
+    </dgm:pt>
+    <dgm:pt modelId="{197668C4-8212-48B8-A54E-73002176A9B9}">
+      <dgm:prSet phldrT="[Text]"/>
+      <dgm:spPr/>
+      <dgm:t>
+        <a:bodyPr/>
+        <a:lstStyle/>
+        <a:p>
+          <a:r>
+            <a:rPr lang="en-PH" i="0" u="none" dirty="0"/>
+            <a:t>POST: /validate/password</a:t>
+          </a:r>
+        </a:p>
+      </dgm:t>
+    </dgm:pt>
+    <dgm:pt modelId="{AD5EE0EA-60D1-43DE-980D-E1501EFCEDE7}" type="parTrans" cxnId="{902876D9-9133-4A48-8398-C7CAAFB05485}">
+      <dgm:prSet/>
+      <dgm:spPr/>
+      <dgm:t>
+        <a:bodyPr/>
+        <a:lstStyle/>
+        <a:p>
+          <a:endParaRPr lang="en-PH"/>
+        </a:p>
+      </dgm:t>
+    </dgm:pt>
+    <dgm:pt modelId="{ABDB2C2B-782E-4029-89BE-6E5CBB30B114}" type="sibTrans" cxnId="{902876D9-9133-4A48-8398-C7CAAFB05485}">
+      <dgm:prSet/>
+      <dgm:spPr/>
+      <dgm:t>
+        <a:bodyPr/>
+        <a:lstStyle/>
+        <a:p>
+          <a:endParaRPr lang="en-PH"/>
+        </a:p>
+      </dgm:t>
+    </dgm:pt>
+    <dgm:pt modelId="{5DF6C11B-377F-47FB-BC50-A7E3E32B7B43}">
+      <dgm:prSet phldrT="[Text]"/>
+      <dgm:spPr/>
+      <dgm:t>
+        <a:bodyPr/>
+        <a:lstStyle/>
+        <a:p>
+          <a:r>
+            <a:rPr lang="en-PH" i="0" u="none"/>
+            <a:t>POST: </a:t>
+          </a:r>
+          <a:r>
+            <a:rPr lang="en-PH" i="0" u="none" dirty="0"/>
+            <a:t>/validate/username</a:t>
+          </a:r>
+        </a:p>
+      </dgm:t>
+    </dgm:pt>
+    <dgm:pt modelId="{D672805F-D531-46CA-8240-38805655CA82}" type="parTrans" cxnId="{4FDFA2ED-B79E-47AF-A7D1-362FF3E41002}">
+      <dgm:prSet/>
+      <dgm:spPr/>
+      <dgm:t>
+        <a:bodyPr/>
+        <a:lstStyle/>
+        <a:p>
+          <a:endParaRPr lang="en-PH"/>
+        </a:p>
+      </dgm:t>
+    </dgm:pt>
+    <dgm:pt modelId="{02CB11EC-9DE7-441C-B4FD-6C7BD018BCA0}" type="sibTrans" cxnId="{4FDFA2ED-B79E-47AF-A7D1-362FF3E41002}">
+      <dgm:prSet/>
+      <dgm:spPr/>
+      <dgm:t>
+        <a:bodyPr/>
+        <a:lstStyle/>
+        <a:p>
+          <a:endParaRPr lang="en-PH"/>
+        </a:p>
+      </dgm:t>
     </dgm:pt>
     <dgm:pt modelId="{5F3FAA4C-44A3-470C-81C5-23BB7113FF75}" type="pres">
       <dgm:prSet presAssocID="{34BEB75E-ED6D-4113-9F50-1BF5F1954990}" presName="hierChild1" presStyleCnt="0">
@@ -5409,7 +5563,7 @@
       <dgm:spPr/>
     </dgm:pt>
     <dgm:pt modelId="{EA35908A-375B-4EF7-A17D-476DA652899F}" type="pres">
-      <dgm:prSet presAssocID="{A1698A36-C129-4FA1-BE7D-9B591DCFED6F}" presName="Name37" presStyleLbl="parChTrans1D2" presStyleIdx="0" presStyleCnt="7"/>
+      <dgm:prSet presAssocID="{A1698A36-C129-4FA1-BE7D-9B591DCFED6F}" presName="Name37" presStyleLbl="parChTrans1D2" presStyleIdx="0" presStyleCnt="8"/>
       <dgm:spPr/>
     </dgm:pt>
     <dgm:pt modelId="{6E4757AA-5F66-4D17-9F4E-EAD6DC00EEBB}" type="pres">
@@ -5425,7 +5579,7 @@
       <dgm:spPr/>
     </dgm:pt>
     <dgm:pt modelId="{AE1DD6B5-8922-4162-945A-41BF7A420F55}" type="pres">
-      <dgm:prSet presAssocID="{EF6B1CB1-4266-4EA5-804A-ACC48ED2EE3D}" presName="rootText" presStyleLbl="node2" presStyleIdx="0" presStyleCnt="7">
+      <dgm:prSet presAssocID="{EF6B1CB1-4266-4EA5-804A-ACC48ED2EE3D}" presName="rootText" presStyleLbl="node2" presStyleIdx="0" presStyleCnt="8">
         <dgm:presLayoutVars>
           <dgm:chPref val="3"/>
         </dgm:presLayoutVars>
@@ -5433,7 +5587,7 @@
       <dgm:spPr/>
     </dgm:pt>
     <dgm:pt modelId="{F18F04F2-ED04-4331-853F-808462CDAC9B}" type="pres">
-      <dgm:prSet presAssocID="{EF6B1CB1-4266-4EA5-804A-ACC48ED2EE3D}" presName="rootConnector" presStyleLbl="node2" presStyleIdx="0" presStyleCnt="7"/>
+      <dgm:prSet presAssocID="{EF6B1CB1-4266-4EA5-804A-ACC48ED2EE3D}" presName="rootConnector" presStyleLbl="node2" presStyleIdx="0" presStyleCnt="8"/>
       <dgm:spPr/>
     </dgm:pt>
     <dgm:pt modelId="{DB4FE243-CE1E-43FF-80E2-4160B5F6B3D7}" type="pres">
@@ -5441,7 +5595,7 @@
       <dgm:spPr/>
     </dgm:pt>
     <dgm:pt modelId="{32554A9C-FE4D-43F7-AEE1-C54D9D75C200}" type="pres">
-      <dgm:prSet presAssocID="{E8EB6F71-72ED-410E-A6D6-688CC4C8622F}" presName="Name37" presStyleLbl="parChTrans1D3" presStyleIdx="0" presStyleCnt="11"/>
+      <dgm:prSet presAssocID="{E8EB6F71-72ED-410E-A6D6-688CC4C8622F}" presName="Name37" presStyleLbl="parChTrans1D3" presStyleIdx="0" presStyleCnt="13"/>
       <dgm:spPr/>
     </dgm:pt>
     <dgm:pt modelId="{B90CC990-B130-4339-9559-D69CF90E88B4}" type="pres">
@@ -5457,7 +5611,7 @@
       <dgm:spPr/>
     </dgm:pt>
     <dgm:pt modelId="{3C293340-5887-41DE-859C-77675150C6EB}" type="pres">
-      <dgm:prSet presAssocID="{028C5DFA-CD08-425A-9808-BE49C21D580B}" presName="rootText" presStyleLbl="node3" presStyleIdx="0" presStyleCnt="11">
+      <dgm:prSet presAssocID="{028C5DFA-CD08-425A-9808-BE49C21D580B}" presName="rootText" presStyleLbl="node3" presStyleIdx="0" presStyleCnt="13">
         <dgm:presLayoutVars>
           <dgm:chPref val="3"/>
         </dgm:presLayoutVars>
@@ -5465,7 +5619,7 @@
       <dgm:spPr/>
     </dgm:pt>
     <dgm:pt modelId="{31730A28-5687-49A7-9084-9821AA2323E9}" type="pres">
-      <dgm:prSet presAssocID="{028C5DFA-CD08-425A-9808-BE49C21D580B}" presName="rootConnector" presStyleLbl="node3" presStyleIdx="0" presStyleCnt="11"/>
+      <dgm:prSet presAssocID="{028C5DFA-CD08-425A-9808-BE49C21D580B}" presName="rootConnector" presStyleLbl="node3" presStyleIdx="0" presStyleCnt="13"/>
       <dgm:spPr/>
     </dgm:pt>
     <dgm:pt modelId="{854997E6-49AF-48D8-846F-0DF8A234610E}" type="pres">
@@ -5481,7 +5635,7 @@
       <dgm:spPr/>
     </dgm:pt>
     <dgm:pt modelId="{940D3546-6031-400F-B1CF-0A05124CD0AE}" type="pres">
-      <dgm:prSet presAssocID="{B829E806-E11E-4BDA-8589-5EF437FD4FD6}" presName="Name37" presStyleLbl="parChTrans1D2" presStyleIdx="1" presStyleCnt="7"/>
+      <dgm:prSet presAssocID="{B829E806-E11E-4BDA-8589-5EF437FD4FD6}" presName="Name37" presStyleLbl="parChTrans1D2" presStyleIdx="1" presStyleCnt="8"/>
       <dgm:spPr/>
     </dgm:pt>
     <dgm:pt modelId="{2489C89A-47E0-4AA9-91DA-D3C26C334189}" type="pres">
@@ -5497,7 +5651,7 @@
       <dgm:spPr/>
     </dgm:pt>
     <dgm:pt modelId="{1FCFCB3A-B4C7-413C-B6B5-18473C4E0215}" type="pres">
-      <dgm:prSet presAssocID="{98DE5844-EBFB-4ECB-843E-1E3C116CD0A7}" presName="rootText" presStyleLbl="node2" presStyleIdx="1" presStyleCnt="7">
+      <dgm:prSet presAssocID="{98DE5844-EBFB-4ECB-843E-1E3C116CD0A7}" presName="rootText" presStyleLbl="node2" presStyleIdx="1" presStyleCnt="8">
         <dgm:presLayoutVars>
           <dgm:chPref val="3"/>
         </dgm:presLayoutVars>
@@ -5505,7 +5659,7 @@
       <dgm:spPr/>
     </dgm:pt>
     <dgm:pt modelId="{43413BE2-49D4-4AD2-85D5-14EDF44EA0F1}" type="pres">
-      <dgm:prSet presAssocID="{98DE5844-EBFB-4ECB-843E-1E3C116CD0A7}" presName="rootConnector" presStyleLbl="node2" presStyleIdx="1" presStyleCnt="7"/>
+      <dgm:prSet presAssocID="{98DE5844-EBFB-4ECB-843E-1E3C116CD0A7}" presName="rootConnector" presStyleLbl="node2" presStyleIdx="1" presStyleCnt="8"/>
       <dgm:spPr/>
     </dgm:pt>
     <dgm:pt modelId="{C5F9AA3B-B14E-4E63-8361-23B432F884E3}" type="pres">
@@ -5513,7 +5667,7 @@
       <dgm:spPr/>
     </dgm:pt>
     <dgm:pt modelId="{FC1B4037-826A-4F44-80EE-641936EF98B7}" type="pres">
-      <dgm:prSet presAssocID="{0E41C96E-49F8-4F4A-AF74-A981293F785F}" presName="Name37" presStyleLbl="parChTrans1D3" presStyleIdx="1" presStyleCnt="11"/>
+      <dgm:prSet presAssocID="{0E41C96E-49F8-4F4A-AF74-A981293F785F}" presName="Name37" presStyleLbl="parChTrans1D3" presStyleIdx="1" presStyleCnt="13"/>
       <dgm:spPr/>
     </dgm:pt>
     <dgm:pt modelId="{3B7362A0-4644-4129-AD8D-83D094010059}" type="pres">
@@ -5529,7 +5683,7 @@
       <dgm:spPr/>
     </dgm:pt>
     <dgm:pt modelId="{5CEACDA1-7667-40A9-B874-25D1B1E21A99}" type="pres">
-      <dgm:prSet presAssocID="{332EBDA1-FC91-42DD-8C1E-2C7B445019B3}" presName="rootText" presStyleLbl="node3" presStyleIdx="1" presStyleCnt="11">
+      <dgm:prSet presAssocID="{332EBDA1-FC91-42DD-8C1E-2C7B445019B3}" presName="rootText" presStyleLbl="node3" presStyleIdx="1" presStyleCnt="13">
         <dgm:presLayoutVars>
           <dgm:chPref val="3"/>
         </dgm:presLayoutVars>
@@ -5537,7 +5691,7 @@
       <dgm:spPr/>
     </dgm:pt>
     <dgm:pt modelId="{1F530FFE-35D1-4609-8D1C-CEEB0EF8690E}" type="pres">
-      <dgm:prSet presAssocID="{332EBDA1-FC91-42DD-8C1E-2C7B445019B3}" presName="rootConnector" presStyleLbl="node3" presStyleIdx="1" presStyleCnt="11"/>
+      <dgm:prSet presAssocID="{332EBDA1-FC91-42DD-8C1E-2C7B445019B3}" presName="rootConnector" presStyleLbl="node3" presStyleIdx="1" presStyleCnt="13"/>
       <dgm:spPr/>
     </dgm:pt>
     <dgm:pt modelId="{681C3D72-8919-4649-B5A8-1D83A3949CB2}" type="pres">
@@ -5553,7 +5707,7 @@
       <dgm:spPr/>
     </dgm:pt>
     <dgm:pt modelId="{F92D201F-4429-48F2-A613-5C474A994CD9}" type="pres">
-      <dgm:prSet presAssocID="{A98B9FA4-4126-4C91-AF71-10ACE11266DD}" presName="Name37" presStyleLbl="parChTrans1D2" presStyleIdx="2" presStyleCnt="7"/>
+      <dgm:prSet presAssocID="{A98B9FA4-4126-4C91-AF71-10ACE11266DD}" presName="Name37" presStyleLbl="parChTrans1D2" presStyleIdx="2" presStyleCnt="8"/>
       <dgm:spPr/>
     </dgm:pt>
     <dgm:pt modelId="{80FD1344-699F-4451-B64E-18964A3F14D0}" type="pres">
@@ -5569,7 +5723,7 @@
       <dgm:spPr/>
     </dgm:pt>
     <dgm:pt modelId="{2D05126F-7CA9-467A-B341-F8E1AF5FCF66}" type="pres">
-      <dgm:prSet presAssocID="{44363CFA-628E-4026-88F3-8868490E44F8}" presName="rootText" presStyleLbl="node2" presStyleIdx="2" presStyleCnt="7">
+      <dgm:prSet presAssocID="{44363CFA-628E-4026-88F3-8868490E44F8}" presName="rootText" presStyleLbl="node2" presStyleIdx="2" presStyleCnt="8">
         <dgm:presLayoutVars>
           <dgm:chPref val="3"/>
         </dgm:presLayoutVars>
@@ -5577,7 +5731,7 @@
       <dgm:spPr/>
     </dgm:pt>
     <dgm:pt modelId="{9C340236-4FFD-45ED-9EE1-A04737FABAE4}" type="pres">
-      <dgm:prSet presAssocID="{44363CFA-628E-4026-88F3-8868490E44F8}" presName="rootConnector" presStyleLbl="node2" presStyleIdx="2" presStyleCnt="7"/>
+      <dgm:prSet presAssocID="{44363CFA-628E-4026-88F3-8868490E44F8}" presName="rootConnector" presStyleLbl="node2" presStyleIdx="2" presStyleCnt="8"/>
       <dgm:spPr/>
     </dgm:pt>
     <dgm:pt modelId="{DE4A9740-7D9B-4A7D-9A6A-26B43F1C9054}" type="pres">
@@ -5589,7 +5743,7 @@
       <dgm:spPr/>
     </dgm:pt>
     <dgm:pt modelId="{F2FC5845-76F4-45FC-9102-1D5405CED484}" type="pres">
-      <dgm:prSet presAssocID="{3930E226-FA6F-40B0-905E-754A21C6644C}" presName="Name37" presStyleLbl="parChTrans1D2" presStyleIdx="3" presStyleCnt="7"/>
+      <dgm:prSet presAssocID="{3930E226-FA6F-40B0-905E-754A21C6644C}" presName="Name37" presStyleLbl="parChTrans1D2" presStyleIdx="3" presStyleCnt="8"/>
       <dgm:spPr/>
     </dgm:pt>
     <dgm:pt modelId="{B4B6317A-15CF-41A3-8884-996C77B54179}" type="pres">
@@ -5605,7 +5759,7 @@
       <dgm:spPr/>
     </dgm:pt>
     <dgm:pt modelId="{816DF2EF-6A2D-47D7-82D8-0F775682513B}" type="pres">
-      <dgm:prSet presAssocID="{1924ECD5-AA0E-4B54-9424-D53165043932}" presName="rootText" presStyleLbl="node2" presStyleIdx="3" presStyleCnt="7">
+      <dgm:prSet presAssocID="{1924ECD5-AA0E-4B54-9424-D53165043932}" presName="rootText" presStyleLbl="node2" presStyleIdx="3" presStyleCnt="8">
         <dgm:presLayoutVars>
           <dgm:chPref val="3"/>
         </dgm:presLayoutVars>
@@ -5613,7 +5767,7 @@
       <dgm:spPr/>
     </dgm:pt>
     <dgm:pt modelId="{29EC5DCF-76B9-464F-84BA-87F256E14F2F}" type="pres">
-      <dgm:prSet presAssocID="{1924ECD5-AA0E-4B54-9424-D53165043932}" presName="rootConnector" presStyleLbl="node2" presStyleIdx="3" presStyleCnt="7"/>
+      <dgm:prSet presAssocID="{1924ECD5-AA0E-4B54-9424-D53165043932}" presName="rootConnector" presStyleLbl="node2" presStyleIdx="3" presStyleCnt="8"/>
       <dgm:spPr/>
     </dgm:pt>
     <dgm:pt modelId="{46125244-8048-47DF-A71C-35A05F4D1C16}" type="pres">
@@ -5621,7 +5775,7 @@
       <dgm:spPr/>
     </dgm:pt>
     <dgm:pt modelId="{104BA3A7-D652-47E4-9B20-83BB4665DF76}" type="pres">
-      <dgm:prSet presAssocID="{BF950D71-5670-40D6-AC0F-099BAE4EAFCE}" presName="Name37" presStyleLbl="parChTrans1D3" presStyleIdx="2" presStyleCnt="11"/>
+      <dgm:prSet presAssocID="{BF950D71-5670-40D6-AC0F-099BAE4EAFCE}" presName="Name37" presStyleLbl="parChTrans1D3" presStyleIdx="2" presStyleCnt="13"/>
       <dgm:spPr/>
     </dgm:pt>
     <dgm:pt modelId="{531B9504-8DE6-4712-98FE-50F6F2431DE0}" type="pres">
@@ -5637,7 +5791,7 @@
       <dgm:spPr/>
     </dgm:pt>
     <dgm:pt modelId="{7F097E5B-6209-4AF0-8ED0-402082DA0749}" type="pres">
-      <dgm:prSet presAssocID="{3C6EA423-D64F-4DC7-B184-24C9BC3512E8}" presName="rootText" presStyleLbl="node3" presStyleIdx="2" presStyleCnt="11">
+      <dgm:prSet presAssocID="{3C6EA423-D64F-4DC7-B184-24C9BC3512E8}" presName="rootText" presStyleLbl="node3" presStyleIdx="2" presStyleCnt="13">
         <dgm:presLayoutVars>
           <dgm:chPref val="3"/>
         </dgm:presLayoutVars>
@@ -5645,7 +5799,7 @@
       <dgm:spPr/>
     </dgm:pt>
     <dgm:pt modelId="{6326AB10-BB5C-4854-9D21-95B3803C563E}" type="pres">
-      <dgm:prSet presAssocID="{3C6EA423-D64F-4DC7-B184-24C9BC3512E8}" presName="rootConnector" presStyleLbl="node3" presStyleIdx="2" presStyleCnt="11"/>
+      <dgm:prSet presAssocID="{3C6EA423-D64F-4DC7-B184-24C9BC3512E8}" presName="rootConnector" presStyleLbl="node3" presStyleIdx="2" presStyleCnt="13"/>
       <dgm:spPr/>
     </dgm:pt>
     <dgm:pt modelId="{25A49672-0356-4BA3-BAB1-ADB32D08F479}" type="pres">
@@ -5657,7 +5811,7 @@
       <dgm:spPr/>
     </dgm:pt>
     <dgm:pt modelId="{246DDF7E-D086-468F-AD98-C5A107AC1D5D}" type="pres">
-      <dgm:prSet presAssocID="{B9579491-E72E-41C5-854B-F50C3EB1B30B}" presName="Name37" presStyleLbl="parChTrans1D3" presStyleIdx="3" presStyleCnt="11"/>
+      <dgm:prSet presAssocID="{B9579491-E72E-41C5-854B-F50C3EB1B30B}" presName="Name37" presStyleLbl="parChTrans1D3" presStyleIdx="3" presStyleCnt="13"/>
       <dgm:spPr/>
     </dgm:pt>
     <dgm:pt modelId="{CCBEDB89-BBC0-4E76-85D0-33739605D6D2}" type="pres">
@@ -5673,7 +5827,7 @@
       <dgm:spPr/>
     </dgm:pt>
     <dgm:pt modelId="{E50F9959-464F-43F9-8195-9C82C537826B}" type="pres">
-      <dgm:prSet presAssocID="{F1DABE6E-F8F2-4453-9AF1-0A543F993768}" presName="rootText" presStyleLbl="node3" presStyleIdx="3" presStyleCnt="11">
+      <dgm:prSet presAssocID="{F1DABE6E-F8F2-4453-9AF1-0A543F993768}" presName="rootText" presStyleLbl="node3" presStyleIdx="3" presStyleCnt="13">
         <dgm:presLayoutVars>
           <dgm:chPref val="3"/>
         </dgm:presLayoutVars>
@@ -5681,7 +5835,7 @@
       <dgm:spPr/>
     </dgm:pt>
     <dgm:pt modelId="{29A7D2B3-E83F-48D3-BA82-6C1B33C7D117}" type="pres">
-      <dgm:prSet presAssocID="{F1DABE6E-F8F2-4453-9AF1-0A543F993768}" presName="rootConnector" presStyleLbl="node3" presStyleIdx="3" presStyleCnt="11"/>
+      <dgm:prSet presAssocID="{F1DABE6E-F8F2-4453-9AF1-0A543F993768}" presName="rootConnector" presStyleLbl="node3" presStyleIdx="3" presStyleCnt="13"/>
       <dgm:spPr/>
     </dgm:pt>
     <dgm:pt modelId="{3F8B49D1-1470-4AFD-996C-55991B6E6161}" type="pres">
@@ -5693,7 +5847,7 @@
       <dgm:spPr/>
     </dgm:pt>
     <dgm:pt modelId="{F07C89FB-7AC0-4D6A-BF40-C0070FED0EE3}" type="pres">
-      <dgm:prSet presAssocID="{423859FD-096E-4927-9390-25344E903FBF}" presName="Name37" presStyleLbl="parChTrans1D3" presStyleIdx="4" presStyleCnt="11"/>
+      <dgm:prSet presAssocID="{423859FD-096E-4927-9390-25344E903FBF}" presName="Name37" presStyleLbl="parChTrans1D3" presStyleIdx="4" presStyleCnt="13"/>
       <dgm:spPr/>
     </dgm:pt>
     <dgm:pt modelId="{B5323093-C52B-4762-88CA-EB05C45B59E6}" type="pres">
@@ -5709,7 +5863,7 @@
       <dgm:spPr/>
     </dgm:pt>
     <dgm:pt modelId="{B99F24ED-3BC7-432A-B386-E1A66BAEF726}" type="pres">
-      <dgm:prSet presAssocID="{A1C6BA05-AD07-4670-B0CD-118E17FA1993}" presName="rootText" presStyleLbl="node3" presStyleIdx="4" presStyleCnt="11">
+      <dgm:prSet presAssocID="{A1C6BA05-AD07-4670-B0CD-118E17FA1993}" presName="rootText" presStyleLbl="node3" presStyleIdx="4" presStyleCnt="13">
         <dgm:presLayoutVars>
           <dgm:chPref val="3"/>
         </dgm:presLayoutVars>
@@ -5717,7 +5871,7 @@
       <dgm:spPr/>
     </dgm:pt>
     <dgm:pt modelId="{19FABE79-F8A2-4566-9B89-1E2FB5DFB7A6}" type="pres">
-      <dgm:prSet presAssocID="{A1C6BA05-AD07-4670-B0CD-118E17FA1993}" presName="rootConnector" presStyleLbl="node3" presStyleIdx="4" presStyleCnt="11"/>
+      <dgm:prSet presAssocID="{A1C6BA05-AD07-4670-B0CD-118E17FA1993}" presName="rootConnector" presStyleLbl="node3" presStyleIdx="4" presStyleCnt="13"/>
       <dgm:spPr/>
     </dgm:pt>
     <dgm:pt modelId="{96062C70-76CB-46F2-A12D-7691F85D67F8}" type="pres">
@@ -5729,7 +5883,7 @@
       <dgm:spPr/>
     </dgm:pt>
     <dgm:pt modelId="{ED24999A-CB54-48D6-8528-2545D016E1D3}" type="pres">
-      <dgm:prSet presAssocID="{57A8CB2D-79BE-4C74-9A37-D6A913DE1B82}" presName="Name37" presStyleLbl="parChTrans1D3" presStyleIdx="5" presStyleCnt="11"/>
+      <dgm:prSet presAssocID="{57A8CB2D-79BE-4C74-9A37-D6A913DE1B82}" presName="Name37" presStyleLbl="parChTrans1D3" presStyleIdx="5" presStyleCnt="13"/>
       <dgm:spPr/>
     </dgm:pt>
     <dgm:pt modelId="{C220EF82-2A32-455B-B92E-AB4AE94BE50C}" type="pres">
@@ -5745,7 +5899,7 @@
       <dgm:spPr/>
     </dgm:pt>
     <dgm:pt modelId="{1B492F86-1603-4E21-B660-DA6307964BAD}" type="pres">
-      <dgm:prSet presAssocID="{305846AD-47C4-463B-9DBE-6AA8AAAFD9CA}" presName="rootText" presStyleLbl="node3" presStyleIdx="5" presStyleCnt="11">
+      <dgm:prSet presAssocID="{305846AD-47C4-463B-9DBE-6AA8AAAFD9CA}" presName="rootText" presStyleLbl="node3" presStyleIdx="5" presStyleCnt="13">
         <dgm:presLayoutVars>
           <dgm:chPref val="3"/>
         </dgm:presLayoutVars>
@@ -5753,7 +5907,7 @@
       <dgm:spPr/>
     </dgm:pt>
     <dgm:pt modelId="{166FE553-CB8C-48D6-822E-56CDBDF78666}" type="pres">
-      <dgm:prSet presAssocID="{305846AD-47C4-463B-9DBE-6AA8AAAFD9CA}" presName="rootConnector" presStyleLbl="node3" presStyleIdx="5" presStyleCnt="11"/>
+      <dgm:prSet presAssocID="{305846AD-47C4-463B-9DBE-6AA8AAAFD9CA}" presName="rootConnector" presStyleLbl="node3" presStyleIdx="5" presStyleCnt="13"/>
       <dgm:spPr/>
     </dgm:pt>
     <dgm:pt modelId="{EDD082AB-8072-49AE-821E-1F6D02B72C2A}" type="pres">
@@ -5765,7 +5919,7 @@
       <dgm:spPr/>
     </dgm:pt>
     <dgm:pt modelId="{E4F616C8-77CD-4807-B795-EDC2BC3DD8F2}" type="pres">
-      <dgm:prSet presAssocID="{967C17FD-B87B-4CD0-BD44-345E2E5D2EA3}" presName="Name37" presStyleLbl="parChTrans1D3" presStyleIdx="6" presStyleCnt="11"/>
+      <dgm:prSet presAssocID="{967C17FD-B87B-4CD0-BD44-345E2E5D2EA3}" presName="Name37" presStyleLbl="parChTrans1D3" presStyleIdx="6" presStyleCnt="13"/>
       <dgm:spPr/>
     </dgm:pt>
     <dgm:pt modelId="{97BCDE9B-FA44-4866-B9CD-42F4D28FC57C}" type="pres">
@@ -5781,7 +5935,7 @@
       <dgm:spPr/>
     </dgm:pt>
     <dgm:pt modelId="{26976F64-C724-4705-94F5-0E6CD971C2E4}" type="pres">
-      <dgm:prSet presAssocID="{DE023E0B-5C31-4E35-A101-3DA3908C072F}" presName="rootText" presStyleLbl="node3" presStyleIdx="6" presStyleCnt="11">
+      <dgm:prSet presAssocID="{DE023E0B-5C31-4E35-A101-3DA3908C072F}" presName="rootText" presStyleLbl="node3" presStyleIdx="6" presStyleCnt="13">
         <dgm:presLayoutVars>
           <dgm:chPref val="3"/>
         </dgm:presLayoutVars>
@@ -5789,7 +5943,7 @@
       <dgm:spPr/>
     </dgm:pt>
     <dgm:pt modelId="{F5DA5587-5EB1-405E-8951-92F671AE6BE5}" type="pres">
-      <dgm:prSet presAssocID="{DE023E0B-5C31-4E35-A101-3DA3908C072F}" presName="rootConnector" presStyleLbl="node3" presStyleIdx="6" presStyleCnt="11"/>
+      <dgm:prSet presAssocID="{DE023E0B-5C31-4E35-A101-3DA3908C072F}" presName="rootConnector" presStyleLbl="node3" presStyleIdx="6" presStyleCnt="13"/>
       <dgm:spPr/>
     </dgm:pt>
     <dgm:pt modelId="{0BACCB52-5846-4B4E-82B3-B705AA185DE8}" type="pres">
@@ -5801,7 +5955,7 @@
       <dgm:spPr/>
     </dgm:pt>
     <dgm:pt modelId="{72D06BF6-42C5-434C-92ED-F618F0FF3B5A}" type="pres">
-      <dgm:prSet presAssocID="{7CF047C5-7A21-4DCA-910B-CBEC1AA93BA9}" presName="Name37" presStyleLbl="parChTrans1D3" presStyleIdx="7" presStyleCnt="11"/>
+      <dgm:prSet presAssocID="{7CF047C5-7A21-4DCA-910B-CBEC1AA93BA9}" presName="Name37" presStyleLbl="parChTrans1D3" presStyleIdx="7" presStyleCnt="13"/>
       <dgm:spPr/>
     </dgm:pt>
     <dgm:pt modelId="{7CE87129-122F-415D-9687-B4831C7BAD6B}" type="pres">
@@ -5817,7 +5971,7 @@
       <dgm:spPr/>
     </dgm:pt>
     <dgm:pt modelId="{50EC3807-8481-4C01-82B7-F19C2342E1A0}" type="pres">
-      <dgm:prSet presAssocID="{10F04DDC-9425-470F-8153-E7CB032EC473}" presName="rootText" presStyleLbl="node3" presStyleIdx="7" presStyleCnt="11">
+      <dgm:prSet presAssocID="{10F04DDC-9425-470F-8153-E7CB032EC473}" presName="rootText" presStyleLbl="node3" presStyleIdx="7" presStyleCnt="13">
         <dgm:presLayoutVars>
           <dgm:chPref val="3"/>
         </dgm:presLayoutVars>
@@ -5825,7 +5979,7 @@
       <dgm:spPr/>
     </dgm:pt>
     <dgm:pt modelId="{274E767F-761A-4B30-B369-389DF89B937D}" type="pres">
-      <dgm:prSet presAssocID="{10F04DDC-9425-470F-8153-E7CB032EC473}" presName="rootConnector" presStyleLbl="node3" presStyleIdx="7" presStyleCnt="11"/>
+      <dgm:prSet presAssocID="{10F04DDC-9425-470F-8153-E7CB032EC473}" presName="rootConnector" presStyleLbl="node3" presStyleIdx="7" presStyleCnt="13"/>
       <dgm:spPr/>
     </dgm:pt>
     <dgm:pt modelId="{4A3801EA-4E87-4854-89D0-F5EE8C40E870}" type="pres">
@@ -5837,7 +5991,7 @@
       <dgm:spPr/>
     </dgm:pt>
     <dgm:pt modelId="{A3F9BD0E-C624-4151-9767-64BBD33870D8}" type="pres">
-      <dgm:prSet presAssocID="{341C93D3-8A95-4DFB-AA9D-C38CA282C9E7}" presName="Name37" presStyleLbl="parChTrans1D3" presStyleIdx="8" presStyleCnt="11"/>
+      <dgm:prSet presAssocID="{341C93D3-8A95-4DFB-AA9D-C38CA282C9E7}" presName="Name37" presStyleLbl="parChTrans1D3" presStyleIdx="8" presStyleCnt="13"/>
       <dgm:spPr/>
     </dgm:pt>
     <dgm:pt modelId="{F2908DFE-90E6-4506-8F75-EC087EFF2791}" type="pres">
@@ -5853,7 +6007,7 @@
       <dgm:spPr/>
     </dgm:pt>
     <dgm:pt modelId="{FE90803F-BB98-472A-87D1-B85B7689304F}" type="pres">
-      <dgm:prSet presAssocID="{10948DB9-C87A-4CB4-AA25-2159E53038FA}" presName="rootText" presStyleLbl="node3" presStyleIdx="8" presStyleCnt="11">
+      <dgm:prSet presAssocID="{10948DB9-C87A-4CB4-AA25-2159E53038FA}" presName="rootText" presStyleLbl="node3" presStyleIdx="8" presStyleCnt="13">
         <dgm:presLayoutVars>
           <dgm:chPref val="3"/>
         </dgm:presLayoutVars>
@@ -5861,7 +6015,7 @@
       <dgm:spPr/>
     </dgm:pt>
     <dgm:pt modelId="{BEB1E389-DC78-4834-98AF-B72FEAAD2902}" type="pres">
-      <dgm:prSet presAssocID="{10948DB9-C87A-4CB4-AA25-2159E53038FA}" presName="rootConnector" presStyleLbl="node3" presStyleIdx="8" presStyleCnt="11"/>
+      <dgm:prSet presAssocID="{10948DB9-C87A-4CB4-AA25-2159E53038FA}" presName="rootConnector" presStyleLbl="node3" presStyleIdx="8" presStyleCnt="13"/>
       <dgm:spPr/>
     </dgm:pt>
     <dgm:pt modelId="{ACA86701-4A36-495A-A1A1-9DC9B364DF9A}" type="pres">
@@ -5877,7 +6031,7 @@
       <dgm:spPr/>
     </dgm:pt>
     <dgm:pt modelId="{EDE52273-429D-4F0E-B2E9-2F7FE11FCD67}" type="pres">
-      <dgm:prSet presAssocID="{9F967694-B9EF-45F7-AC9F-9806D8CB5482}" presName="Name37" presStyleLbl="parChTrans1D2" presStyleIdx="4" presStyleCnt="7"/>
+      <dgm:prSet presAssocID="{9F967694-B9EF-45F7-AC9F-9806D8CB5482}" presName="Name37" presStyleLbl="parChTrans1D2" presStyleIdx="4" presStyleCnt="8"/>
       <dgm:spPr/>
     </dgm:pt>
     <dgm:pt modelId="{8A87B9B0-9590-4772-ADB4-79757898A6E1}" type="pres">
@@ -5893,7 +6047,7 @@
       <dgm:spPr/>
     </dgm:pt>
     <dgm:pt modelId="{0C2F2216-8D08-4E87-B39E-9F041EF12805}" type="pres">
-      <dgm:prSet presAssocID="{EB65517D-69B4-43D8-B5D7-51657BA54F8A}" presName="rootText" presStyleLbl="node2" presStyleIdx="4" presStyleCnt="7">
+      <dgm:prSet presAssocID="{EB65517D-69B4-43D8-B5D7-51657BA54F8A}" presName="rootText" presStyleLbl="node2" presStyleIdx="4" presStyleCnt="8">
         <dgm:presLayoutVars>
           <dgm:chPref val="3"/>
         </dgm:presLayoutVars>
@@ -5901,7 +6055,7 @@
       <dgm:spPr/>
     </dgm:pt>
     <dgm:pt modelId="{15D3E976-5568-44A0-A255-991A6803201C}" type="pres">
-      <dgm:prSet presAssocID="{EB65517D-69B4-43D8-B5D7-51657BA54F8A}" presName="rootConnector" presStyleLbl="node2" presStyleIdx="4" presStyleCnt="7"/>
+      <dgm:prSet presAssocID="{EB65517D-69B4-43D8-B5D7-51657BA54F8A}" presName="rootConnector" presStyleLbl="node2" presStyleIdx="4" presStyleCnt="8"/>
       <dgm:spPr/>
     </dgm:pt>
     <dgm:pt modelId="{E0EDB8A2-BD71-4E29-82CC-B81590494B83}" type="pres">
@@ -5909,7 +6063,7 @@
       <dgm:spPr/>
     </dgm:pt>
     <dgm:pt modelId="{206209FB-F600-4BD1-9606-121E90963E67}" type="pres">
-      <dgm:prSet presAssocID="{0ED2AB80-1B48-415F-BD87-852714594E12}" presName="Name37" presStyleLbl="parChTrans1D3" presStyleIdx="9" presStyleCnt="11"/>
+      <dgm:prSet presAssocID="{0ED2AB80-1B48-415F-BD87-852714594E12}" presName="Name37" presStyleLbl="parChTrans1D3" presStyleIdx="9" presStyleCnt="13"/>
       <dgm:spPr/>
     </dgm:pt>
     <dgm:pt modelId="{9D94A714-C145-4F55-BF39-E82CC94072CD}" type="pres">
@@ -5925,7 +6079,7 @@
       <dgm:spPr/>
     </dgm:pt>
     <dgm:pt modelId="{B15B783C-17E1-46DC-B52E-C2A7EDCDDBF6}" type="pres">
-      <dgm:prSet presAssocID="{785ADFEC-7668-46D6-9578-5377B24474CF}" presName="rootText" presStyleLbl="node3" presStyleIdx="9" presStyleCnt="11">
+      <dgm:prSet presAssocID="{785ADFEC-7668-46D6-9578-5377B24474CF}" presName="rootText" presStyleLbl="node3" presStyleIdx="9" presStyleCnt="13">
         <dgm:presLayoutVars>
           <dgm:chPref val="3"/>
         </dgm:presLayoutVars>
@@ -5933,7 +6087,7 @@
       <dgm:spPr/>
     </dgm:pt>
     <dgm:pt modelId="{43888EB2-C238-4AB3-84EF-EB4C21FE5D9D}" type="pres">
-      <dgm:prSet presAssocID="{785ADFEC-7668-46D6-9578-5377B24474CF}" presName="rootConnector" presStyleLbl="node3" presStyleIdx="9" presStyleCnt="11"/>
+      <dgm:prSet presAssocID="{785ADFEC-7668-46D6-9578-5377B24474CF}" presName="rootConnector" presStyleLbl="node3" presStyleIdx="9" presStyleCnt="13"/>
       <dgm:spPr/>
     </dgm:pt>
     <dgm:pt modelId="{1D44AC0C-5EFA-40AA-A409-4132EDAC6BF1}" type="pres">
@@ -5949,7 +6103,7 @@
       <dgm:spPr/>
     </dgm:pt>
     <dgm:pt modelId="{D4C5CCAB-7FF3-44F7-8278-BB322864B121}" type="pres">
-      <dgm:prSet presAssocID="{C64C22FD-D31D-4129-A644-EAC90AC2F0EF}" presName="Name37" presStyleLbl="parChTrans1D2" presStyleIdx="5" presStyleCnt="7"/>
+      <dgm:prSet presAssocID="{C64C22FD-D31D-4129-A644-EAC90AC2F0EF}" presName="Name37" presStyleLbl="parChTrans1D2" presStyleIdx="5" presStyleCnt="8"/>
       <dgm:spPr/>
     </dgm:pt>
     <dgm:pt modelId="{5CC20E89-F633-4EE5-A46A-2881618E8D80}" type="pres">
@@ -5965,7 +6119,7 @@
       <dgm:spPr/>
     </dgm:pt>
     <dgm:pt modelId="{022713AF-96D9-4A2B-A358-49115AFE68DF}" type="pres">
-      <dgm:prSet presAssocID="{347BA63F-6330-4E17-9091-C819304D8374}" presName="rootText" presStyleLbl="node2" presStyleIdx="5" presStyleCnt="7">
+      <dgm:prSet presAssocID="{347BA63F-6330-4E17-9091-C819304D8374}" presName="rootText" presStyleLbl="node2" presStyleIdx="5" presStyleCnt="8">
         <dgm:presLayoutVars>
           <dgm:chPref val="3"/>
         </dgm:presLayoutVars>
@@ -5973,7 +6127,7 @@
       <dgm:spPr/>
     </dgm:pt>
     <dgm:pt modelId="{42DEE17A-3D83-4C0D-B91C-CA141A292DA2}" type="pres">
-      <dgm:prSet presAssocID="{347BA63F-6330-4E17-9091-C819304D8374}" presName="rootConnector" presStyleLbl="node2" presStyleIdx="5" presStyleCnt="7"/>
+      <dgm:prSet presAssocID="{347BA63F-6330-4E17-9091-C819304D8374}" presName="rootConnector" presStyleLbl="node2" presStyleIdx="5" presStyleCnt="8"/>
       <dgm:spPr/>
     </dgm:pt>
     <dgm:pt modelId="{943B17A1-4133-47E1-8214-3894E9A6F0CB}" type="pres">
@@ -5981,7 +6135,7 @@
       <dgm:spPr/>
     </dgm:pt>
     <dgm:pt modelId="{865CC225-A0DA-47E2-8F93-648401CE5D35}" type="pres">
-      <dgm:prSet presAssocID="{42168C56-2F22-4C47-AD41-80714FFDE7B7}" presName="Name37" presStyleLbl="parChTrans1D3" presStyleIdx="10" presStyleCnt="11"/>
+      <dgm:prSet presAssocID="{42168C56-2F22-4C47-AD41-80714FFDE7B7}" presName="Name37" presStyleLbl="parChTrans1D3" presStyleIdx="10" presStyleCnt="13"/>
       <dgm:spPr/>
     </dgm:pt>
     <dgm:pt modelId="{70E78AA5-44C3-4381-958B-78CB23EBFFCE}" type="pres">
@@ -5997,7 +6151,7 @@
       <dgm:spPr/>
     </dgm:pt>
     <dgm:pt modelId="{CC33A293-E3CB-411D-9632-6FE6954F9F3F}" type="pres">
-      <dgm:prSet presAssocID="{4DE3A42A-E3CE-4E99-83D9-D1A6756B3CB9}" presName="rootText" presStyleLbl="node3" presStyleIdx="10" presStyleCnt="11">
+      <dgm:prSet presAssocID="{4DE3A42A-E3CE-4E99-83D9-D1A6756B3CB9}" presName="rootText" presStyleLbl="node3" presStyleIdx="10" presStyleCnt="13">
         <dgm:presLayoutVars>
           <dgm:chPref val="3"/>
         </dgm:presLayoutVars>
@@ -6005,7 +6159,7 @@
       <dgm:spPr/>
     </dgm:pt>
     <dgm:pt modelId="{2C816549-9EE9-4756-A160-AC0E53C139B8}" type="pres">
-      <dgm:prSet presAssocID="{4DE3A42A-E3CE-4E99-83D9-D1A6756B3CB9}" presName="rootConnector" presStyleLbl="node3" presStyleIdx="10" presStyleCnt="11"/>
+      <dgm:prSet presAssocID="{4DE3A42A-E3CE-4E99-83D9-D1A6756B3CB9}" presName="rootConnector" presStyleLbl="node3" presStyleIdx="10" presStyleCnt="13"/>
       <dgm:spPr/>
     </dgm:pt>
     <dgm:pt modelId="{B4B577CE-F927-44B3-B73A-132AB0F7463E}" type="pres">
@@ -6093,7 +6247,7 @@
       <dgm:spPr/>
     </dgm:pt>
     <dgm:pt modelId="{C01F831D-EFD6-481A-9BCE-21CF8207E0E1}" type="pres">
-      <dgm:prSet presAssocID="{476A2B4E-0CFD-4F03-9824-25789D527EDB}" presName="Name37" presStyleLbl="parChTrans1D2" presStyleIdx="6" presStyleCnt="7"/>
+      <dgm:prSet presAssocID="{476A2B4E-0CFD-4F03-9824-25789D527EDB}" presName="Name37" presStyleLbl="parChTrans1D2" presStyleIdx="6" presStyleCnt="8"/>
       <dgm:spPr/>
     </dgm:pt>
     <dgm:pt modelId="{C9B38781-C395-4C17-8C7F-BEE957BD4249}" type="pres">
@@ -6109,7 +6263,7 @@
       <dgm:spPr/>
     </dgm:pt>
     <dgm:pt modelId="{12F0C7F9-8119-4BBD-A7C5-DEFEEA6C7D89}" type="pres">
-      <dgm:prSet presAssocID="{A48100E6-84E1-4E3F-8C93-442D7A1A23CC}" presName="rootText" presStyleLbl="node2" presStyleIdx="6" presStyleCnt="7">
+      <dgm:prSet presAssocID="{A48100E6-84E1-4E3F-8C93-442D7A1A23CC}" presName="rootText" presStyleLbl="node2" presStyleIdx="6" presStyleCnt="8">
         <dgm:presLayoutVars>
           <dgm:chPref val="3"/>
         </dgm:presLayoutVars>
@@ -6117,7 +6271,7 @@
       <dgm:spPr/>
     </dgm:pt>
     <dgm:pt modelId="{0328B132-74A6-4425-821D-84668D625AD9}" type="pres">
-      <dgm:prSet presAssocID="{A48100E6-84E1-4E3F-8C93-442D7A1A23CC}" presName="rootConnector" presStyleLbl="node2" presStyleIdx="6" presStyleCnt="7"/>
+      <dgm:prSet presAssocID="{A48100E6-84E1-4E3F-8C93-442D7A1A23CC}" presName="rootConnector" presStyleLbl="node2" presStyleIdx="6" presStyleCnt="8"/>
       <dgm:spPr/>
     </dgm:pt>
     <dgm:pt modelId="{2576764E-D309-4CA8-B535-2E32B2410668}" type="pres">
@@ -6128,16 +6282,126 @@
       <dgm:prSet presAssocID="{A48100E6-84E1-4E3F-8C93-442D7A1A23CC}" presName="hierChild5" presStyleCnt="0"/>
       <dgm:spPr/>
     </dgm:pt>
+    <dgm:pt modelId="{DC0B8C07-BCD6-4D91-BB5F-6E51880E10CA}" type="pres">
+      <dgm:prSet presAssocID="{B0804064-996B-41FA-9EBA-EC56EBF3506F}" presName="Name37" presStyleLbl="parChTrans1D2" presStyleIdx="7" presStyleCnt="8"/>
+      <dgm:spPr/>
+    </dgm:pt>
+    <dgm:pt modelId="{B4ED0032-F552-4842-84E2-122A4AFFF45E}" type="pres">
+      <dgm:prSet presAssocID="{28ACC96C-DAEE-4690-912C-9633C398023B}" presName="hierRoot2" presStyleCnt="0">
+        <dgm:presLayoutVars>
+          <dgm:hierBranch val="init"/>
+        </dgm:presLayoutVars>
+      </dgm:prSet>
+      <dgm:spPr/>
+    </dgm:pt>
+    <dgm:pt modelId="{6D33168C-FBE8-4F1B-BC43-FCCC2110A207}" type="pres">
+      <dgm:prSet presAssocID="{28ACC96C-DAEE-4690-912C-9633C398023B}" presName="rootComposite" presStyleCnt="0"/>
+      <dgm:spPr/>
+    </dgm:pt>
+    <dgm:pt modelId="{99BBCD64-0904-4F94-938B-1D4FAE73A2E1}" type="pres">
+      <dgm:prSet presAssocID="{28ACC96C-DAEE-4690-912C-9633C398023B}" presName="rootText" presStyleLbl="node2" presStyleIdx="7" presStyleCnt="8">
+        <dgm:presLayoutVars>
+          <dgm:chPref val="3"/>
+        </dgm:presLayoutVars>
+      </dgm:prSet>
+      <dgm:spPr/>
+    </dgm:pt>
+    <dgm:pt modelId="{4C381AC9-173E-441C-AC7D-6F1D3FC15D8A}" type="pres">
+      <dgm:prSet presAssocID="{28ACC96C-DAEE-4690-912C-9633C398023B}" presName="rootConnector" presStyleLbl="node2" presStyleIdx="7" presStyleCnt="8"/>
+      <dgm:spPr/>
+    </dgm:pt>
+    <dgm:pt modelId="{1E03C464-5C83-400B-BDFE-953A491844E5}" type="pres">
+      <dgm:prSet presAssocID="{28ACC96C-DAEE-4690-912C-9633C398023B}" presName="hierChild4" presStyleCnt="0"/>
+      <dgm:spPr/>
+    </dgm:pt>
+    <dgm:pt modelId="{98DF9615-6AB1-4615-98A9-227A4B3AE02B}" type="pres">
+      <dgm:prSet presAssocID="{AD5EE0EA-60D1-43DE-980D-E1501EFCEDE7}" presName="Name37" presStyleLbl="parChTrans1D3" presStyleIdx="11" presStyleCnt="13"/>
+      <dgm:spPr/>
+    </dgm:pt>
+    <dgm:pt modelId="{F4F6AA9E-5CC7-4688-8E0A-DFFF2E2453E3}" type="pres">
+      <dgm:prSet presAssocID="{197668C4-8212-48B8-A54E-73002176A9B9}" presName="hierRoot2" presStyleCnt="0">
+        <dgm:presLayoutVars>
+          <dgm:hierBranch val="init"/>
+        </dgm:presLayoutVars>
+      </dgm:prSet>
+      <dgm:spPr/>
+    </dgm:pt>
+    <dgm:pt modelId="{BEBC0944-3EE9-44C2-9697-A828E10A67CD}" type="pres">
+      <dgm:prSet presAssocID="{197668C4-8212-48B8-A54E-73002176A9B9}" presName="rootComposite" presStyleCnt="0"/>
+      <dgm:spPr/>
+    </dgm:pt>
+    <dgm:pt modelId="{7A882588-0810-4F92-AD23-756B9035A4E8}" type="pres">
+      <dgm:prSet presAssocID="{197668C4-8212-48B8-A54E-73002176A9B9}" presName="rootText" presStyleLbl="node3" presStyleIdx="11" presStyleCnt="13">
+        <dgm:presLayoutVars>
+          <dgm:chPref val="3"/>
+        </dgm:presLayoutVars>
+      </dgm:prSet>
+      <dgm:spPr/>
+    </dgm:pt>
+    <dgm:pt modelId="{241D6C5A-A704-4FEC-BFA2-42E7E1150593}" type="pres">
+      <dgm:prSet presAssocID="{197668C4-8212-48B8-A54E-73002176A9B9}" presName="rootConnector" presStyleLbl="node3" presStyleIdx="11" presStyleCnt="13"/>
+      <dgm:spPr/>
+    </dgm:pt>
+    <dgm:pt modelId="{1773CDB1-D2E3-4EAE-A42A-B036DC3596AE}" type="pres">
+      <dgm:prSet presAssocID="{197668C4-8212-48B8-A54E-73002176A9B9}" presName="hierChild4" presStyleCnt="0"/>
+      <dgm:spPr/>
+    </dgm:pt>
+    <dgm:pt modelId="{3E037070-2817-4D54-B26C-AD6AA1BCCF21}" type="pres">
+      <dgm:prSet presAssocID="{197668C4-8212-48B8-A54E-73002176A9B9}" presName="hierChild5" presStyleCnt="0"/>
+      <dgm:spPr/>
+    </dgm:pt>
+    <dgm:pt modelId="{B4023B61-E2B4-4C69-A00E-8B14067C6DC3}" type="pres">
+      <dgm:prSet presAssocID="{D672805F-D531-46CA-8240-38805655CA82}" presName="Name37" presStyleLbl="parChTrans1D3" presStyleIdx="12" presStyleCnt="13"/>
+      <dgm:spPr/>
+    </dgm:pt>
+    <dgm:pt modelId="{BBBC079C-B4BF-4ADF-8148-1298E67D0F08}" type="pres">
+      <dgm:prSet presAssocID="{5DF6C11B-377F-47FB-BC50-A7E3E32B7B43}" presName="hierRoot2" presStyleCnt="0">
+        <dgm:presLayoutVars>
+          <dgm:hierBranch val="init"/>
+        </dgm:presLayoutVars>
+      </dgm:prSet>
+      <dgm:spPr/>
+    </dgm:pt>
+    <dgm:pt modelId="{EEAEFE05-4F93-465F-AAC6-E4FB3B09264E}" type="pres">
+      <dgm:prSet presAssocID="{5DF6C11B-377F-47FB-BC50-A7E3E32B7B43}" presName="rootComposite" presStyleCnt="0"/>
+      <dgm:spPr/>
+    </dgm:pt>
+    <dgm:pt modelId="{B04C15FD-14A3-4E7B-895B-7C4AF0E8908C}" type="pres">
+      <dgm:prSet presAssocID="{5DF6C11B-377F-47FB-BC50-A7E3E32B7B43}" presName="rootText" presStyleLbl="node3" presStyleIdx="12" presStyleCnt="13">
+        <dgm:presLayoutVars>
+          <dgm:chPref val="3"/>
+        </dgm:presLayoutVars>
+      </dgm:prSet>
+      <dgm:spPr/>
+    </dgm:pt>
+    <dgm:pt modelId="{D2420743-058E-43CD-8DE7-96F37C968137}" type="pres">
+      <dgm:prSet presAssocID="{5DF6C11B-377F-47FB-BC50-A7E3E32B7B43}" presName="rootConnector" presStyleLbl="node3" presStyleIdx="12" presStyleCnt="13"/>
+      <dgm:spPr/>
+    </dgm:pt>
+    <dgm:pt modelId="{0C86AA4C-1483-49E1-8C49-98CA315494B9}" type="pres">
+      <dgm:prSet presAssocID="{5DF6C11B-377F-47FB-BC50-A7E3E32B7B43}" presName="hierChild4" presStyleCnt="0"/>
+      <dgm:spPr/>
+    </dgm:pt>
+    <dgm:pt modelId="{4A65B302-E416-4124-B5ED-C3ABD07F5905}" type="pres">
+      <dgm:prSet presAssocID="{5DF6C11B-377F-47FB-BC50-A7E3E32B7B43}" presName="hierChild5" presStyleCnt="0"/>
+      <dgm:spPr/>
+    </dgm:pt>
+    <dgm:pt modelId="{761E2FBE-BF4C-4F06-94D6-4399B7503FC9}" type="pres">
+      <dgm:prSet presAssocID="{28ACC96C-DAEE-4690-912C-9633C398023B}" presName="hierChild5" presStyleCnt="0"/>
+      <dgm:spPr/>
+    </dgm:pt>
     <dgm:pt modelId="{2DAC1630-BA8F-4206-952C-EBE673153874}" type="pres">
       <dgm:prSet presAssocID="{441C9BFF-8AD7-4827-90F5-60BEDCAF3705}" presName="hierChild3" presStyleCnt="0"/>
       <dgm:spPr/>
     </dgm:pt>
   </dgm:ptLst>
   <dgm:cxnLst>
+    <dgm:cxn modelId="{97CC8408-2CBE-4128-A71D-18EBE43678C8}" type="presOf" srcId="{28ACC96C-DAEE-4690-912C-9633C398023B}" destId="{4C381AC9-173E-441C-AC7D-6F1D3FC15D8A}" srcOrd="1" destOrd="0" presId="urn:microsoft.com/office/officeart/2005/8/layout/orgChart1"/>
     <dgm:cxn modelId="{270DDA09-7491-47DE-BF57-0D4FA9136B89}" type="presOf" srcId="{EF6B1CB1-4266-4EA5-804A-ACC48ED2EE3D}" destId="{F18F04F2-ED04-4331-853F-808462CDAC9B}" srcOrd="1" destOrd="0" presId="urn:microsoft.com/office/officeart/2005/8/layout/orgChart1"/>
     <dgm:cxn modelId="{D95FE817-C3E6-4CE6-AC73-B2F0C288457F}" type="presOf" srcId="{305846AD-47C4-463B-9DBE-6AA8AAAFD9CA}" destId="{166FE553-CB8C-48D6-822E-56CDBDF78666}" srcOrd="1" destOrd="0" presId="urn:microsoft.com/office/officeart/2005/8/layout/orgChart1"/>
     <dgm:cxn modelId="{D5359E19-2FD0-4409-A875-DC359F817818}" srcId="{441C9BFF-8AD7-4827-90F5-60BEDCAF3705}" destId="{EF6B1CB1-4266-4EA5-804A-ACC48ED2EE3D}" srcOrd="0" destOrd="0" parTransId="{A1698A36-C129-4FA1-BE7D-9B591DCFED6F}" sibTransId="{874649DD-CE2C-4963-AD9D-6BF4EABFEA87}"/>
     <dgm:cxn modelId="{438ACE25-C8C6-4AEF-92C4-A2D3A6306E5A}" type="presOf" srcId="{332EBDA1-FC91-42DD-8C1E-2C7B445019B3}" destId="{5CEACDA1-7667-40A9-B874-25D1B1E21A99}" srcOrd="0" destOrd="0" presId="urn:microsoft.com/office/officeart/2005/8/layout/orgChart1"/>
+    <dgm:cxn modelId="{F45B7A26-8D0F-48F9-A2DC-CF949FE58CED}" type="presOf" srcId="{197668C4-8212-48B8-A54E-73002176A9B9}" destId="{7A882588-0810-4F92-AD23-756B9035A4E8}" srcOrd="0" destOrd="0" presId="urn:microsoft.com/office/officeart/2005/8/layout/orgChart1"/>
     <dgm:cxn modelId="{0A009826-02C9-4163-9C61-B7F53EBB75B2}" type="presOf" srcId="{441C9BFF-8AD7-4827-90F5-60BEDCAF3705}" destId="{D4AAF6B0-5935-4077-A7BD-9DC102060D2E}" srcOrd="0" destOrd="0" presId="urn:microsoft.com/office/officeart/2005/8/layout/orgChart1"/>
     <dgm:cxn modelId="{C54F5B28-6AE5-41FA-A76A-40C3EBDC4BAD}" type="presOf" srcId="{1924ECD5-AA0E-4B54-9424-D53165043932}" destId="{29EC5DCF-76B9-464F-84BA-87F256E14F2F}" srcOrd="1" destOrd="0" presId="urn:microsoft.com/office/officeart/2005/8/layout/orgChart1"/>
     <dgm:cxn modelId="{3CAD0829-4311-453A-B452-C74675A5E305}" srcId="{441C9BFF-8AD7-4827-90F5-60BEDCAF3705}" destId="{44363CFA-628E-4026-88F3-8868490E44F8}" srcOrd="2" destOrd="0" parTransId="{A98B9FA4-4126-4C91-AF71-10ACE11266DD}" sibTransId="{AD8C0F6F-44FE-4E14-A2AE-D5615410E79B}"/>
@@ -6146,6 +6410,8 @@
     <dgm:cxn modelId="{67EFE438-94F0-4BBA-9CA6-DCBB8E871FB1}" type="presOf" srcId="{F1DABE6E-F8F2-4453-9AF1-0A543F993768}" destId="{29A7D2B3-E83F-48D3-BA82-6C1B33C7D117}" srcOrd="1" destOrd="0" presId="urn:microsoft.com/office/officeart/2005/8/layout/orgChart1"/>
     <dgm:cxn modelId="{5B946639-C386-43A7-99EF-97B4B9A0EDAF}" type="presOf" srcId="{028C5DFA-CD08-425A-9808-BE49C21D580B}" destId="{31730A28-5687-49A7-9084-9821AA2323E9}" srcOrd="1" destOrd="0" presId="urn:microsoft.com/office/officeart/2005/8/layout/orgChart1"/>
     <dgm:cxn modelId="{78841D3B-011C-4F77-863D-764B0865371F}" type="presOf" srcId="{B829E806-E11E-4BDA-8589-5EF437FD4FD6}" destId="{940D3546-6031-400F-B1CF-0A05124CD0AE}" srcOrd="0" destOrd="0" presId="urn:microsoft.com/office/officeart/2005/8/layout/orgChart1"/>
+    <dgm:cxn modelId="{EF5B123E-DF97-4A3E-8871-AAA083F0DF6B}" type="presOf" srcId="{D672805F-D531-46CA-8240-38805655CA82}" destId="{B4023B61-E2B4-4C69-A00E-8B14067C6DC3}" srcOrd="0" destOrd="0" presId="urn:microsoft.com/office/officeart/2005/8/layout/orgChart1"/>
+    <dgm:cxn modelId="{83710E5D-5FD5-4794-8A4E-81F1DD87174C}" type="presOf" srcId="{5DF6C11B-377F-47FB-BC50-A7E3E32B7B43}" destId="{B04C15FD-14A3-4E7B-895B-7C4AF0E8908C}" srcOrd="0" destOrd="0" presId="urn:microsoft.com/office/officeart/2005/8/layout/orgChart1"/>
     <dgm:cxn modelId="{3679A549-E1BF-4456-B75B-8BA78A97E6CE}" type="presOf" srcId="{4DE3A42A-E3CE-4E99-83D9-D1A6756B3CB9}" destId="{CC33A293-E3CB-411D-9632-6FE6954F9F3F}" srcOrd="0" destOrd="0" presId="urn:microsoft.com/office/officeart/2005/8/layout/orgChart1"/>
     <dgm:cxn modelId="{1D7CEA49-FBBA-4F7B-ACF8-330C48D879F8}" type="presOf" srcId="{57A8CB2D-79BE-4C74-9A37-D6A913DE1B82}" destId="{ED24999A-CB54-48D6-8528-2545D016E1D3}" srcOrd="0" destOrd="0" presId="urn:microsoft.com/office/officeart/2005/8/layout/orgChart1"/>
     <dgm:cxn modelId="{523F296D-2CC7-4C29-85F8-5468ED82EAEB}" srcId="{34BEB75E-ED6D-4113-9F50-1BF5F1954990}" destId="{441C9BFF-8AD7-4827-90F5-60BEDCAF3705}" srcOrd="0" destOrd="0" parTransId="{AED53F1B-6F52-4865-A6C0-13F7BB680C57}" sibTransId="{EE93340F-3E48-4F2C-8A92-4BB8BFF38136}"/>
@@ -6158,6 +6424,8 @@
     <dgm:cxn modelId="{36565A79-726A-49E4-8D06-2B903089FD1B}" srcId="{347BA63F-6330-4E17-9091-C819304D8374}" destId="{4DE3A42A-E3CE-4E99-83D9-D1A6756B3CB9}" srcOrd="0" destOrd="0" parTransId="{42168C56-2F22-4C47-AD41-80714FFDE7B7}" sibTransId="{E7E8FE3B-7C4D-4032-A180-D927C1C52A59}"/>
     <dgm:cxn modelId="{3566285A-ABAE-452D-9251-F94883B7CF9E}" type="presOf" srcId="{B9579491-E72E-41C5-854B-F50C3EB1B30B}" destId="{246DDF7E-D086-468F-AD98-C5A107AC1D5D}" srcOrd="0" destOrd="0" presId="urn:microsoft.com/office/officeart/2005/8/layout/orgChart1"/>
     <dgm:cxn modelId="{4BA2AD7D-AEB8-46D3-A98C-3C01FE642FDC}" type="presOf" srcId="{A98B9FA4-4126-4C91-AF71-10ACE11266DD}" destId="{F92D201F-4429-48F2-A613-5C474A994CD9}" srcOrd="0" destOrd="0" presId="urn:microsoft.com/office/officeart/2005/8/layout/orgChart1"/>
+    <dgm:cxn modelId="{7DA59C83-E010-4A51-BDB4-766F4B168E83}" type="presOf" srcId="{197668C4-8212-48B8-A54E-73002176A9B9}" destId="{241D6C5A-A704-4FEC-BFA2-42E7E1150593}" srcOrd="1" destOrd="0" presId="urn:microsoft.com/office/officeart/2005/8/layout/orgChart1"/>
+    <dgm:cxn modelId="{73170187-0787-49D3-A63E-AB4BD41A6B23}" type="presOf" srcId="{AD5EE0EA-60D1-43DE-980D-E1501EFCEDE7}" destId="{98DF9615-6AB1-4615-98A9-227A4B3AE02B}" srcOrd="0" destOrd="0" presId="urn:microsoft.com/office/officeart/2005/8/layout/orgChart1"/>
     <dgm:cxn modelId="{7A0A5687-8D33-4C97-9CE7-B44967A81946}" srcId="{4DE3A42A-E3CE-4E99-83D9-D1A6756B3CB9}" destId="{9E9AFA18-4A4C-452D-9BB1-22608177395D}" srcOrd="0" destOrd="0" parTransId="{7EB6568E-DE68-41D0-B072-2D0DA56F4F15}" sibTransId="{DB2F4BBF-BA92-46E6-ACB3-D5B8E972779B}"/>
     <dgm:cxn modelId="{C08AD887-C20C-4490-A7AE-D52D0A77658D}" type="presOf" srcId="{BF950D71-5670-40D6-AC0F-099BAE4EAFCE}" destId="{104BA3A7-D652-47E4-9B20-83BB4665DF76}" srcOrd="0" destOrd="0" presId="urn:microsoft.com/office/officeart/2005/8/layout/orgChart1"/>
     <dgm:cxn modelId="{6C3CB288-381C-4A97-8505-4AA97B59E105}" type="presOf" srcId="{A48100E6-84E1-4E3F-8C93-442D7A1A23CC}" destId="{12F0C7F9-8119-4BBD-A7C5-DEFEEA6C7D89}" srcOrd="0" destOrd="0" presId="urn:microsoft.com/office/officeart/2005/8/layout/orgChart1"/>
@@ -6171,9 +6439,12 @@
     <dgm:cxn modelId="{3517AE9C-6628-4933-8CE6-0CA1EC7C87DD}" srcId="{441C9BFF-8AD7-4827-90F5-60BEDCAF3705}" destId="{347BA63F-6330-4E17-9091-C819304D8374}" srcOrd="5" destOrd="0" parTransId="{C64C22FD-D31D-4129-A644-EAC90AC2F0EF}" sibTransId="{36DAFF60-F4E1-4919-B05F-DD90C1E847D2}"/>
     <dgm:cxn modelId="{A939899E-AEF0-4A63-B01A-2811913BFAD2}" type="presOf" srcId="{98DE5844-EBFB-4ECB-843E-1E3C116CD0A7}" destId="{43413BE2-49D4-4AD2-85D5-14EDF44EA0F1}" srcOrd="1" destOrd="0" presId="urn:microsoft.com/office/officeart/2005/8/layout/orgChart1"/>
     <dgm:cxn modelId="{0226A49E-23FC-42BA-B8CE-BA3B5D4DCC31}" type="presOf" srcId="{EB65517D-69B4-43D8-B5D7-51657BA54F8A}" destId="{0C2F2216-8D08-4E87-B39E-9F041EF12805}" srcOrd="0" destOrd="0" presId="urn:microsoft.com/office/officeart/2005/8/layout/orgChart1"/>
+    <dgm:cxn modelId="{B881D0A1-2721-40DE-ACC5-077BA5823963}" type="presOf" srcId="{B0804064-996B-41FA-9EBA-EC56EBF3506F}" destId="{DC0B8C07-BCD6-4D91-BB5F-6E51880E10CA}" srcOrd="0" destOrd="0" presId="urn:microsoft.com/office/officeart/2005/8/layout/orgChart1"/>
+    <dgm:cxn modelId="{7E7EDEA4-6763-40BA-82A3-4F093EFBF7FD}" srcId="{441C9BFF-8AD7-4827-90F5-60BEDCAF3705}" destId="{28ACC96C-DAEE-4690-912C-9633C398023B}" srcOrd="7" destOrd="0" parTransId="{B0804064-996B-41FA-9EBA-EC56EBF3506F}" sibTransId="{8AF9705A-3B07-4438-A2D1-1293791B0AE2}"/>
     <dgm:cxn modelId="{1C5B25A9-30D7-4B17-9077-AE5716562504}" srcId="{441C9BFF-8AD7-4827-90F5-60BEDCAF3705}" destId="{EB65517D-69B4-43D8-B5D7-51657BA54F8A}" srcOrd="4" destOrd="0" parTransId="{9F967694-B9EF-45F7-AC9F-9806D8CB5482}" sibTransId="{E544A564-370F-49E5-BAD7-5F5A2C41F0DB}"/>
     <dgm:cxn modelId="{0B145AA9-D9A1-40D4-BE05-B952D9805B35}" type="presOf" srcId="{C64C22FD-D31D-4129-A644-EAC90AC2F0EF}" destId="{D4C5CCAB-7FF3-44F7-8278-BB322864B121}" srcOrd="0" destOrd="0" presId="urn:microsoft.com/office/officeart/2005/8/layout/orgChart1"/>
     <dgm:cxn modelId="{F04E5DAB-1F2B-487B-A909-786FD47B7277}" type="presOf" srcId="{EF6B1CB1-4266-4EA5-804A-ACC48ED2EE3D}" destId="{AE1DD6B5-8922-4162-945A-41BF7A420F55}" srcOrd="0" destOrd="0" presId="urn:microsoft.com/office/officeart/2005/8/layout/orgChart1"/>
+    <dgm:cxn modelId="{7BAD70AC-7CD3-469A-AB21-DA1797E8E480}" type="presOf" srcId="{28ACC96C-DAEE-4690-912C-9633C398023B}" destId="{99BBCD64-0904-4F94-938B-1D4FAE73A2E1}" srcOrd="0" destOrd="0" presId="urn:microsoft.com/office/officeart/2005/8/layout/orgChart1"/>
     <dgm:cxn modelId="{10B083AC-0A7E-4BDD-83CC-5A4036412ED4}" type="presOf" srcId="{10F04DDC-9425-470F-8153-E7CB032EC473}" destId="{50EC3807-8481-4C01-82B7-F19C2342E1A0}" srcOrd="0" destOrd="0" presId="urn:microsoft.com/office/officeart/2005/8/layout/orgChart1"/>
     <dgm:cxn modelId="{A379DEAC-9ED6-46D7-BA90-0F0F0114656E}" srcId="{441C9BFF-8AD7-4827-90F5-60BEDCAF3705}" destId="{1924ECD5-AA0E-4B54-9424-D53165043932}" srcOrd="3" destOrd="0" parTransId="{3930E226-FA6F-40B0-905E-754A21C6644C}" sibTransId="{CBA63FA3-5470-4234-A511-234C76F1D9FA}"/>
     <dgm:cxn modelId="{A58B0BAE-AB07-4924-826A-17941DCD081C}" type="presOf" srcId="{10948DB9-C87A-4CB4-AA25-2159E53038FA}" destId="{FE90803F-BB98-472A-87D1-B85B7689304F}" srcOrd="0" destOrd="0" presId="urn:microsoft.com/office/officeart/2005/8/layout/orgChart1"/>
@@ -6196,6 +6467,7 @@
     <dgm:cxn modelId="{32A76DC8-7272-4297-9017-3363D8EEE47B}" type="presOf" srcId="{3930E226-FA6F-40B0-905E-754A21C6644C}" destId="{F2FC5845-76F4-45FC-9102-1D5405CED484}" srcOrd="0" destOrd="0" presId="urn:microsoft.com/office/officeart/2005/8/layout/orgChart1"/>
     <dgm:cxn modelId="{83B220C9-575D-4410-9866-5F5B448BA45A}" srcId="{441C9BFF-8AD7-4827-90F5-60BEDCAF3705}" destId="{98DE5844-EBFB-4ECB-843E-1E3C116CD0A7}" srcOrd="1" destOrd="0" parTransId="{B829E806-E11E-4BDA-8589-5EF437FD4FD6}" sibTransId="{964986D0-5530-46C8-8F61-2A4F7C778AD2}"/>
     <dgm:cxn modelId="{E1FB8AC9-7B0A-448C-B041-15907572A693}" type="presOf" srcId="{9E9AFA18-4A4C-452D-9BB1-22608177395D}" destId="{FA7BB441-4DEF-451F-9DE9-DB38CDAFAFC2}" srcOrd="1" destOrd="0" presId="urn:microsoft.com/office/officeart/2005/8/layout/orgChart1"/>
+    <dgm:cxn modelId="{CF902CCA-D46B-45C2-9C6E-DD4533D3404D}" type="presOf" srcId="{5DF6C11B-377F-47FB-BC50-A7E3E32B7B43}" destId="{D2420743-058E-43CD-8DE7-96F37C968137}" srcOrd="1" destOrd="0" presId="urn:microsoft.com/office/officeart/2005/8/layout/orgChart1"/>
     <dgm:cxn modelId="{714EDCCA-D136-47E8-93E3-18AD130D9A96}" type="presOf" srcId="{347BA63F-6330-4E17-9091-C819304D8374}" destId="{42DEE17A-3D83-4C0D-B91C-CA141A292DA2}" srcOrd="1" destOrd="0" presId="urn:microsoft.com/office/officeart/2005/8/layout/orgChart1"/>
     <dgm:cxn modelId="{105FF0CA-A9FE-4385-849A-513AFC6AB6C4}" type="presOf" srcId="{A1698A36-C129-4FA1-BE7D-9B591DCFED6F}" destId="{EA35908A-375B-4EF7-A17D-476DA652899F}" srcOrd="0" destOrd="0" presId="urn:microsoft.com/office/officeart/2005/8/layout/orgChart1"/>
     <dgm:cxn modelId="{A894B2CE-042B-4933-973A-0F0987339BD2}" type="presOf" srcId="{10F04DDC-9425-470F-8153-E7CB032EC473}" destId="{274E767F-761A-4B30-B369-389DF89B937D}" srcOrd="1" destOrd="0" presId="urn:microsoft.com/office/officeart/2005/8/layout/orgChart1"/>
@@ -6203,6 +6475,7 @@
     <dgm:cxn modelId="{C0EFEBD5-5DF4-4D4F-8FE8-1BE15E6AF913}" type="presOf" srcId="{DE023E0B-5C31-4E35-A101-3DA3908C072F}" destId="{F5DA5587-5EB1-405E-8951-92F671AE6BE5}" srcOrd="1" destOrd="0" presId="urn:microsoft.com/office/officeart/2005/8/layout/orgChart1"/>
     <dgm:cxn modelId="{EF32A5D6-A7ED-472E-846C-E4C37BA3F657}" type="presOf" srcId="{785ADFEC-7668-46D6-9578-5377B24474CF}" destId="{B15B783C-17E1-46DC-B52E-C2A7EDCDDBF6}" srcOrd="0" destOrd="0" presId="urn:microsoft.com/office/officeart/2005/8/layout/orgChart1"/>
     <dgm:cxn modelId="{B8B8DAD8-4B10-40F0-8ED3-14035B5F0F4D}" srcId="{441C9BFF-8AD7-4827-90F5-60BEDCAF3705}" destId="{A48100E6-84E1-4E3F-8C93-442D7A1A23CC}" srcOrd="6" destOrd="0" parTransId="{476A2B4E-0CFD-4F03-9824-25789D527EDB}" sibTransId="{60462F65-71B6-4ECE-9B21-6A15610060E9}"/>
+    <dgm:cxn modelId="{902876D9-9133-4A48-8398-C7CAAFB05485}" srcId="{28ACC96C-DAEE-4690-912C-9633C398023B}" destId="{197668C4-8212-48B8-A54E-73002176A9B9}" srcOrd="0" destOrd="0" parTransId="{AD5EE0EA-60D1-43DE-980D-E1501EFCEDE7}" sibTransId="{ABDB2C2B-782E-4029-89BE-6E5CBB30B114}"/>
     <dgm:cxn modelId="{D823A7DB-3914-4E93-A007-C4D851BBA925}" type="presOf" srcId="{1924ECD5-AA0E-4B54-9424-D53165043932}" destId="{816DF2EF-6A2D-47D7-82D8-0F775682513B}" srcOrd="0" destOrd="0" presId="urn:microsoft.com/office/officeart/2005/8/layout/orgChart1"/>
     <dgm:cxn modelId="{59A442DD-F78A-464B-97AF-79AF5CC25412}" type="presOf" srcId="{7EB6568E-DE68-41D0-B072-2D0DA56F4F15}" destId="{86837EF4-E4BC-47DA-8734-FDF19B2630D1}" srcOrd="0" destOrd="0" presId="urn:microsoft.com/office/officeart/2005/8/layout/orgChart1"/>
     <dgm:cxn modelId="{374F36DF-6662-4F92-91D9-3C41AFDDBB98}" srcId="{4DE3A42A-E3CE-4E99-83D9-D1A6756B3CB9}" destId="{795061A3-2B93-41B7-8CB3-D2EA827D06F1}" srcOrd="1" destOrd="0" parTransId="{AF051581-B2C4-4A22-B3E9-D040DD094A2F}" sibTransId="{A5E25A6B-6ACF-4370-BC1D-916D50C4DBFB}"/>
@@ -6210,6 +6483,7 @@
     <dgm:cxn modelId="{A7E5B9E7-435F-412E-994E-042677F66A38}" srcId="{1924ECD5-AA0E-4B54-9424-D53165043932}" destId="{3C6EA423-D64F-4DC7-B184-24C9BC3512E8}" srcOrd="0" destOrd="0" parTransId="{BF950D71-5670-40D6-AC0F-099BAE4EAFCE}" sibTransId="{172DF7D6-467F-45FD-9576-96B3C7081EEA}"/>
     <dgm:cxn modelId="{0A8866E8-2AA7-443E-A2BD-C420D709BD0E}" type="presOf" srcId="{028C5DFA-CD08-425A-9808-BE49C21D580B}" destId="{3C293340-5887-41DE-859C-77675150C6EB}" srcOrd="0" destOrd="0" presId="urn:microsoft.com/office/officeart/2005/8/layout/orgChart1"/>
     <dgm:cxn modelId="{6BB4C4E8-ED81-4799-95D5-B6033938A327}" type="presOf" srcId="{44363CFA-628E-4026-88F3-8868490E44F8}" destId="{2D05126F-7CA9-467A-B341-F8E1AF5FCF66}" srcOrd="0" destOrd="0" presId="urn:microsoft.com/office/officeart/2005/8/layout/orgChart1"/>
+    <dgm:cxn modelId="{4FDFA2ED-B79E-47AF-A7D1-362FF3E41002}" srcId="{28ACC96C-DAEE-4690-912C-9633C398023B}" destId="{5DF6C11B-377F-47FB-BC50-A7E3E32B7B43}" srcOrd="1" destOrd="0" parTransId="{D672805F-D531-46CA-8240-38805655CA82}" sibTransId="{02CB11EC-9DE7-441C-B4FD-6C7BD018BCA0}"/>
     <dgm:cxn modelId="{B5EC76EE-B0C8-4D57-AD52-D04FB5616EC9}" type="presOf" srcId="{EB65517D-69B4-43D8-B5D7-51657BA54F8A}" destId="{15D3E976-5568-44A0-A255-991A6803201C}" srcOrd="1" destOrd="0" presId="urn:microsoft.com/office/officeart/2005/8/layout/orgChart1"/>
     <dgm:cxn modelId="{2987C2EF-D373-40CB-A3CB-1FE39C3C0855}" type="presOf" srcId="{10948DB9-C87A-4CB4-AA25-2159E53038FA}" destId="{BEB1E389-DC78-4834-98AF-B72FEAAD2902}" srcOrd="1" destOrd="0" presId="urn:microsoft.com/office/officeart/2005/8/layout/orgChart1"/>
     <dgm:cxn modelId="{C8ABDCEF-2C6B-447C-B5D4-7BA5799C33EA}" type="presOf" srcId="{476A2B4E-0CFD-4F03-9824-25789D527EDB}" destId="{C01F831D-EFD6-481A-9BCE-21CF8207E0E1}" srcOrd="0" destOrd="0" presId="urn:microsoft.com/office/officeart/2005/8/layout/orgChart1"/>
@@ -6363,6 +6637,27 @@
     <dgm:cxn modelId="{45F94CA4-F931-4C58-8F07-0AE8A82F5B4F}" type="presParOf" srcId="{E9FEC899-8424-4F91-BF00-9F0EA2743AA9}" destId="{0328B132-74A6-4425-821D-84668D625AD9}" srcOrd="1" destOrd="0" presId="urn:microsoft.com/office/officeart/2005/8/layout/orgChart1"/>
     <dgm:cxn modelId="{A6FECA18-7962-4688-9DEE-A0188685EAAA}" type="presParOf" srcId="{C9B38781-C395-4C17-8C7F-BEE957BD4249}" destId="{2576764E-D309-4CA8-B535-2E32B2410668}" srcOrd="1" destOrd="0" presId="urn:microsoft.com/office/officeart/2005/8/layout/orgChart1"/>
     <dgm:cxn modelId="{64508501-DCAE-4EAB-973D-2C42724DCA1F}" type="presParOf" srcId="{C9B38781-C395-4C17-8C7F-BEE957BD4249}" destId="{B0D3F576-543B-4CA5-96FD-7BC4FFB37716}" srcOrd="2" destOrd="0" presId="urn:microsoft.com/office/officeart/2005/8/layout/orgChart1"/>
+    <dgm:cxn modelId="{B5C14819-387C-433B-AB99-9A9D7D1B07FD}" type="presParOf" srcId="{E4F35EED-3168-4BAF-B012-BC20D796120D}" destId="{DC0B8C07-BCD6-4D91-BB5F-6E51880E10CA}" srcOrd="14" destOrd="0" presId="urn:microsoft.com/office/officeart/2005/8/layout/orgChart1"/>
+    <dgm:cxn modelId="{A8BB6728-9D05-4421-B3F4-C35D07E6592D}" type="presParOf" srcId="{E4F35EED-3168-4BAF-B012-BC20D796120D}" destId="{B4ED0032-F552-4842-84E2-122A4AFFF45E}" srcOrd="15" destOrd="0" presId="urn:microsoft.com/office/officeart/2005/8/layout/orgChart1"/>
+    <dgm:cxn modelId="{EDDC5C7C-5698-4290-8CF0-AC001DD52906}" type="presParOf" srcId="{B4ED0032-F552-4842-84E2-122A4AFFF45E}" destId="{6D33168C-FBE8-4F1B-BC43-FCCC2110A207}" srcOrd="0" destOrd="0" presId="urn:microsoft.com/office/officeart/2005/8/layout/orgChart1"/>
+    <dgm:cxn modelId="{CD2D3819-86CD-4CC6-9543-031D5B578087}" type="presParOf" srcId="{6D33168C-FBE8-4F1B-BC43-FCCC2110A207}" destId="{99BBCD64-0904-4F94-938B-1D4FAE73A2E1}" srcOrd="0" destOrd="0" presId="urn:microsoft.com/office/officeart/2005/8/layout/orgChart1"/>
+    <dgm:cxn modelId="{69F82B0E-6535-4F21-B2B1-3FF4C13F9C4B}" type="presParOf" srcId="{6D33168C-FBE8-4F1B-BC43-FCCC2110A207}" destId="{4C381AC9-173E-441C-AC7D-6F1D3FC15D8A}" srcOrd="1" destOrd="0" presId="urn:microsoft.com/office/officeart/2005/8/layout/orgChart1"/>
+    <dgm:cxn modelId="{04C1792A-AC9F-433B-8E30-0FBE1C7F167B}" type="presParOf" srcId="{B4ED0032-F552-4842-84E2-122A4AFFF45E}" destId="{1E03C464-5C83-400B-BDFE-953A491844E5}" srcOrd="1" destOrd="0" presId="urn:microsoft.com/office/officeart/2005/8/layout/orgChart1"/>
+    <dgm:cxn modelId="{11CBB448-8257-440B-A922-D8C1CEBA1424}" type="presParOf" srcId="{1E03C464-5C83-400B-BDFE-953A491844E5}" destId="{98DF9615-6AB1-4615-98A9-227A4B3AE02B}" srcOrd="0" destOrd="0" presId="urn:microsoft.com/office/officeart/2005/8/layout/orgChart1"/>
+    <dgm:cxn modelId="{D57CADD3-B6AC-4836-96A0-C21DD2440AE4}" type="presParOf" srcId="{1E03C464-5C83-400B-BDFE-953A491844E5}" destId="{F4F6AA9E-5CC7-4688-8E0A-DFFF2E2453E3}" srcOrd="1" destOrd="0" presId="urn:microsoft.com/office/officeart/2005/8/layout/orgChart1"/>
+    <dgm:cxn modelId="{F84D56F8-218A-4B44-A920-BEE2EFEA5E70}" type="presParOf" srcId="{F4F6AA9E-5CC7-4688-8E0A-DFFF2E2453E3}" destId="{BEBC0944-3EE9-44C2-9697-A828E10A67CD}" srcOrd="0" destOrd="0" presId="urn:microsoft.com/office/officeart/2005/8/layout/orgChart1"/>
+    <dgm:cxn modelId="{C5FA15F0-E63F-49C1-B765-DB10FE137B98}" type="presParOf" srcId="{BEBC0944-3EE9-44C2-9697-A828E10A67CD}" destId="{7A882588-0810-4F92-AD23-756B9035A4E8}" srcOrd="0" destOrd="0" presId="urn:microsoft.com/office/officeart/2005/8/layout/orgChart1"/>
+    <dgm:cxn modelId="{D054E011-D61C-4A09-951E-586270A52E4B}" type="presParOf" srcId="{BEBC0944-3EE9-44C2-9697-A828E10A67CD}" destId="{241D6C5A-A704-4FEC-BFA2-42E7E1150593}" srcOrd="1" destOrd="0" presId="urn:microsoft.com/office/officeart/2005/8/layout/orgChart1"/>
+    <dgm:cxn modelId="{11D83B0C-3F0A-4CFA-B963-6EF8F3B2095E}" type="presParOf" srcId="{F4F6AA9E-5CC7-4688-8E0A-DFFF2E2453E3}" destId="{1773CDB1-D2E3-4EAE-A42A-B036DC3596AE}" srcOrd="1" destOrd="0" presId="urn:microsoft.com/office/officeart/2005/8/layout/orgChart1"/>
+    <dgm:cxn modelId="{DE53CC96-EF59-48E8-8A62-801FE5FD9A89}" type="presParOf" srcId="{F4F6AA9E-5CC7-4688-8E0A-DFFF2E2453E3}" destId="{3E037070-2817-4D54-B26C-AD6AA1BCCF21}" srcOrd="2" destOrd="0" presId="urn:microsoft.com/office/officeart/2005/8/layout/orgChart1"/>
+    <dgm:cxn modelId="{0A4A03DF-37BD-43FC-994D-BC50D6AE18B9}" type="presParOf" srcId="{1E03C464-5C83-400B-BDFE-953A491844E5}" destId="{B4023B61-E2B4-4C69-A00E-8B14067C6DC3}" srcOrd="2" destOrd="0" presId="urn:microsoft.com/office/officeart/2005/8/layout/orgChart1"/>
+    <dgm:cxn modelId="{B9557D77-E3D8-41EF-95C3-07110C7F6659}" type="presParOf" srcId="{1E03C464-5C83-400B-BDFE-953A491844E5}" destId="{BBBC079C-B4BF-4ADF-8148-1298E67D0F08}" srcOrd="3" destOrd="0" presId="urn:microsoft.com/office/officeart/2005/8/layout/orgChart1"/>
+    <dgm:cxn modelId="{91D6D62D-488D-41E8-85B5-F0EB0EAEE078}" type="presParOf" srcId="{BBBC079C-B4BF-4ADF-8148-1298E67D0F08}" destId="{EEAEFE05-4F93-465F-AAC6-E4FB3B09264E}" srcOrd="0" destOrd="0" presId="urn:microsoft.com/office/officeart/2005/8/layout/orgChart1"/>
+    <dgm:cxn modelId="{0CD17DF2-CCE6-436A-9803-31E05D20DEF4}" type="presParOf" srcId="{EEAEFE05-4F93-465F-AAC6-E4FB3B09264E}" destId="{B04C15FD-14A3-4E7B-895B-7C4AF0E8908C}" srcOrd="0" destOrd="0" presId="urn:microsoft.com/office/officeart/2005/8/layout/orgChart1"/>
+    <dgm:cxn modelId="{BDE6E9B0-A786-44DE-BA58-2A37EB505501}" type="presParOf" srcId="{EEAEFE05-4F93-465F-AAC6-E4FB3B09264E}" destId="{D2420743-058E-43CD-8DE7-96F37C968137}" srcOrd="1" destOrd="0" presId="urn:microsoft.com/office/officeart/2005/8/layout/orgChart1"/>
+    <dgm:cxn modelId="{2D28EB6B-96DE-4635-95EE-234D3ACD76EC}" type="presParOf" srcId="{BBBC079C-B4BF-4ADF-8148-1298E67D0F08}" destId="{0C86AA4C-1483-49E1-8C49-98CA315494B9}" srcOrd="1" destOrd="0" presId="urn:microsoft.com/office/officeart/2005/8/layout/orgChart1"/>
+    <dgm:cxn modelId="{C9A2FC6C-ADF4-477E-ACFB-86D4B3B27040}" type="presParOf" srcId="{BBBC079C-B4BF-4ADF-8148-1298E67D0F08}" destId="{4A65B302-E416-4124-B5ED-C3ABD07F5905}" srcOrd="2" destOrd="0" presId="urn:microsoft.com/office/officeart/2005/8/layout/orgChart1"/>
+    <dgm:cxn modelId="{97490C6A-BA30-43E1-AFBB-58A5AECD5355}" type="presParOf" srcId="{B4ED0032-F552-4842-84E2-122A4AFFF45E}" destId="{761E2FBE-BF4C-4F06-94D6-4399B7503FC9}" srcOrd="2" destOrd="0" presId="urn:microsoft.com/office/officeart/2005/8/layout/orgChart1"/>
     <dgm:cxn modelId="{882046F6-F1A3-4334-AD7D-2E1C4A1F6BF0}" type="presParOf" srcId="{8B848A77-7266-476A-B593-64C912A0F29B}" destId="{2DAC1630-BA8F-4206-952C-EBE673153874}" srcOrd="2" destOrd="0" presId="urn:microsoft.com/office/officeart/2005/8/layout/orgChart1"/>
   </dgm:cxnLst>
   <dgm:bg/>
@@ -8867,15 +9162,15 @@
       <dsp:cNvGrpSpPr/>
     </dsp:nvGrpSpPr>
     <dsp:grpSpPr/>
-    <dsp:sp modelId="{C01F831D-EFD6-481A-9BCE-21CF8207E0E1}">
+    <dsp:sp modelId="{B4023B61-E2B4-4C69-A00E-8B14067C6DC3}">
       <dsp:nvSpPr>
         <dsp:cNvPr id="0" name=""/>
         <dsp:cNvSpPr/>
       </dsp:nvSpPr>
       <dsp:spPr>
         <a:xfrm>
-          <a:off x="5257800" y="470624"/>
-          <a:ext cx="3530707" cy="197456"/>
+          <a:off x="10348131" y="1344513"/>
+          <a:ext cx="166315" cy="1297260"/>
         </a:xfrm>
         <a:custGeom>
           <a:avLst/>
@@ -8889,13 +9184,131 @@
                 <a:pt x="0" y="0"/>
               </a:moveTo>
               <a:lnTo>
-                <a:pt x="0" y="98728"/>
+                <a:pt x="0" y="1297260"/>
               </a:lnTo>
               <a:lnTo>
-                <a:pt x="3530707" y="98728"/>
+                <a:pt x="166315" y="1297260"/>
+              </a:lnTo>
+            </a:path>
+          </a:pathLst>
+        </a:custGeom>
+        <a:noFill/>
+        <a:ln w="12700" cap="flat" cmpd="sng" algn="ctr">
+          <a:solidFill>
+            <a:schemeClr val="accent1">
+              <a:shade val="80000"/>
+              <a:hueOff val="0"/>
+              <a:satOff val="0"/>
+              <a:lumOff val="0"/>
+              <a:alphaOff val="0"/>
+            </a:schemeClr>
+          </a:solidFill>
+          <a:prstDash val="solid"/>
+          <a:miter lim="800000"/>
+        </a:ln>
+        <a:effectLst/>
+      </dsp:spPr>
+      <dsp:style>
+        <a:lnRef idx="2">
+          <a:scrgbClr r="0" g="0" b="0"/>
+        </a:lnRef>
+        <a:fillRef idx="0">
+          <a:scrgbClr r="0" g="0" b="0"/>
+        </a:fillRef>
+        <a:effectRef idx="0">
+          <a:scrgbClr r="0" g="0" b="0"/>
+        </a:effectRef>
+        <a:fontRef idx="minor"/>
+      </dsp:style>
+    </dsp:sp>
+    <dsp:sp modelId="{98DF9615-6AB1-4615-98A9-227A4B3AE02B}">
+      <dsp:nvSpPr>
+        <dsp:cNvPr id="0" name=""/>
+        <dsp:cNvSpPr/>
+      </dsp:nvSpPr>
+      <dsp:spPr>
+        <a:xfrm>
+          <a:off x="10348131" y="1344513"/>
+          <a:ext cx="166315" cy="510033"/>
+        </a:xfrm>
+        <a:custGeom>
+          <a:avLst/>
+          <a:gdLst/>
+          <a:ahLst/>
+          <a:cxnLst/>
+          <a:rect l="0" t="0" r="0" b="0"/>
+          <a:pathLst>
+            <a:path>
+              <a:moveTo>
+                <a:pt x="0" y="0"/>
+              </a:moveTo>
+              <a:lnTo>
+                <a:pt x="0" y="510033"/>
               </a:lnTo>
               <a:lnTo>
-                <a:pt x="3530707" y="197456"/>
+                <a:pt x="166315" y="510033"/>
+              </a:lnTo>
+            </a:path>
+          </a:pathLst>
+        </a:custGeom>
+        <a:noFill/>
+        <a:ln w="12700" cap="flat" cmpd="sng" algn="ctr">
+          <a:solidFill>
+            <a:schemeClr val="accent1">
+              <a:shade val="80000"/>
+              <a:hueOff val="0"/>
+              <a:satOff val="0"/>
+              <a:lumOff val="0"/>
+              <a:alphaOff val="0"/>
+            </a:schemeClr>
+          </a:solidFill>
+          <a:prstDash val="solid"/>
+          <a:miter lim="800000"/>
+        </a:ln>
+        <a:effectLst/>
+      </dsp:spPr>
+      <dsp:style>
+        <a:lnRef idx="2">
+          <a:scrgbClr r="0" g="0" b="0"/>
+        </a:lnRef>
+        <a:fillRef idx="0">
+          <a:scrgbClr r="0" g="0" b="0"/>
+        </a:fillRef>
+        <a:effectRef idx="0">
+          <a:scrgbClr r="0" g="0" b="0"/>
+        </a:effectRef>
+        <a:fontRef idx="minor"/>
+      </dsp:style>
+    </dsp:sp>
+    <dsp:sp modelId="{DC0B8C07-BCD6-4D91-BB5F-6E51880E10CA}">
+      <dsp:nvSpPr>
+        <dsp:cNvPr id="0" name=""/>
+        <dsp:cNvSpPr/>
+      </dsp:nvSpPr>
+      <dsp:spPr>
+        <a:xfrm>
+          <a:off x="5957403" y="557286"/>
+          <a:ext cx="4834235" cy="232841"/>
+        </a:xfrm>
+        <a:custGeom>
+          <a:avLst/>
+          <a:gdLst/>
+          <a:ahLst/>
+          <a:cxnLst/>
+          <a:rect l="0" t="0" r="0" b="0"/>
+          <a:pathLst>
+            <a:path>
+              <a:moveTo>
+                <a:pt x="0" y="0"/>
+              </a:moveTo>
+              <a:lnTo>
+                <a:pt x="0" y="116420"/>
+              </a:lnTo>
+              <a:lnTo>
+                <a:pt x="4834235" y="116420"/>
+              </a:lnTo>
+              <a:lnTo>
+                <a:pt x="4834235" y="232841"/>
               </a:lnTo>
             </a:path>
           </a:pathLst>
@@ -8929,15 +9342,15 @@
         <a:fontRef idx="minor"/>
       </dsp:style>
     </dsp:sp>
-    <dsp:sp modelId="{471300FB-DB21-4C22-8086-4742D736E0BD}">
+    <dsp:sp modelId="{C01F831D-EFD6-481A-9BCE-21CF8207E0E1}">
       <dsp:nvSpPr>
         <dsp:cNvPr id="0" name=""/>
         <dsp:cNvSpPr/>
       </dsp:nvSpPr>
       <dsp:spPr>
         <a:xfrm>
-          <a:off x="7274675" y="1805805"/>
-          <a:ext cx="141040" cy="1100113"/>
+          <a:off x="5957403" y="557286"/>
+          <a:ext cx="3492624" cy="232841"/>
         </a:xfrm>
         <a:custGeom>
           <a:avLst/>
@@ -8951,10 +9364,72 @@
                 <a:pt x="0" y="0"/>
               </a:moveTo>
               <a:lnTo>
-                <a:pt x="0" y="1100113"/>
+                <a:pt x="0" y="116420"/>
               </a:lnTo>
               <a:lnTo>
-                <a:pt x="141040" y="1100113"/>
+                <a:pt x="3492624" y="116420"/>
+              </a:lnTo>
+              <a:lnTo>
+                <a:pt x="3492624" y="232841"/>
+              </a:lnTo>
+            </a:path>
+          </a:pathLst>
+        </a:custGeom>
+        <a:noFill/>
+        <a:ln w="12700" cap="flat" cmpd="sng" algn="ctr">
+          <a:solidFill>
+            <a:schemeClr val="accent1">
+              <a:shade val="60000"/>
+              <a:hueOff val="0"/>
+              <a:satOff val="0"/>
+              <a:lumOff val="0"/>
+              <a:alphaOff val="0"/>
+            </a:schemeClr>
+          </a:solidFill>
+          <a:prstDash val="solid"/>
+          <a:miter lim="800000"/>
+        </a:ln>
+        <a:effectLst/>
+      </dsp:spPr>
+      <dsp:style>
+        <a:lnRef idx="2">
+          <a:scrgbClr r="0" g="0" b="0"/>
+        </a:lnRef>
+        <a:fillRef idx="0">
+          <a:scrgbClr r="0" g="0" b="0"/>
+        </a:fillRef>
+        <a:effectRef idx="0">
+          <a:scrgbClr r="0" g="0" b="0"/>
+        </a:effectRef>
+        <a:fontRef idx="minor"/>
+      </dsp:style>
+    </dsp:sp>
+    <dsp:sp modelId="{471300FB-DB21-4C22-8086-4742D736E0BD}">
+      <dsp:nvSpPr>
+        <dsp:cNvPr id="0" name=""/>
+        <dsp:cNvSpPr/>
+      </dsp:nvSpPr>
+      <dsp:spPr>
+        <a:xfrm>
+          <a:off x="7664908" y="2131739"/>
+          <a:ext cx="166315" cy="1297260"/>
+        </a:xfrm>
+        <a:custGeom>
+          <a:avLst/>
+          <a:gdLst/>
+          <a:ahLst/>
+          <a:cxnLst/>
+          <a:rect l="0" t="0" r="0" b="0"/>
+          <a:pathLst>
+            <a:path>
+              <a:moveTo>
+                <a:pt x="0" y="0"/>
+              </a:moveTo>
+              <a:lnTo>
+                <a:pt x="0" y="1297260"/>
+              </a:lnTo>
+              <a:lnTo>
+                <a:pt x="166315" y="1297260"/>
               </a:lnTo>
             </a:path>
           </a:pathLst>
@@ -8995,8 +9470,8 @@
       </dsp:nvSpPr>
       <dsp:spPr>
         <a:xfrm>
-          <a:off x="7274675" y="1805805"/>
-          <a:ext cx="141040" cy="432523"/>
+          <a:off x="7664908" y="2131739"/>
+          <a:ext cx="166315" cy="510033"/>
         </a:xfrm>
         <a:custGeom>
           <a:avLst/>
@@ -9010,10 +9485,10 @@
                 <a:pt x="0" y="0"/>
               </a:moveTo>
               <a:lnTo>
-                <a:pt x="0" y="432523"/>
+                <a:pt x="0" y="510033"/>
               </a:lnTo>
               <a:lnTo>
-                <a:pt x="141040" y="432523"/>
+                <a:pt x="166315" y="510033"/>
               </a:lnTo>
             </a:path>
           </a:pathLst>
@@ -9054,8 +9529,8 @@
       </dsp:nvSpPr>
       <dsp:spPr>
         <a:xfrm>
-          <a:off x="7605062" y="1138214"/>
-          <a:ext cx="91440" cy="197456"/>
+          <a:off x="8062696" y="1344513"/>
+          <a:ext cx="91440" cy="232841"/>
         </a:xfrm>
         <a:custGeom>
           <a:avLst/>
@@ -9069,7 +9544,7 @@
                 <a:pt x="45720" y="0"/>
               </a:moveTo>
               <a:lnTo>
-                <a:pt x="45720" y="197456"/>
+                <a:pt x="45720" y="232841"/>
               </a:lnTo>
             </a:path>
           </a:pathLst>
@@ -9110,8 +9585,8 @@
       </dsp:nvSpPr>
       <dsp:spPr>
         <a:xfrm>
-          <a:off x="5257800" y="470624"/>
-          <a:ext cx="2392982" cy="197456"/>
+          <a:off x="5957403" y="557286"/>
+          <a:ext cx="2151012" cy="232841"/>
         </a:xfrm>
         <a:custGeom>
           <a:avLst/>
@@ -9125,13 +9600,13 @@
                 <a:pt x="0" y="0"/>
               </a:moveTo>
               <a:lnTo>
-                <a:pt x="0" y="98728"/>
+                <a:pt x="0" y="116420"/>
               </a:lnTo>
               <a:lnTo>
-                <a:pt x="2392982" y="98728"/>
+                <a:pt x="2151012" y="116420"/>
               </a:lnTo>
               <a:lnTo>
-                <a:pt x="2392982" y="197456"/>
+                <a:pt x="2151012" y="232841"/>
               </a:lnTo>
             </a:path>
           </a:pathLst>
@@ -9172,8 +9647,8 @@
       </dsp:nvSpPr>
       <dsp:spPr>
         <a:xfrm>
-          <a:off x="5901883" y="1138214"/>
-          <a:ext cx="141040" cy="432523"/>
+          <a:off x="6046105" y="1344513"/>
+          <a:ext cx="166315" cy="510033"/>
         </a:xfrm>
         <a:custGeom>
           <a:avLst/>
@@ -9187,10 +9662,10 @@
                 <a:pt x="0" y="0"/>
               </a:moveTo>
               <a:lnTo>
-                <a:pt x="0" y="432523"/>
+                <a:pt x="0" y="510033"/>
               </a:lnTo>
               <a:lnTo>
-                <a:pt x="141040" y="432523"/>
+                <a:pt x="166315" y="510033"/>
               </a:lnTo>
             </a:path>
           </a:pathLst>
@@ -9231,8 +9706,8 @@
       </dsp:nvSpPr>
       <dsp:spPr>
         <a:xfrm>
-          <a:off x="5257800" y="470624"/>
-          <a:ext cx="1020190" cy="197456"/>
+          <a:off x="5957403" y="557286"/>
+          <a:ext cx="532209" cy="232841"/>
         </a:xfrm>
         <a:custGeom>
           <a:avLst/>
@@ -9246,13 +9721,13 @@
                 <a:pt x="0" y="0"/>
               </a:moveTo>
               <a:lnTo>
-                <a:pt x="0" y="98728"/>
+                <a:pt x="0" y="116420"/>
               </a:lnTo>
               <a:lnTo>
-                <a:pt x="1020190" y="98728"/>
+                <a:pt x="532209" y="116420"/>
               </a:lnTo>
               <a:lnTo>
-                <a:pt x="1020190" y="197456"/>
+                <a:pt x="532209" y="232841"/>
               </a:lnTo>
             </a:path>
           </a:pathLst>
@@ -9293,8 +9768,8 @@
       </dsp:nvSpPr>
       <dsp:spPr>
         <a:xfrm>
-          <a:off x="4764159" y="1138214"/>
-          <a:ext cx="141040" cy="4438065"/>
+          <a:off x="4704494" y="1344513"/>
+          <a:ext cx="166315" cy="5233392"/>
         </a:xfrm>
         <a:custGeom>
           <a:avLst/>
@@ -9308,10 +9783,10 @@
                 <a:pt x="0" y="0"/>
               </a:moveTo>
               <a:lnTo>
-                <a:pt x="0" y="4438065"/>
+                <a:pt x="0" y="5233392"/>
               </a:lnTo>
               <a:lnTo>
-                <a:pt x="141040" y="4438065"/>
+                <a:pt x="166315" y="5233392"/>
               </a:lnTo>
             </a:path>
           </a:pathLst>
@@ -9352,8 +9827,8 @@
       </dsp:nvSpPr>
       <dsp:spPr>
         <a:xfrm>
-          <a:off x="4764159" y="1138214"/>
-          <a:ext cx="141040" cy="3770475"/>
+          <a:off x="4704494" y="1344513"/>
+          <a:ext cx="166315" cy="4446165"/>
         </a:xfrm>
         <a:custGeom>
           <a:avLst/>
@@ -9367,10 +9842,10 @@
                 <a:pt x="0" y="0"/>
               </a:moveTo>
               <a:lnTo>
-                <a:pt x="0" y="3770475"/>
+                <a:pt x="0" y="4446165"/>
               </a:lnTo>
               <a:lnTo>
-                <a:pt x="141040" y="3770475"/>
+                <a:pt x="166315" y="4446165"/>
               </a:lnTo>
             </a:path>
           </a:pathLst>
@@ -9411,8 +9886,8 @@
       </dsp:nvSpPr>
       <dsp:spPr>
         <a:xfrm>
-          <a:off x="4764159" y="1138214"/>
-          <a:ext cx="141040" cy="3102885"/>
+          <a:off x="4704494" y="1344513"/>
+          <a:ext cx="166315" cy="3658939"/>
         </a:xfrm>
         <a:custGeom>
           <a:avLst/>
@@ -9426,10 +9901,10 @@
                 <a:pt x="0" y="0"/>
               </a:moveTo>
               <a:lnTo>
-                <a:pt x="0" y="3102885"/>
+                <a:pt x="0" y="3658939"/>
               </a:lnTo>
               <a:lnTo>
-                <a:pt x="141040" y="3102885"/>
+                <a:pt x="166315" y="3658939"/>
               </a:lnTo>
             </a:path>
           </a:pathLst>
@@ -9470,8 +9945,8 @@
       </dsp:nvSpPr>
       <dsp:spPr>
         <a:xfrm>
-          <a:off x="4764159" y="1138214"/>
-          <a:ext cx="141040" cy="2435294"/>
+          <a:off x="4704494" y="1344513"/>
+          <a:ext cx="166315" cy="2871713"/>
         </a:xfrm>
         <a:custGeom>
           <a:avLst/>
@@ -9485,10 +9960,10 @@
                 <a:pt x="0" y="0"/>
               </a:moveTo>
               <a:lnTo>
-                <a:pt x="0" y="2435294"/>
+                <a:pt x="0" y="2871713"/>
               </a:lnTo>
               <a:lnTo>
-                <a:pt x="141040" y="2435294"/>
+                <a:pt x="166315" y="2871713"/>
               </a:lnTo>
             </a:path>
           </a:pathLst>
@@ -9529,8 +10004,8 @@
       </dsp:nvSpPr>
       <dsp:spPr>
         <a:xfrm>
-          <a:off x="4764159" y="1138214"/>
-          <a:ext cx="141040" cy="1767704"/>
+          <a:off x="4704494" y="1344513"/>
+          <a:ext cx="166315" cy="2084486"/>
         </a:xfrm>
         <a:custGeom>
           <a:avLst/>
@@ -9544,10 +10019,10 @@
                 <a:pt x="0" y="0"/>
               </a:moveTo>
               <a:lnTo>
-                <a:pt x="0" y="1767704"/>
+                <a:pt x="0" y="2084486"/>
               </a:lnTo>
               <a:lnTo>
-                <a:pt x="141040" y="1767704"/>
+                <a:pt x="166315" y="2084486"/>
               </a:lnTo>
             </a:path>
           </a:pathLst>
@@ -9588,8 +10063,8 @@
       </dsp:nvSpPr>
       <dsp:spPr>
         <a:xfrm>
-          <a:off x="4764159" y="1138214"/>
-          <a:ext cx="141040" cy="1100113"/>
+          <a:off x="4704494" y="1344513"/>
+          <a:ext cx="166315" cy="1297260"/>
         </a:xfrm>
         <a:custGeom>
           <a:avLst/>
@@ -9603,10 +10078,10 @@
                 <a:pt x="0" y="0"/>
               </a:moveTo>
               <a:lnTo>
-                <a:pt x="0" y="1100113"/>
+                <a:pt x="0" y="1297260"/>
               </a:lnTo>
               <a:lnTo>
-                <a:pt x="141040" y="1100113"/>
+                <a:pt x="166315" y="1297260"/>
               </a:lnTo>
             </a:path>
           </a:pathLst>
@@ -9647,8 +10122,8 @@
       </dsp:nvSpPr>
       <dsp:spPr>
         <a:xfrm>
-          <a:off x="4764159" y="1138214"/>
-          <a:ext cx="141040" cy="432523"/>
+          <a:off x="4704494" y="1344513"/>
+          <a:ext cx="166315" cy="510033"/>
         </a:xfrm>
         <a:custGeom>
           <a:avLst/>
@@ -9662,10 +10137,10 @@
                 <a:pt x="0" y="0"/>
               </a:moveTo>
               <a:lnTo>
-                <a:pt x="0" y="432523"/>
+                <a:pt x="0" y="510033"/>
               </a:lnTo>
               <a:lnTo>
-                <a:pt x="141040" y="432523"/>
+                <a:pt x="166315" y="510033"/>
               </a:lnTo>
             </a:path>
           </a:pathLst>
@@ -9706,8 +10181,8 @@
       </dsp:nvSpPr>
       <dsp:spPr>
         <a:xfrm>
-          <a:off x="5140266" y="470624"/>
-          <a:ext cx="117533" cy="197456"/>
+          <a:off x="5148002" y="557286"/>
+          <a:ext cx="809401" cy="232841"/>
         </a:xfrm>
         <a:custGeom>
           <a:avLst/>
@@ -9718,16 +10193,16 @@
           <a:pathLst>
             <a:path>
               <a:moveTo>
-                <a:pt x="117533" y="0"/>
+                <a:pt x="809401" y="0"/>
               </a:moveTo>
               <a:lnTo>
-                <a:pt x="117533" y="98728"/>
+                <a:pt x="809401" y="116420"/>
               </a:lnTo>
               <a:lnTo>
-                <a:pt x="0" y="98728"/>
+                <a:pt x="0" y="116420"/>
               </a:lnTo>
               <a:lnTo>
-                <a:pt x="0" y="197456"/>
+                <a:pt x="0" y="232841"/>
               </a:lnTo>
             </a:path>
           </a:pathLst>
@@ -9768,8 +10243,8 @@
       </dsp:nvSpPr>
       <dsp:spPr>
         <a:xfrm>
-          <a:off x="4002541" y="470624"/>
-          <a:ext cx="1255258" cy="197456"/>
+          <a:off x="3806390" y="557286"/>
+          <a:ext cx="2151012" cy="232841"/>
         </a:xfrm>
         <a:custGeom>
           <a:avLst/>
@@ -9780,16 +10255,16 @@
           <a:pathLst>
             <a:path>
               <a:moveTo>
-                <a:pt x="1255258" y="0"/>
+                <a:pt x="2151012" y="0"/>
               </a:moveTo>
               <a:lnTo>
-                <a:pt x="1255258" y="98728"/>
+                <a:pt x="2151012" y="116420"/>
               </a:lnTo>
               <a:lnTo>
-                <a:pt x="0" y="98728"/>
+                <a:pt x="0" y="116420"/>
               </a:lnTo>
               <a:lnTo>
-                <a:pt x="0" y="197456"/>
+                <a:pt x="0" y="232841"/>
               </a:lnTo>
             </a:path>
           </a:pathLst>
@@ -9830,8 +10305,8 @@
       </dsp:nvSpPr>
       <dsp:spPr>
         <a:xfrm>
-          <a:off x="2488710" y="1138214"/>
-          <a:ext cx="141040" cy="432523"/>
+          <a:off x="2021271" y="1344513"/>
+          <a:ext cx="166315" cy="510033"/>
         </a:xfrm>
         <a:custGeom>
           <a:avLst/>
@@ -9845,10 +10320,10 @@
                 <a:pt x="0" y="0"/>
               </a:moveTo>
               <a:lnTo>
-                <a:pt x="0" y="432523"/>
+                <a:pt x="0" y="510033"/>
               </a:lnTo>
               <a:lnTo>
-                <a:pt x="141040" y="432523"/>
+                <a:pt x="166315" y="510033"/>
               </a:lnTo>
             </a:path>
           </a:pathLst>
@@ -9889,8 +10364,8 @@
       </dsp:nvSpPr>
       <dsp:spPr>
         <a:xfrm>
-          <a:off x="2864817" y="470624"/>
-          <a:ext cx="2392982" cy="197456"/>
+          <a:off x="2464779" y="557286"/>
+          <a:ext cx="3492624" cy="232841"/>
         </a:xfrm>
         <a:custGeom>
           <a:avLst/>
@@ -9901,16 +10376,16 @@
           <a:pathLst>
             <a:path>
               <a:moveTo>
-                <a:pt x="2392982" y="0"/>
+                <a:pt x="3492624" y="0"/>
               </a:moveTo>
               <a:lnTo>
-                <a:pt x="2392982" y="98728"/>
+                <a:pt x="3492624" y="116420"/>
               </a:lnTo>
               <a:lnTo>
-                <a:pt x="0" y="98728"/>
+                <a:pt x="0" y="116420"/>
               </a:lnTo>
               <a:lnTo>
-                <a:pt x="0" y="197456"/>
+                <a:pt x="0" y="232841"/>
               </a:lnTo>
             </a:path>
           </a:pathLst>
@@ -9951,8 +10426,8 @@
       </dsp:nvSpPr>
       <dsp:spPr>
         <a:xfrm>
-          <a:off x="1350985" y="1138214"/>
-          <a:ext cx="141040" cy="432523"/>
+          <a:off x="679660" y="1344513"/>
+          <a:ext cx="166315" cy="510033"/>
         </a:xfrm>
         <a:custGeom>
           <a:avLst/>
@@ -9966,10 +10441,10 @@
                 <a:pt x="0" y="0"/>
               </a:moveTo>
               <a:lnTo>
-                <a:pt x="0" y="432523"/>
+                <a:pt x="0" y="510033"/>
               </a:lnTo>
               <a:lnTo>
-                <a:pt x="141040" y="432523"/>
+                <a:pt x="166315" y="510033"/>
               </a:lnTo>
             </a:path>
           </a:pathLst>
@@ -10010,8 +10485,8 @@
       </dsp:nvSpPr>
       <dsp:spPr>
         <a:xfrm>
-          <a:off x="1727092" y="470624"/>
-          <a:ext cx="3530707" cy="197456"/>
+          <a:off x="1123168" y="557286"/>
+          <a:ext cx="4834235" cy="232841"/>
         </a:xfrm>
         <a:custGeom>
           <a:avLst/>
@@ -10022,16 +10497,16 @@
           <a:pathLst>
             <a:path>
               <a:moveTo>
-                <a:pt x="3530707" y="0"/>
+                <a:pt x="4834235" y="0"/>
               </a:moveTo>
               <a:lnTo>
-                <a:pt x="3530707" y="98728"/>
+                <a:pt x="4834235" y="116420"/>
               </a:lnTo>
               <a:lnTo>
-                <a:pt x="0" y="98728"/>
+                <a:pt x="0" y="116420"/>
               </a:lnTo>
               <a:lnTo>
-                <a:pt x="0" y="197456"/>
+                <a:pt x="0" y="232841"/>
               </a:lnTo>
             </a:path>
           </a:pathLst>
@@ -10072,8 +10547,8 @@
       </dsp:nvSpPr>
       <dsp:spPr>
         <a:xfrm>
-          <a:off x="4787665" y="490"/>
-          <a:ext cx="940268" cy="470134"/>
+          <a:off x="5403019" y="2902"/>
+          <a:ext cx="1108769" cy="554384"/>
         </a:xfrm>
         <a:prstGeom prst="rect">
           <a:avLst/>
@@ -10115,12 +10590,12 @@
         </a:fontRef>
       </dsp:style>
       <dsp:txBody>
-        <a:bodyPr spcFirstLastPara="0" vert="horz" wrap="square" lIns="4445" tIns="4445" rIns="4445" bIns="4445" numCol="1" spcCol="1270" anchor="ctr" anchorCtr="0">
+        <a:bodyPr spcFirstLastPara="0" vert="horz" wrap="square" lIns="5080" tIns="5080" rIns="5080" bIns="5080" numCol="1" spcCol="1270" anchor="ctr" anchorCtr="0">
           <a:noAutofit/>
         </a:bodyPr>
         <a:lstStyle/>
         <a:p>
-          <a:pPr marL="0" lvl="0" indent="0" algn="ctr" defTabSz="311150">
+          <a:pPr marL="0" lvl="0" indent="0" algn="ctr" defTabSz="355600">
             <a:lnSpc>
               <a:spcPct val="90000"/>
             </a:lnSpc>
@@ -10133,14 +10608,14 @@
             <a:buNone/>
           </a:pPr>
           <a:r>
-            <a:rPr lang="en-PH" sz="700" i="0" u="none" kern="1200" dirty="0"/>
+            <a:rPr lang="en-PH" sz="800" i="0" u="none" kern="1200" dirty="0"/>
             <a:t>GET: /</a:t>
           </a:r>
         </a:p>
       </dsp:txBody>
       <dsp:txXfrm>
-        <a:off x="4787665" y="490"/>
-        <a:ext cx="940268" cy="470134"/>
+        <a:off x="5403019" y="2902"/>
+        <a:ext cx="1108769" cy="554384"/>
       </dsp:txXfrm>
     </dsp:sp>
     <dsp:sp modelId="{AE1DD6B5-8922-4162-945A-41BF7A420F55}">
@@ -10150,8 +10625,8 @@
       </dsp:nvSpPr>
       <dsp:spPr>
         <a:xfrm>
-          <a:off x="1256958" y="668080"/>
-          <a:ext cx="940268" cy="470134"/>
+          <a:off x="568783" y="790128"/>
+          <a:ext cx="1108769" cy="554384"/>
         </a:xfrm>
         <a:prstGeom prst="rect">
           <a:avLst/>
@@ -10193,12 +10668,12 @@
         </a:fontRef>
       </dsp:style>
       <dsp:txBody>
-        <a:bodyPr spcFirstLastPara="0" vert="horz" wrap="square" lIns="4445" tIns="4445" rIns="4445" bIns="4445" numCol="1" spcCol="1270" anchor="ctr" anchorCtr="0">
+        <a:bodyPr spcFirstLastPara="0" vert="horz" wrap="square" lIns="5080" tIns="5080" rIns="5080" bIns="5080" numCol="1" spcCol="1270" anchor="ctr" anchorCtr="0">
           <a:noAutofit/>
         </a:bodyPr>
         <a:lstStyle/>
         <a:p>
-          <a:pPr marL="0" lvl="0" indent="0" algn="ctr" defTabSz="311150">
+          <a:pPr marL="0" lvl="0" indent="0" algn="ctr" defTabSz="355600">
             <a:lnSpc>
               <a:spcPct val="90000"/>
             </a:lnSpc>
@@ -10211,14 +10686,14 @@
             <a:buNone/>
           </a:pPr>
           <a:r>
-            <a:rPr lang="en-PH" sz="700" i="0" u="none" kern="1200" dirty="0"/>
+            <a:rPr lang="en-PH" sz="800" i="0" u="none" kern="1200" dirty="0"/>
             <a:t>GET: /login</a:t>
           </a:r>
         </a:p>
       </dsp:txBody>
       <dsp:txXfrm>
-        <a:off x="1256958" y="668080"/>
-        <a:ext cx="940268" cy="470134"/>
+        <a:off x="568783" y="790128"/>
+        <a:ext cx="1108769" cy="554384"/>
       </dsp:txXfrm>
     </dsp:sp>
     <dsp:sp modelId="{3C293340-5887-41DE-859C-77675150C6EB}">
@@ -10228,8 +10703,8 @@
       </dsp:nvSpPr>
       <dsp:spPr>
         <a:xfrm>
-          <a:off x="1492025" y="1335671"/>
-          <a:ext cx="940268" cy="470134"/>
+          <a:off x="845976" y="1577354"/>
+          <a:ext cx="1108769" cy="554384"/>
         </a:xfrm>
         <a:prstGeom prst="rect">
           <a:avLst/>
@@ -10271,12 +10746,12 @@
         </a:fontRef>
       </dsp:style>
       <dsp:txBody>
-        <a:bodyPr spcFirstLastPara="0" vert="horz" wrap="square" lIns="4445" tIns="4445" rIns="4445" bIns="4445" numCol="1" spcCol="1270" anchor="ctr" anchorCtr="0">
+        <a:bodyPr spcFirstLastPara="0" vert="horz" wrap="square" lIns="5080" tIns="5080" rIns="5080" bIns="5080" numCol="1" spcCol="1270" anchor="ctr" anchorCtr="0">
           <a:noAutofit/>
         </a:bodyPr>
         <a:lstStyle/>
         <a:p>
-          <a:pPr marL="0" lvl="0" indent="0" algn="ctr" defTabSz="311150">
+          <a:pPr marL="0" lvl="0" indent="0" algn="ctr" defTabSz="355600">
             <a:lnSpc>
               <a:spcPct val="90000"/>
             </a:lnSpc>
@@ -10289,14 +10764,14 @@
             <a:buNone/>
           </a:pPr>
           <a:r>
-            <a:rPr lang="en-PH" sz="700" i="0" u="none" kern="1200" dirty="0"/>
+            <a:rPr lang="en-PH" sz="800" i="0" u="none" kern="1200" dirty="0"/>
             <a:t>POST: /login/in</a:t>
           </a:r>
         </a:p>
       </dsp:txBody>
       <dsp:txXfrm>
-        <a:off x="1492025" y="1335671"/>
-        <a:ext cx="940268" cy="470134"/>
+        <a:off x="845976" y="1577354"/>
+        <a:ext cx="1108769" cy="554384"/>
       </dsp:txXfrm>
     </dsp:sp>
     <dsp:sp modelId="{1FCFCB3A-B4C7-413C-B6B5-18473C4E0215}">
@@ -10306,8 +10781,8 @@
       </dsp:nvSpPr>
       <dsp:spPr>
         <a:xfrm>
-          <a:off x="2394683" y="668080"/>
-          <a:ext cx="940268" cy="470134"/>
+          <a:off x="1910395" y="790128"/>
+          <a:ext cx="1108769" cy="554384"/>
         </a:xfrm>
         <a:prstGeom prst="rect">
           <a:avLst/>
@@ -10349,12 +10824,12 @@
         </a:fontRef>
       </dsp:style>
       <dsp:txBody>
-        <a:bodyPr spcFirstLastPara="0" vert="horz" wrap="square" lIns="4445" tIns="4445" rIns="4445" bIns="4445" numCol="1" spcCol="1270" anchor="ctr" anchorCtr="0">
+        <a:bodyPr spcFirstLastPara="0" vert="horz" wrap="square" lIns="5080" tIns="5080" rIns="5080" bIns="5080" numCol="1" spcCol="1270" anchor="ctr" anchorCtr="0">
           <a:noAutofit/>
         </a:bodyPr>
         <a:lstStyle/>
         <a:p>
-          <a:pPr marL="0" lvl="0" indent="0" algn="ctr" defTabSz="311150">
+          <a:pPr marL="0" lvl="0" indent="0" algn="ctr" defTabSz="355600">
             <a:lnSpc>
               <a:spcPct val="90000"/>
             </a:lnSpc>
@@ -10367,14 +10842,14 @@
             <a:buNone/>
           </a:pPr>
           <a:r>
-            <a:rPr lang="en-PH" sz="700" i="0" u="none" kern="1200" dirty="0"/>
+            <a:rPr lang="en-PH" sz="800" i="0" u="none" kern="1200" dirty="0"/>
             <a:t>GET: /logout</a:t>
           </a:r>
         </a:p>
       </dsp:txBody>
       <dsp:txXfrm>
-        <a:off x="2394683" y="668080"/>
-        <a:ext cx="940268" cy="470134"/>
+        <a:off x="1910395" y="790128"/>
+        <a:ext cx="1108769" cy="554384"/>
       </dsp:txXfrm>
     </dsp:sp>
     <dsp:sp modelId="{5CEACDA1-7667-40A9-B874-25D1B1E21A99}">
@@ -10384,8 +10859,8 @@
       </dsp:nvSpPr>
       <dsp:spPr>
         <a:xfrm>
-          <a:off x="2629750" y="1335671"/>
-          <a:ext cx="940268" cy="470134"/>
+          <a:off x="2187587" y="1577354"/>
+          <a:ext cx="1108769" cy="554384"/>
         </a:xfrm>
         <a:prstGeom prst="rect">
           <a:avLst/>
@@ -10427,12 +10902,12 @@
         </a:fontRef>
       </dsp:style>
       <dsp:txBody>
-        <a:bodyPr spcFirstLastPara="0" vert="horz" wrap="square" lIns="4445" tIns="4445" rIns="4445" bIns="4445" numCol="1" spcCol="1270" anchor="ctr" anchorCtr="0">
+        <a:bodyPr spcFirstLastPara="0" vert="horz" wrap="square" lIns="5080" tIns="5080" rIns="5080" bIns="5080" numCol="1" spcCol="1270" anchor="ctr" anchorCtr="0">
           <a:noAutofit/>
         </a:bodyPr>
         <a:lstStyle/>
         <a:p>
-          <a:pPr marL="0" lvl="0" indent="0" algn="ctr" defTabSz="311150">
+          <a:pPr marL="0" lvl="0" indent="0" algn="ctr" defTabSz="355600">
             <a:lnSpc>
               <a:spcPct val="90000"/>
             </a:lnSpc>
@@ -10445,14 +10920,14 @@
             <a:buNone/>
           </a:pPr>
           <a:r>
-            <a:rPr lang="en-PH" sz="700" i="0" u="none" kern="1200" dirty="0"/>
+            <a:rPr lang="en-PH" sz="800" i="0" u="none" kern="1200" dirty="0"/>
             <a:t>POST: /logout/out</a:t>
           </a:r>
         </a:p>
       </dsp:txBody>
       <dsp:txXfrm>
-        <a:off x="2629750" y="1335671"/>
-        <a:ext cx="940268" cy="470134"/>
+        <a:off x="2187587" y="1577354"/>
+        <a:ext cx="1108769" cy="554384"/>
       </dsp:txXfrm>
     </dsp:sp>
     <dsp:sp modelId="{2D05126F-7CA9-467A-B341-F8E1AF5FCF66}">
@@ -10462,8 +10937,8 @@
       </dsp:nvSpPr>
       <dsp:spPr>
         <a:xfrm>
-          <a:off x="3532407" y="668080"/>
-          <a:ext cx="940268" cy="470134"/>
+          <a:off x="3252006" y="790128"/>
+          <a:ext cx="1108769" cy="554384"/>
         </a:xfrm>
         <a:prstGeom prst="rect">
           <a:avLst/>
@@ -10505,12 +10980,12 @@
         </a:fontRef>
       </dsp:style>
       <dsp:txBody>
-        <a:bodyPr spcFirstLastPara="0" vert="horz" wrap="square" lIns="4445" tIns="4445" rIns="4445" bIns="4445" numCol="1" spcCol="1270" anchor="ctr" anchorCtr="0">
+        <a:bodyPr spcFirstLastPara="0" vert="horz" wrap="square" lIns="5080" tIns="5080" rIns="5080" bIns="5080" numCol="1" spcCol="1270" anchor="ctr" anchorCtr="0">
           <a:noAutofit/>
         </a:bodyPr>
         <a:lstStyle/>
         <a:p>
-          <a:pPr marL="0" lvl="0" indent="0" algn="ctr" defTabSz="311150">
+          <a:pPr marL="0" lvl="0" indent="0" algn="ctr" defTabSz="355600">
             <a:lnSpc>
               <a:spcPct val="90000"/>
             </a:lnSpc>
@@ -10523,14 +10998,14 @@
             <a:buNone/>
           </a:pPr>
           <a:r>
-            <a:rPr lang="en-PH" sz="700" i="0" u="none" kern="1200" dirty="0"/>
+            <a:rPr lang="en-PH" sz="800" i="0" u="none" kern="1200" dirty="0"/>
             <a:t>GET: /home</a:t>
           </a:r>
         </a:p>
       </dsp:txBody>
       <dsp:txXfrm>
-        <a:off x="3532407" y="668080"/>
-        <a:ext cx="940268" cy="470134"/>
+        <a:off x="3252006" y="790128"/>
+        <a:ext cx="1108769" cy="554384"/>
       </dsp:txXfrm>
     </dsp:sp>
     <dsp:sp modelId="{816DF2EF-6A2D-47D7-82D8-0F775682513B}">
@@ -10540,8 +11015,8 @@
       </dsp:nvSpPr>
       <dsp:spPr>
         <a:xfrm>
-          <a:off x="4670132" y="668080"/>
-          <a:ext cx="940268" cy="470134"/>
+          <a:off x="4593617" y="790128"/>
+          <a:ext cx="1108769" cy="554384"/>
         </a:xfrm>
         <a:prstGeom prst="rect">
           <a:avLst/>
@@ -10583,12 +11058,12 @@
         </a:fontRef>
       </dsp:style>
       <dsp:txBody>
-        <a:bodyPr spcFirstLastPara="0" vert="horz" wrap="square" lIns="4445" tIns="4445" rIns="4445" bIns="4445" numCol="1" spcCol="1270" anchor="ctr" anchorCtr="0">
+        <a:bodyPr spcFirstLastPara="0" vert="horz" wrap="square" lIns="5080" tIns="5080" rIns="5080" bIns="5080" numCol="1" spcCol="1270" anchor="ctr" anchorCtr="0">
           <a:noAutofit/>
         </a:bodyPr>
         <a:lstStyle/>
         <a:p>
-          <a:pPr marL="0" lvl="0" indent="0" algn="ctr" defTabSz="311150">
+          <a:pPr marL="0" lvl="0" indent="0" algn="ctr" defTabSz="355600">
             <a:lnSpc>
               <a:spcPct val="90000"/>
             </a:lnSpc>
@@ -10601,15 +11076,15 @@
             <a:buNone/>
           </a:pPr>
           <a:r>
-            <a:rPr lang="en-PH" sz="700" i="0" u="none" kern="1200"/>
+            <a:rPr lang="en-PH" sz="800" i="0" u="none" kern="1200"/>
             <a:t>GET: /post/&lt;posthash&gt;</a:t>
           </a:r>
-          <a:endParaRPr lang="en-PH" sz="700" i="0" u="none" kern="1200" dirty="0"/>
+          <a:endParaRPr lang="en-PH" sz="800" i="0" u="none" kern="1200" dirty="0"/>
         </a:p>
       </dsp:txBody>
       <dsp:txXfrm>
-        <a:off x="4670132" y="668080"/>
-        <a:ext cx="940268" cy="470134"/>
+        <a:off x="4593617" y="790128"/>
+        <a:ext cx="1108769" cy="554384"/>
       </dsp:txXfrm>
     </dsp:sp>
     <dsp:sp modelId="{7F097E5B-6209-4AF0-8ED0-402082DA0749}">
@@ -10619,8 +11094,8 @@
       </dsp:nvSpPr>
       <dsp:spPr>
         <a:xfrm>
-          <a:off x="4905199" y="1335671"/>
-          <a:ext cx="940268" cy="470134"/>
+          <a:off x="4870809" y="1577354"/>
+          <a:ext cx="1108769" cy="554384"/>
         </a:xfrm>
         <a:prstGeom prst="rect">
           <a:avLst/>
@@ -10662,12 +11137,12 @@
         </a:fontRef>
       </dsp:style>
       <dsp:txBody>
-        <a:bodyPr spcFirstLastPara="0" vert="horz" wrap="square" lIns="4445" tIns="4445" rIns="4445" bIns="4445" numCol="1" spcCol="1270" anchor="ctr" anchorCtr="0">
+        <a:bodyPr spcFirstLastPara="0" vert="horz" wrap="square" lIns="5080" tIns="5080" rIns="5080" bIns="5080" numCol="1" spcCol="1270" anchor="ctr" anchorCtr="0">
           <a:noAutofit/>
         </a:bodyPr>
         <a:lstStyle/>
         <a:p>
-          <a:pPr marL="0" lvl="0" indent="0" algn="ctr" defTabSz="311150">
+          <a:pPr marL="0" lvl="0" indent="0" algn="ctr" defTabSz="355600">
             <a:lnSpc>
               <a:spcPct val="90000"/>
             </a:lnSpc>
@@ -10680,22 +11155,22 @@
             <a:buNone/>
           </a:pPr>
           <a:r>
-            <a:rPr lang="en-PH" sz="700" i="0" u="none" kern="1200" dirty="0"/>
+            <a:rPr lang="en-PH" sz="800" i="0" u="none" kern="1200" dirty="0"/>
             <a:t>POST: /post/&lt;</a:t>
           </a:r>
           <a:r>
-            <a:rPr lang="en-PH" sz="700" i="0" u="none" kern="1200" dirty="0" err="1"/>
+            <a:rPr lang="en-PH" sz="800" i="0" u="none" kern="1200" dirty="0" err="1"/>
             <a:t>posthash</a:t>
           </a:r>
           <a:r>
-            <a:rPr lang="en-PH" sz="700" i="0" u="none" kern="1200" dirty="0"/>
+            <a:rPr lang="en-PH" sz="800" i="0" u="none" kern="1200" dirty="0"/>
             <a:t>&gt;/edit</a:t>
           </a:r>
         </a:p>
       </dsp:txBody>
       <dsp:txXfrm>
-        <a:off x="4905199" y="1335671"/>
-        <a:ext cx="940268" cy="470134"/>
+        <a:off x="4870809" y="1577354"/>
+        <a:ext cx="1108769" cy="554384"/>
       </dsp:txXfrm>
     </dsp:sp>
     <dsp:sp modelId="{E50F9959-464F-43F9-8195-9C82C537826B}">
@@ -10705,8 +11180,8 @@
       </dsp:nvSpPr>
       <dsp:spPr>
         <a:xfrm>
-          <a:off x="4905199" y="2003261"/>
-          <a:ext cx="940268" cy="470134"/>
+          <a:off x="4870809" y="2364581"/>
+          <a:ext cx="1108769" cy="554384"/>
         </a:xfrm>
         <a:prstGeom prst="rect">
           <a:avLst/>
@@ -10748,12 +11223,12 @@
         </a:fontRef>
       </dsp:style>
       <dsp:txBody>
-        <a:bodyPr spcFirstLastPara="0" vert="horz" wrap="square" lIns="4445" tIns="4445" rIns="4445" bIns="4445" numCol="1" spcCol="1270" anchor="ctr" anchorCtr="0">
+        <a:bodyPr spcFirstLastPara="0" vert="horz" wrap="square" lIns="5080" tIns="5080" rIns="5080" bIns="5080" numCol="1" spcCol="1270" anchor="ctr" anchorCtr="0">
           <a:noAutofit/>
         </a:bodyPr>
         <a:lstStyle/>
         <a:p>
-          <a:pPr marL="0" lvl="0" indent="0" algn="ctr" defTabSz="311150">
+          <a:pPr marL="0" lvl="0" indent="0" algn="ctr" defTabSz="355600">
             <a:lnSpc>
               <a:spcPct val="90000"/>
             </a:lnSpc>
@@ -10766,22 +11241,22 @@
             <a:buNone/>
           </a:pPr>
           <a:r>
-            <a:rPr lang="en-PH" sz="700" i="0" u="none" kern="1200" dirty="0"/>
+            <a:rPr lang="en-PH" sz="800" i="0" u="none" kern="1200" dirty="0"/>
             <a:t>PATCH: /post/&lt;</a:t>
           </a:r>
           <a:r>
-            <a:rPr lang="en-PH" sz="700" i="0" u="none" kern="1200" dirty="0" err="1"/>
+            <a:rPr lang="en-PH" sz="800" i="0" u="none" kern="1200" dirty="0" err="1"/>
             <a:t>posthash</a:t>
           </a:r>
           <a:r>
-            <a:rPr lang="en-PH" sz="700" i="0" u="none" kern="1200" dirty="0"/>
+            <a:rPr lang="en-PH" sz="800" i="0" u="none" kern="1200" dirty="0"/>
             <a:t>&gt;/save</a:t>
           </a:r>
         </a:p>
       </dsp:txBody>
       <dsp:txXfrm>
-        <a:off x="4905199" y="2003261"/>
-        <a:ext cx="940268" cy="470134"/>
+        <a:off x="4870809" y="2364581"/>
+        <a:ext cx="1108769" cy="554384"/>
       </dsp:txXfrm>
     </dsp:sp>
     <dsp:sp modelId="{B99F24ED-3BC7-432A-B386-E1A66BAEF726}">
@@ -10791,8 +11266,8 @@
       </dsp:nvSpPr>
       <dsp:spPr>
         <a:xfrm>
-          <a:off x="4905199" y="2670851"/>
-          <a:ext cx="940268" cy="470134"/>
+          <a:off x="4870809" y="3151807"/>
+          <a:ext cx="1108769" cy="554384"/>
         </a:xfrm>
         <a:prstGeom prst="rect">
           <a:avLst/>
@@ -10834,12 +11309,12 @@
         </a:fontRef>
       </dsp:style>
       <dsp:txBody>
-        <a:bodyPr spcFirstLastPara="0" vert="horz" wrap="square" lIns="4445" tIns="4445" rIns="4445" bIns="4445" numCol="1" spcCol="1270" anchor="ctr" anchorCtr="0">
+        <a:bodyPr spcFirstLastPara="0" vert="horz" wrap="square" lIns="5080" tIns="5080" rIns="5080" bIns="5080" numCol="1" spcCol="1270" anchor="ctr" anchorCtr="0">
           <a:noAutofit/>
         </a:bodyPr>
         <a:lstStyle/>
         <a:p>
-          <a:pPr marL="0" lvl="0" indent="0" algn="ctr" defTabSz="311150">
+          <a:pPr marL="0" lvl="0" indent="0" algn="ctr" defTabSz="355600">
             <a:lnSpc>
               <a:spcPct val="90000"/>
             </a:lnSpc>
@@ -10852,22 +11327,22 @@
             <a:buNone/>
           </a:pPr>
           <a:r>
-            <a:rPr lang="en-PH" sz="700" i="0" u="none" kern="1200" dirty="0"/>
+            <a:rPr lang="en-PH" sz="800" i="0" u="none" kern="1200" dirty="0"/>
             <a:t>DELETE: /post/&lt;</a:t>
           </a:r>
           <a:r>
-            <a:rPr lang="en-PH" sz="700" i="0" u="none" kern="1200" dirty="0" err="1"/>
+            <a:rPr lang="en-PH" sz="800" i="0" u="none" kern="1200" dirty="0" err="1"/>
             <a:t>posthash</a:t>
           </a:r>
           <a:r>
-            <a:rPr lang="en-PH" sz="700" i="0" u="none" kern="1200" dirty="0"/>
+            <a:rPr lang="en-PH" sz="800" i="0" u="none" kern="1200" dirty="0"/>
             <a:t>&gt;/delete</a:t>
           </a:r>
         </a:p>
       </dsp:txBody>
       <dsp:txXfrm>
-        <a:off x="4905199" y="2670851"/>
-        <a:ext cx="940268" cy="470134"/>
+        <a:off x="4870809" y="3151807"/>
+        <a:ext cx="1108769" cy="554384"/>
       </dsp:txXfrm>
     </dsp:sp>
     <dsp:sp modelId="{1B492F86-1603-4E21-B660-DA6307964BAD}">
@@ -10877,8 +11352,8 @@
       </dsp:nvSpPr>
       <dsp:spPr>
         <a:xfrm>
-          <a:off x="4905199" y="3338442"/>
-          <a:ext cx="940268" cy="470134"/>
+          <a:off x="4870809" y="3939033"/>
+          <a:ext cx="1108769" cy="554384"/>
         </a:xfrm>
         <a:prstGeom prst="rect">
           <a:avLst/>
@@ -10920,12 +11395,12 @@
         </a:fontRef>
       </dsp:style>
       <dsp:txBody>
-        <a:bodyPr spcFirstLastPara="0" vert="horz" wrap="square" lIns="4445" tIns="4445" rIns="4445" bIns="4445" numCol="1" spcCol="1270" anchor="ctr" anchorCtr="0">
+        <a:bodyPr spcFirstLastPara="0" vert="horz" wrap="square" lIns="5080" tIns="5080" rIns="5080" bIns="5080" numCol="1" spcCol="1270" anchor="ctr" anchorCtr="0">
           <a:noAutofit/>
         </a:bodyPr>
         <a:lstStyle/>
         <a:p>
-          <a:pPr marL="0" lvl="0" indent="0" algn="ctr" defTabSz="311150">
+          <a:pPr marL="0" lvl="0" indent="0" algn="ctr" defTabSz="355600">
             <a:lnSpc>
               <a:spcPct val="90000"/>
             </a:lnSpc>
@@ -10938,14 +11413,14 @@
             <a:buNone/>
           </a:pPr>
           <a:r>
-            <a:rPr lang="en-PH" sz="700" i="0" u="none" kern="1200" dirty="0"/>
+            <a:rPr lang="en-PH" sz="800" i="0" u="none" kern="1200" dirty="0"/>
             <a:t>POST: /post/new</a:t>
           </a:r>
         </a:p>
       </dsp:txBody>
       <dsp:txXfrm>
-        <a:off x="4905199" y="3338442"/>
-        <a:ext cx="940268" cy="470134"/>
+        <a:off x="4870809" y="3939033"/>
+        <a:ext cx="1108769" cy="554384"/>
       </dsp:txXfrm>
     </dsp:sp>
     <dsp:sp modelId="{26976F64-C724-4705-94F5-0E6CD971C2E4}">
@@ -10955,8 +11430,8 @@
       </dsp:nvSpPr>
       <dsp:spPr>
         <a:xfrm>
-          <a:off x="4905199" y="4006032"/>
-          <a:ext cx="940268" cy="470134"/>
+          <a:off x="4870809" y="4726260"/>
+          <a:ext cx="1108769" cy="554384"/>
         </a:xfrm>
         <a:prstGeom prst="rect">
           <a:avLst/>
@@ -10998,12 +11473,12 @@
         </a:fontRef>
       </dsp:style>
       <dsp:txBody>
-        <a:bodyPr spcFirstLastPara="0" vert="horz" wrap="square" lIns="4445" tIns="4445" rIns="4445" bIns="4445" numCol="1" spcCol="1270" anchor="ctr" anchorCtr="0">
+        <a:bodyPr spcFirstLastPara="0" vert="horz" wrap="square" lIns="5080" tIns="5080" rIns="5080" bIns="5080" numCol="1" spcCol="1270" anchor="ctr" anchorCtr="0">
           <a:noAutofit/>
         </a:bodyPr>
         <a:lstStyle/>
         <a:p>
-          <a:pPr marL="0" lvl="0" indent="0" algn="ctr" defTabSz="311150">
+          <a:pPr marL="0" lvl="0" indent="0" algn="ctr" defTabSz="355600">
             <a:lnSpc>
               <a:spcPct val="90000"/>
             </a:lnSpc>
@@ -11016,14 +11491,14 @@
             <a:buNone/>
           </a:pPr>
           <a:r>
-            <a:rPr lang="en-PH" sz="700" i="0" u="none" kern="1200" dirty="0"/>
+            <a:rPr lang="en-PH" sz="800" i="0" u="none" kern="1200" dirty="0"/>
             <a:t>POST: /post/like</a:t>
           </a:r>
         </a:p>
       </dsp:txBody>
       <dsp:txXfrm>
-        <a:off x="4905199" y="4006032"/>
-        <a:ext cx="940268" cy="470134"/>
+        <a:off x="4870809" y="4726260"/>
+        <a:ext cx="1108769" cy="554384"/>
       </dsp:txXfrm>
     </dsp:sp>
     <dsp:sp modelId="{50EC3807-8481-4C01-82B7-F19C2342E1A0}">
@@ -11033,8 +11508,8 @@
       </dsp:nvSpPr>
       <dsp:spPr>
         <a:xfrm>
-          <a:off x="4905199" y="4673623"/>
-          <a:ext cx="940268" cy="470134"/>
+          <a:off x="4870809" y="5513486"/>
+          <a:ext cx="1108769" cy="554384"/>
         </a:xfrm>
         <a:prstGeom prst="rect">
           <a:avLst/>
@@ -11076,12 +11551,12 @@
         </a:fontRef>
       </dsp:style>
       <dsp:txBody>
-        <a:bodyPr spcFirstLastPara="0" vert="horz" wrap="square" lIns="4445" tIns="4445" rIns="4445" bIns="4445" numCol="1" spcCol="1270" anchor="ctr" anchorCtr="0">
+        <a:bodyPr spcFirstLastPara="0" vert="horz" wrap="square" lIns="5080" tIns="5080" rIns="5080" bIns="5080" numCol="1" spcCol="1270" anchor="ctr" anchorCtr="0">
           <a:noAutofit/>
         </a:bodyPr>
         <a:lstStyle/>
         <a:p>
-          <a:pPr marL="0" lvl="0" indent="0" algn="ctr" defTabSz="311150">
+          <a:pPr marL="0" lvl="0" indent="0" algn="ctr" defTabSz="355600">
             <a:lnSpc>
               <a:spcPct val="90000"/>
             </a:lnSpc>
@@ -11094,14 +11569,14 @@
             <a:buNone/>
           </a:pPr>
           <a:r>
-            <a:rPr lang="en-PH" sz="700" i="0" u="none" kern="1200" dirty="0"/>
+            <a:rPr lang="en-PH" sz="800" i="0" u="none" kern="1200" dirty="0"/>
             <a:t>POST: /post/report</a:t>
           </a:r>
         </a:p>
       </dsp:txBody>
       <dsp:txXfrm>
-        <a:off x="4905199" y="4673623"/>
-        <a:ext cx="940268" cy="470134"/>
+        <a:off x="4870809" y="5513486"/>
+        <a:ext cx="1108769" cy="554384"/>
       </dsp:txXfrm>
     </dsp:sp>
     <dsp:sp modelId="{FE90803F-BB98-472A-87D1-B85B7689304F}">
@@ -11111,8 +11586,8 @@
       </dsp:nvSpPr>
       <dsp:spPr>
         <a:xfrm>
-          <a:off x="4905199" y="5341213"/>
-          <a:ext cx="940268" cy="470134"/>
+          <a:off x="4870809" y="6300713"/>
+          <a:ext cx="1108769" cy="554384"/>
         </a:xfrm>
         <a:prstGeom prst="rect">
           <a:avLst/>
@@ -11154,12 +11629,12 @@
         </a:fontRef>
       </dsp:style>
       <dsp:txBody>
-        <a:bodyPr spcFirstLastPara="0" vert="horz" wrap="square" lIns="4445" tIns="4445" rIns="4445" bIns="4445" numCol="1" spcCol="1270" anchor="ctr" anchorCtr="0">
+        <a:bodyPr spcFirstLastPara="0" vert="horz" wrap="square" lIns="5080" tIns="5080" rIns="5080" bIns="5080" numCol="1" spcCol="1270" anchor="ctr" anchorCtr="0">
           <a:noAutofit/>
         </a:bodyPr>
         <a:lstStyle/>
         <a:p>
-          <a:pPr marL="0" lvl="0" indent="0" algn="ctr" defTabSz="311150">
+          <a:pPr marL="0" lvl="0" indent="0" algn="ctr" defTabSz="355600">
             <a:lnSpc>
               <a:spcPct val="90000"/>
             </a:lnSpc>
@@ -11172,14 +11647,14 @@
             <a:buNone/>
           </a:pPr>
           <a:r>
-            <a:rPr lang="en-PH" sz="700" i="0" u="none" kern="1200" dirty="0"/>
+            <a:rPr lang="en-PH" sz="800" i="0" u="none" kern="1200" dirty="0"/>
             <a:t>POST: /post/comment</a:t>
           </a:r>
         </a:p>
       </dsp:txBody>
       <dsp:txXfrm>
-        <a:off x="4905199" y="5341213"/>
-        <a:ext cx="940268" cy="470134"/>
+        <a:off x="4870809" y="6300713"/>
+        <a:ext cx="1108769" cy="554384"/>
       </dsp:txXfrm>
     </dsp:sp>
     <dsp:sp modelId="{0C2F2216-8D08-4E87-B39E-9F041EF12805}">
@@ -11189,8 +11664,8 @@
       </dsp:nvSpPr>
       <dsp:spPr>
         <a:xfrm>
-          <a:off x="5807856" y="668080"/>
-          <a:ext cx="940268" cy="470134"/>
+          <a:off x="5935228" y="790128"/>
+          <a:ext cx="1108769" cy="554384"/>
         </a:xfrm>
         <a:prstGeom prst="rect">
           <a:avLst/>
@@ -11232,12 +11707,12 @@
         </a:fontRef>
       </dsp:style>
       <dsp:txBody>
-        <a:bodyPr spcFirstLastPara="0" vert="horz" wrap="square" lIns="4445" tIns="4445" rIns="4445" bIns="4445" numCol="1" spcCol="1270" anchor="ctr" anchorCtr="0">
+        <a:bodyPr spcFirstLastPara="0" vert="horz" wrap="square" lIns="5080" tIns="5080" rIns="5080" bIns="5080" numCol="1" spcCol="1270" anchor="ctr" anchorCtr="0">
           <a:noAutofit/>
         </a:bodyPr>
         <a:lstStyle/>
         <a:p>
-          <a:pPr marL="0" lvl="0" indent="0" algn="ctr" defTabSz="311150">
+          <a:pPr marL="0" lvl="0" indent="0" algn="ctr" defTabSz="355600">
             <a:lnSpc>
               <a:spcPct val="90000"/>
             </a:lnSpc>
@@ -11250,14 +11725,14 @@
             <a:buNone/>
           </a:pPr>
           <a:r>
-            <a:rPr lang="en-PH" sz="700" i="0" u="none" kern="1200" dirty="0"/>
+            <a:rPr lang="en-PH" sz="800" i="0" u="none" kern="1200" dirty="0"/>
             <a:t>GET: /signup</a:t>
           </a:r>
         </a:p>
       </dsp:txBody>
       <dsp:txXfrm>
-        <a:off x="5807856" y="668080"/>
-        <a:ext cx="940268" cy="470134"/>
+        <a:off x="5935228" y="790128"/>
+        <a:ext cx="1108769" cy="554384"/>
       </dsp:txXfrm>
     </dsp:sp>
     <dsp:sp modelId="{B15B783C-17E1-46DC-B52E-C2A7EDCDDBF6}">
@@ -11267,8 +11742,8 @@
       </dsp:nvSpPr>
       <dsp:spPr>
         <a:xfrm>
-          <a:off x="6042923" y="1335671"/>
-          <a:ext cx="940268" cy="470134"/>
+          <a:off x="6212420" y="1577354"/>
+          <a:ext cx="1108769" cy="554384"/>
         </a:xfrm>
         <a:prstGeom prst="rect">
           <a:avLst/>
@@ -11310,12 +11785,12 @@
         </a:fontRef>
       </dsp:style>
       <dsp:txBody>
-        <a:bodyPr spcFirstLastPara="0" vert="horz" wrap="square" lIns="4445" tIns="4445" rIns="4445" bIns="4445" numCol="1" spcCol="1270" anchor="ctr" anchorCtr="0">
+        <a:bodyPr spcFirstLastPara="0" vert="horz" wrap="square" lIns="5080" tIns="5080" rIns="5080" bIns="5080" numCol="1" spcCol="1270" anchor="ctr" anchorCtr="0">
           <a:noAutofit/>
         </a:bodyPr>
         <a:lstStyle/>
         <a:p>
-          <a:pPr marL="0" lvl="0" indent="0" algn="ctr" defTabSz="311150">
+          <a:pPr marL="0" lvl="0" indent="0" algn="ctr" defTabSz="355600">
             <a:lnSpc>
               <a:spcPct val="90000"/>
             </a:lnSpc>
@@ -11328,14 +11803,14 @@
             <a:buNone/>
           </a:pPr>
           <a:r>
-            <a:rPr lang="en-PH" sz="700" i="0" u="none" kern="1200" dirty="0"/>
+            <a:rPr lang="en-PH" sz="800" i="0" u="none" kern="1200" dirty="0"/>
             <a:t>POST: /signup/save</a:t>
           </a:r>
         </a:p>
       </dsp:txBody>
       <dsp:txXfrm>
-        <a:off x="6042923" y="1335671"/>
-        <a:ext cx="940268" cy="470134"/>
+        <a:off x="6212420" y="1577354"/>
+        <a:ext cx="1108769" cy="554384"/>
       </dsp:txXfrm>
     </dsp:sp>
     <dsp:sp modelId="{022713AF-96D9-4A2B-A358-49115AFE68DF}">
@@ -11345,8 +11820,8 @@
       </dsp:nvSpPr>
       <dsp:spPr>
         <a:xfrm>
-          <a:off x="7180648" y="668080"/>
-          <a:ext cx="940268" cy="470134"/>
+          <a:off x="7554031" y="790128"/>
+          <a:ext cx="1108769" cy="554384"/>
         </a:xfrm>
         <a:prstGeom prst="rect">
           <a:avLst/>
@@ -11388,12 +11863,12 @@
         </a:fontRef>
       </dsp:style>
       <dsp:txBody>
-        <a:bodyPr spcFirstLastPara="0" vert="horz" wrap="square" lIns="4445" tIns="4445" rIns="4445" bIns="4445" numCol="1" spcCol="1270" anchor="ctr" anchorCtr="0">
+        <a:bodyPr spcFirstLastPara="0" vert="horz" wrap="square" lIns="5080" tIns="5080" rIns="5080" bIns="5080" numCol="1" spcCol="1270" anchor="ctr" anchorCtr="0">
           <a:noAutofit/>
         </a:bodyPr>
         <a:lstStyle/>
         <a:p>
-          <a:pPr marL="0" lvl="0" indent="0" algn="ctr" defTabSz="311150">
+          <a:pPr marL="0" lvl="0" indent="0" algn="ctr" defTabSz="355600">
             <a:lnSpc>
               <a:spcPct val="90000"/>
             </a:lnSpc>
@@ -11406,14 +11881,14 @@
             <a:buNone/>
           </a:pPr>
           <a:r>
-            <a:rPr lang="en-PH" sz="700" i="0" u="none" kern="1200" dirty="0"/>
+            <a:rPr lang="en-PH" sz="800" i="0" u="none" kern="1200" dirty="0"/>
             <a:t>GET: /profile</a:t>
           </a:r>
         </a:p>
       </dsp:txBody>
       <dsp:txXfrm>
-        <a:off x="7180648" y="668080"/>
-        <a:ext cx="940268" cy="470134"/>
+        <a:off x="7554031" y="790128"/>
+        <a:ext cx="1108769" cy="554384"/>
       </dsp:txXfrm>
     </dsp:sp>
     <dsp:sp modelId="{CC33A293-E3CB-411D-9632-6FE6954F9F3F}">
@@ -11423,8 +11898,8 @@
       </dsp:nvSpPr>
       <dsp:spPr>
         <a:xfrm>
-          <a:off x="7180648" y="1335671"/>
-          <a:ext cx="940268" cy="470134"/>
+          <a:off x="7554031" y="1577354"/>
+          <a:ext cx="1108769" cy="554384"/>
         </a:xfrm>
         <a:prstGeom prst="rect">
           <a:avLst/>
@@ -11466,12 +11941,12 @@
         </a:fontRef>
       </dsp:style>
       <dsp:txBody>
-        <a:bodyPr spcFirstLastPara="0" vert="horz" wrap="square" lIns="4445" tIns="4445" rIns="4445" bIns="4445" numCol="1" spcCol="1270" anchor="ctr" anchorCtr="0">
+        <a:bodyPr spcFirstLastPara="0" vert="horz" wrap="square" lIns="5080" tIns="5080" rIns="5080" bIns="5080" numCol="1" spcCol="1270" anchor="ctr" anchorCtr="0">
           <a:noAutofit/>
         </a:bodyPr>
         <a:lstStyle/>
         <a:p>
-          <a:pPr marL="0" lvl="0" indent="0" algn="ctr" defTabSz="311150">
+          <a:pPr marL="0" lvl="0" indent="0" algn="ctr" defTabSz="355600">
             <a:lnSpc>
               <a:spcPct val="90000"/>
             </a:lnSpc>
@@ -11484,14 +11959,14 @@
             <a:buNone/>
           </a:pPr>
           <a:r>
-            <a:rPr lang="en-PH" sz="700" i="0" u="none" kern="1200" dirty="0"/>
+            <a:rPr lang="en-PH" sz="800" i="0" u="none" kern="1200" dirty="0"/>
             <a:t>GET: /profile/settings</a:t>
           </a:r>
         </a:p>
       </dsp:txBody>
       <dsp:txXfrm>
-        <a:off x="7180648" y="1335671"/>
-        <a:ext cx="940268" cy="470134"/>
+        <a:off x="7554031" y="1577354"/>
+        <a:ext cx="1108769" cy="554384"/>
       </dsp:txXfrm>
     </dsp:sp>
     <dsp:sp modelId="{070D4700-2947-4504-A795-8589C16A902C}">
@@ -11501,8 +11976,8 @@
       </dsp:nvSpPr>
       <dsp:spPr>
         <a:xfrm>
-          <a:off x="7415715" y="2003261"/>
-          <a:ext cx="940268" cy="470134"/>
+          <a:off x="7831224" y="2364581"/>
+          <a:ext cx="1108769" cy="554384"/>
         </a:xfrm>
         <a:prstGeom prst="rect">
           <a:avLst/>
@@ -11544,12 +12019,12 @@
         </a:fontRef>
       </dsp:style>
       <dsp:txBody>
-        <a:bodyPr spcFirstLastPara="0" vert="horz" wrap="square" lIns="4445" tIns="4445" rIns="4445" bIns="4445" numCol="1" spcCol="1270" anchor="ctr" anchorCtr="0">
+        <a:bodyPr spcFirstLastPara="0" vert="horz" wrap="square" lIns="5080" tIns="5080" rIns="5080" bIns="5080" numCol="1" spcCol="1270" anchor="ctr" anchorCtr="0">
           <a:noAutofit/>
         </a:bodyPr>
         <a:lstStyle/>
         <a:p>
-          <a:pPr marL="0" lvl="0" indent="0" algn="ctr" defTabSz="311150">
+          <a:pPr marL="0" lvl="0" indent="0" algn="ctr" defTabSz="355600">
             <a:lnSpc>
               <a:spcPct val="90000"/>
             </a:lnSpc>
@@ -11562,14 +12037,14 @@
             <a:buNone/>
           </a:pPr>
           <a:r>
-            <a:rPr lang="en-PH" sz="700" i="0" u="none" kern="1200" dirty="0"/>
+            <a:rPr lang="en-PH" sz="800" i="0" u="none" kern="1200" dirty="0"/>
             <a:t>PATCH: profile/settings/save</a:t>
           </a:r>
         </a:p>
       </dsp:txBody>
       <dsp:txXfrm>
-        <a:off x="7415715" y="2003261"/>
-        <a:ext cx="940268" cy="470134"/>
+        <a:off x="7831224" y="2364581"/>
+        <a:ext cx="1108769" cy="554384"/>
       </dsp:txXfrm>
     </dsp:sp>
     <dsp:sp modelId="{6E5659B3-987D-47B1-A1A1-39AAF04C38E5}">
@@ -11579,8 +12054,8 @@
       </dsp:nvSpPr>
       <dsp:spPr>
         <a:xfrm>
-          <a:off x="7415715" y="2670851"/>
-          <a:ext cx="940268" cy="470134"/>
+          <a:off x="7831224" y="3151807"/>
+          <a:ext cx="1108769" cy="554384"/>
         </a:xfrm>
         <a:prstGeom prst="rect">
           <a:avLst/>
@@ -11622,12 +12097,12 @@
         </a:fontRef>
       </dsp:style>
       <dsp:txBody>
-        <a:bodyPr spcFirstLastPara="0" vert="horz" wrap="square" lIns="4445" tIns="4445" rIns="4445" bIns="4445" numCol="1" spcCol="1270" anchor="ctr" anchorCtr="0">
+        <a:bodyPr spcFirstLastPara="0" vert="horz" wrap="square" lIns="5080" tIns="5080" rIns="5080" bIns="5080" numCol="1" spcCol="1270" anchor="ctr" anchorCtr="0">
           <a:noAutofit/>
         </a:bodyPr>
         <a:lstStyle/>
         <a:p>
-          <a:pPr marL="0" lvl="0" indent="0" algn="ctr" defTabSz="311150">
+          <a:pPr marL="0" lvl="0" indent="0" algn="ctr" defTabSz="355600">
             <a:lnSpc>
               <a:spcPct val="90000"/>
             </a:lnSpc>
@@ -11640,14 +12115,14 @@
             <a:buNone/>
           </a:pPr>
           <a:r>
-            <a:rPr lang="en-PH" sz="700" i="0" u="none" kern="1200" dirty="0"/>
+            <a:rPr lang="en-PH" sz="800" i="0" u="none" kern="1200" dirty="0"/>
             <a:t>DELETE: profile/settings/delete</a:t>
           </a:r>
         </a:p>
       </dsp:txBody>
       <dsp:txXfrm>
-        <a:off x="7415715" y="2670851"/>
-        <a:ext cx="940268" cy="470134"/>
+        <a:off x="7831224" y="3151807"/>
+        <a:ext cx="1108769" cy="554384"/>
       </dsp:txXfrm>
     </dsp:sp>
     <dsp:sp modelId="{12F0C7F9-8119-4BBD-A7C5-DEFEEA6C7D89}">
@@ -11657,8 +12132,8 @@
       </dsp:nvSpPr>
       <dsp:spPr>
         <a:xfrm>
-          <a:off x="8318372" y="668080"/>
-          <a:ext cx="940268" cy="470134"/>
+          <a:off x="8895643" y="790128"/>
+          <a:ext cx="1108769" cy="554384"/>
         </a:xfrm>
         <a:prstGeom prst="rect">
           <a:avLst/>
@@ -11700,12 +12175,12 @@
         </a:fontRef>
       </dsp:style>
       <dsp:txBody>
-        <a:bodyPr spcFirstLastPara="0" vert="horz" wrap="square" lIns="4445" tIns="4445" rIns="4445" bIns="4445" numCol="1" spcCol="1270" anchor="ctr" anchorCtr="0">
+        <a:bodyPr spcFirstLastPara="0" vert="horz" wrap="square" lIns="5080" tIns="5080" rIns="5080" bIns="5080" numCol="1" spcCol="1270" anchor="ctr" anchorCtr="0">
           <a:noAutofit/>
         </a:bodyPr>
         <a:lstStyle/>
         <a:p>
-          <a:pPr marL="0" lvl="0" indent="0" algn="ctr" defTabSz="311150">
+          <a:pPr marL="0" lvl="0" indent="0" algn="ctr" defTabSz="355600">
             <a:lnSpc>
               <a:spcPct val="90000"/>
             </a:lnSpc>
@@ -11718,14 +12193,252 @@
             <a:buNone/>
           </a:pPr>
           <a:r>
-            <a:rPr lang="en-PH" sz="700" i="0" u="none" kern="1200" dirty="0"/>
+            <a:rPr lang="en-PH" sz="800" i="0" u="none" kern="1200" dirty="0"/>
             <a:t>GET: /user/&lt;username&gt;</a:t>
           </a:r>
         </a:p>
       </dsp:txBody>
       <dsp:txXfrm>
-        <a:off x="8318372" y="668080"/>
-        <a:ext cx="940268" cy="470134"/>
+        <a:off x="8895643" y="790128"/>
+        <a:ext cx="1108769" cy="554384"/>
+      </dsp:txXfrm>
+    </dsp:sp>
+    <dsp:sp modelId="{99BBCD64-0904-4F94-938B-1D4FAE73A2E1}">
+      <dsp:nvSpPr>
+        <dsp:cNvPr id="0" name=""/>
+        <dsp:cNvSpPr/>
+      </dsp:nvSpPr>
+      <dsp:spPr>
+        <a:xfrm>
+          <a:off x="10237254" y="790128"/>
+          <a:ext cx="1108769" cy="554384"/>
+        </a:xfrm>
+        <a:prstGeom prst="rect">
+          <a:avLst/>
+        </a:prstGeom>
+        <a:solidFill>
+          <a:schemeClr val="accent1">
+            <a:hueOff val="0"/>
+            <a:satOff val="0"/>
+            <a:lumOff val="0"/>
+            <a:alphaOff val="0"/>
+          </a:schemeClr>
+        </a:solidFill>
+        <a:ln w="12700" cap="flat" cmpd="sng" algn="ctr">
+          <a:solidFill>
+            <a:schemeClr val="lt1">
+              <a:hueOff val="0"/>
+              <a:satOff val="0"/>
+              <a:lumOff val="0"/>
+              <a:alphaOff val="0"/>
+            </a:schemeClr>
+          </a:solidFill>
+          <a:prstDash val="solid"/>
+          <a:miter lim="800000"/>
+        </a:ln>
+        <a:effectLst/>
+      </dsp:spPr>
+      <dsp:style>
+        <a:lnRef idx="2">
+          <a:scrgbClr r="0" g="0" b="0"/>
+        </a:lnRef>
+        <a:fillRef idx="1">
+          <a:scrgbClr r="0" g="0" b="0"/>
+        </a:fillRef>
+        <a:effectRef idx="0">
+          <a:scrgbClr r="0" g="0" b="0"/>
+        </a:effectRef>
+        <a:fontRef idx="minor">
+          <a:schemeClr val="lt1"/>
+        </a:fontRef>
+      </dsp:style>
+      <dsp:txBody>
+        <a:bodyPr spcFirstLastPara="0" vert="horz" wrap="square" lIns="5080" tIns="5080" rIns="5080" bIns="5080" numCol="1" spcCol="1270" anchor="ctr" anchorCtr="0">
+          <a:noAutofit/>
+        </a:bodyPr>
+        <a:lstStyle/>
+        <a:p>
+          <a:pPr marL="0" lvl="0" indent="0" algn="ctr" defTabSz="355600">
+            <a:lnSpc>
+              <a:spcPct val="90000"/>
+            </a:lnSpc>
+            <a:spcBef>
+              <a:spcPct val="0"/>
+            </a:spcBef>
+            <a:spcAft>
+              <a:spcPct val="35000"/>
+            </a:spcAft>
+            <a:buNone/>
+          </a:pPr>
+          <a:r>
+            <a:rPr lang="en-PH" sz="800" i="0" u="none" kern="1200" dirty="0"/>
+            <a:t>NONE: /validate</a:t>
+          </a:r>
+        </a:p>
+      </dsp:txBody>
+      <dsp:txXfrm>
+        <a:off x="10237254" y="790128"/>
+        <a:ext cx="1108769" cy="554384"/>
+      </dsp:txXfrm>
+    </dsp:sp>
+    <dsp:sp modelId="{7A882588-0810-4F92-AD23-756B9035A4E8}">
+      <dsp:nvSpPr>
+        <dsp:cNvPr id="0" name=""/>
+        <dsp:cNvSpPr/>
+      </dsp:nvSpPr>
+      <dsp:spPr>
+        <a:xfrm>
+          <a:off x="10514446" y="1577354"/>
+          <a:ext cx="1108769" cy="554384"/>
+        </a:xfrm>
+        <a:prstGeom prst="rect">
+          <a:avLst/>
+        </a:prstGeom>
+        <a:solidFill>
+          <a:schemeClr val="accent1">
+            <a:hueOff val="0"/>
+            <a:satOff val="0"/>
+            <a:lumOff val="0"/>
+            <a:alphaOff val="0"/>
+          </a:schemeClr>
+        </a:solidFill>
+        <a:ln w="12700" cap="flat" cmpd="sng" algn="ctr">
+          <a:solidFill>
+            <a:schemeClr val="lt1">
+              <a:hueOff val="0"/>
+              <a:satOff val="0"/>
+              <a:lumOff val="0"/>
+              <a:alphaOff val="0"/>
+            </a:schemeClr>
+          </a:solidFill>
+          <a:prstDash val="solid"/>
+          <a:miter lim="800000"/>
+        </a:ln>
+        <a:effectLst/>
+      </dsp:spPr>
+      <dsp:style>
+        <a:lnRef idx="2">
+          <a:scrgbClr r="0" g="0" b="0"/>
+        </a:lnRef>
+        <a:fillRef idx="1">
+          <a:scrgbClr r="0" g="0" b="0"/>
+        </a:fillRef>
+        <a:effectRef idx="0">
+          <a:scrgbClr r="0" g="0" b="0"/>
+        </a:effectRef>
+        <a:fontRef idx="minor">
+          <a:schemeClr val="lt1"/>
+        </a:fontRef>
+      </dsp:style>
+      <dsp:txBody>
+        <a:bodyPr spcFirstLastPara="0" vert="horz" wrap="square" lIns="5080" tIns="5080" rIns="5080" bIns="5080" numCol="1" spcCol="1270" anchor="ctr" anchorCtr="0">
+          <a:noAutofit/>
+        </a:bodyPr>
+        <a:lstStyle/>
+        <a:p>
+          <a:pPr marL="0" lvl="0" indent="0" algn="ctr" defTabSz="355600">
+            <a:lnSpc>
+              <a:spcPct val="90000"/>
+            </a:lnSpc>
+            <a:spcBef>
+              <a:spcPct val="0"/>
+            </a:spcBef>
+            <a:spcAft>
+              <a:spcPct val="35000"/>
+            </a:spcAft>
+            <a:buNone/>
+          </a:pPr>
+          <a:r>
+            <a:rPr lang="en-PH" sz="800" i="0" u="none" kern="1200" dirty="0"/>
+            <a:t>POST: /validate/password</a:t>
+          </a:r>
+        </a:p>
+      </dsp:txBody>
+      <dsp:txXfrm>
+        <a:off x="10514446" y="1577354"/>
+        <a:ext cx="1108769" cy="554384"/>
+      </dsp:txXfrm>
+    </dsp:sp>
+    <dsp:sp modelId="{B04C15FD-14A3-4E7B-895B-7C4AF0E8908C}">
+      <dsp:nvSpPr>
+        <dsp:cNvPr id="0" name=""/>
+        <dsp:cNvSpPr/>
+      </dsp:nvSpPr>
+      <dsp:spPr>
+        <a:xfrm>
+          <a:off x="10514446" y="2364581"/>
+          <a:ext cx="1108769" cy="554384"/>
+        </a:xfrm>
+        <a:prstGeom prst="rect">
+          <a:avLst/>
+        </a:prstGeom>
+        <a:solidFill>
+          <a:schemeClr val="accent1">
+            <a:hueOff val="0"/>
+            <a:satOff val="0"/>
+            <a:lumOff val="0"/>
+            <a:alphaOff val="0"/>
+          </a:schemeClr>
+        </a:solidFill>
+        <a:ln w="12700" cap="flat" cmpd="sng" algn="ctr">
+          <a:solidFill>
+            <a:schemeClr val="lt1">
+              <a:hueOff val="0"/>
+              <a:satOff val="0"/>
+              <a:lumOff val="0"/>
+              <a:alphaOff val="0"/>
+            </a:schemeClr>
+          </a:solidFill>
+          <a:prstDash val="solid"/>
+          <a:miter lim="800000"/>
+        </a:ln>
+        <a:effectLst/>
+      </dsp:spPr>
+      <dsp:style>
+        <a:lnRef idx="2">
+          <a:scrgbClr r="0" g="0" b="0"/>
+        </a:lnRef>
+        <a:fillRef idx="1">
+          <a:scrgbClr r="0" g="0" b="0"/>
+        </a:fillRef>
+        <a:effectRef idx="0">
+          <a:scrgbClr r="0" g="0" b="0"/>
+        </a:effectRef>
+        <a:fontRef idx="minor">
+          <a:schemeClr val="lt1"/>
+        </a:fontRef>
+      </dsp:style>
+      <dsp:txBody>
+        <a:bodyPr spcFirstLastPara="0" vert="horz" wrap="square" lIns="5080" tIns="5080" rIns="5080" bIns="5080" numCol="1" spcCol="1270" anchor="ctr" anchorCtr="0">
+          <a:noAutofit/>
+        </a:bodyPr>
+        <a:lstStyle/>
+        <a:p>
+          <a:pPr marL="0" lvl="0" indent="0" algn="ctr" defTabSz="355600">
+            <a:lnSpc>
+              <a:spcPct val="90000"/>
+            </a:lnSpc>
+            <a:spcBef>
+              <a:spcPct val="0"/>
+            </a:spcBef>
+            <a:spcAft>
+              <a:spcPct val="35000"/>
+            </a:spcAft>
+            <a:buNone/>
+          </a:pPr>
+          <a:r>
+            <a:rPr lang="en-PH" sz="800" i="0" u="none" kern="1200"/>
+            <a:t>POST: </a:t>
+          </a:r>
+          <a:r>
+            <a:rPr lang="en-PH" sz="800" i="0" u="none" kern="1200" dirty="0"/>
+            <a:t>/validate/username</a:t>
+          </a:r>
+        </a:p>
+      </dsp:txBody>
+      <dsp:txXfrm>
+        <a:off x="10514446" y="2364581"/>
+        <a:ext cx="1108769" cy="554384"/>
       </dsp:txXfrm>
     </dsp:sp>
   </dsp:spTree>
@@ -25298,7 +26011,7 @@
           <a:p>
             <a:fld id="{2CDD62A0-B891-4650-A5BB-561AD783AD7C}" type="datetimeFigureOut">
               <a:rPr lang="en-PH" smtClean="0"/>
-              <a:t>29/05/2022</a:t>
+              <a:t>30/05/2022</a:t>
             </a:fld>
             <a:endParaRPr lang="en-PH"/>
           </a:p>
@@ -25498,7 +26211,7 @@
           <a:p>
             <a:fld id="{2CDD62A0-B891-4650-A5BB-561AD783AD7C}" type="datetimeFigureOut">
               <a:rPr lang="en-PH" smtClean="0"/>
-              <a:t>29/05/2022</a:t>
+              <a:t>30/05/2022</a:t>
             </a:fld>
             <a:endParaRPr lang="en-PH"/>
           </a:p>
@@ -25708,7 +26421,7 @@
           <a:p>
             <a:fld id="{2CDD62A0-B891-4650-A5BB-561AD783AD7C}" type="datetimeFigureOut">
               <a:rPr lang="en-PH" smtClean="0"/>
-              <a:t>29/05/2022</a:t>
+              <a:t>30/05/2022</a:t>
             </a:fld>
             <a:endParaRPr lang="en-PH"/>
           </a:p>
@@ -25908,7 +26621,7 @@
           <a:p>
             <a:fld id="{2CDD62A0-B891-4650-A5BB-561AD783AD7C}" type="datetimeFigureOut">
               <a:rPr lang="en-PH" smtClean="0"/>
-              <a:t>29/05/2022</a:t>
+              <a:t>30/05/2022</a:t>
             </a:fld>
             <a:endParaRPr lang="en-PH"/>
           </a:p>
@@ -26184,7 +26897,7 @@
           <a:p>
             <a:fld id="{2CDD62A0-B891-4650-A5BB-561AD783AD7C}" type="datetimeFigureOut">
               <a:rPr lang="en-PH" smtClean="0"/>
-              <a:t>29/05/2022</a:t>
+              <a:t>30/05/2022</a:t>
             </a:fld>
             <a:endParaRPr lang="en-PH"/>
           </a:p>
@@ -26452,7 +27165,7 @@
           <a:p>
             <a:fld id="{2CDD62A0-B891-4650-A5BB-561AD783AD7C}" type="datetimeFigureOut">
               <a:rPr lang="en-PH" smtClean="0"/>
-              <a:t>29/05/2022</a:t>
+              <a:t>30/05/2022</a:t>
             </a:fld>
             <a:endParaRPr lang="en-PH"/>
           </a:p>
@@ -26867,7 +27580,7 @@
           <a:p>
             <a:fld id="{2CDD62A0-B891-4650-A5BB-561AD783AD7C}" type="datetimeFigureOut">
               <a:rPr lang="en-PH" smtClean="0"/>
-              <a:t>29/05/2022</a:t>
+              <a:t>30/05/2022</a:t>
             </a:fld>
             <a:endParaRPr lang="en-PH"/>
           </a:p>
@@ -27009,7 +27722,7 @@
           <a:p>
             <a:fld id="{2CDD62A0-B891-4650-A5BB-561AD783AD7C}" type="datetimeFigureOut">
               <a:rPr lang="en-PH" smtClean="0"/>
-              <a:t>29/05/2022</a:t>
+              <a:t>30/05/2022</a:t>
             </a:fld>
             <a:endParaRPr lang="en-PH"/>
           </a:p>
@@ -27122,7 +27835,7 @@
           <a:p>
             <a:fld id="{2CDD62A0-B891-4650-A5BB-561AD783AD7C}" type="datetimeFigureOut">
               <a:rPr lang="en-PH" smtClean="0"/>
-              <a:t>29/05/2022</a:t>
+              <a:t>30/05/2022</a:t>
             </a:fld>
             <a:endParaRPr lang="en-PH"/>
           </a:p>
@@ -27435,7 +28148,7 @@
           <a:p>
             <a:fld id="{2CDD62A0-B891-4650-A5BB-561AD783AD7C}" type="datetimeFigureOut">
               <a:rPr lang="en-PH" smtClean="0"/>
-              <a:t>29/05/2022</a:t>
+              <a:t>30/05/2022</a:t>
             </a:fld>
             <a:endParaRPr lang="en-PH"/>
           </a:p>
@@ -27724,7 +28437,7 @@
           <a:p>
             <a:fld id="{2CDD62A0-B891-4650-A5BB-561AD783AD7C}" type="datetimeFigureOut">
               <a:rPr lang="en-PH" smtClean="0"/>
-              <a:t>29/05/2022</a:t>
+              <a:t>30/05/2022</a:t>
             </a:fld>
             <a:endParaRPr lang="en-PH"/>
           </a:p>
@@ -27967,7 +28680,7 @@
           <a:p>
             <a:fld id="{2CDD62A0-B891-4650-A5BB-561AD783AD7C}" type="datetimeFigureOut">
               <a:rPr lang="en-PH" smtClean="0"/>
-              <a:t>29/05/2022</a:t>
+              <a:t>30/05/2022</a:t>
             </a:fld>
             <a:endParaRPr lang="en-PH"/>
           </a:p>
@@ -28669,14 +29382,14 @@
             <p:ph idx="1"/>
             <p:extLst>
               <p:ext uri="{D42A27DB-BD31-4B8C-83A1-F6EECF244321}">
-                <p14:modId xmlns:p14="http://schemas.microsoft.com/office/powerpoint/2010/main" val="289620441"/>
+                <p14:modId xmlns:p14="http://schemas.microsoft.com/office/powerpoint/2010/main" val="2785262154"/>
               </p:ext>
             </p:extLst>
           </p:nvPr>
         </p:nvGraphicFramePr>
         <p:xfrm>
-          <a:off x="838200" y="365125"/>
-          <a:ext cx="10515600" cy="5811838"/>
+          <a:off x="0" y="0"/>
+          <a:ext cx="12192000" cy="6858000"/>
         </p:xfrm>
         <a:graphic>
           <a:graphicData uri="http://schemas.openxmlformats.org/drawingml/2006/diagram">

</xml_diff>